<commit_message>
Component 2 Version 1 2 and 3
Created Component 2 with 3 different versions
</commit_message>
<xml_diff>
--- a/022_91893+_+91897+Documentation.pptx
+++ b/022_91893+_+91897+Documentation.pptx
@@ -5,7 +5,7 @@
     <p:sldMasterId id="2147483659" r:id="rId1"/>
   </p:sldMasterIdLst>
   <p:notesMasterIdLst>
-    <p:notesMasterId r:id="rId12"/>
+    <p:notesMasterId r:id="rId17"/>
   </p:notesMasterIdLst>
   <p:sldIdLst>
     <p:sldId id="256" r:id="rId2"/>
@@ -15,9 +15,14 @@
     <p:sldId id="260" r:id="rId6"/>
     <p:sldId id="265" r:id="rId7"/>
     <p:sldId id="263" r:id="rId8"/>
-    <p:sldId id="264" r:id="rId9"/>
-    <p:sldId id="261" r:id="rId10"/>
-    <p:sldId id="262" r:id="rId11"/>
+    <p:sldId id="266" r:id="rId9"/>
+    <p:sldId id="268" r:id="rId10"/>
+    <p:sldId id="269" r:id="rId11"/>
+    <p:sldId id="270" r:id="rId12"/>
+    <p:sldId id="267" r:id="rId13"/>
+    <p:sldId id="264" r:id="rId14"/>
+    <p:sldId id="261" r:id="rId15"/>
+    <p:sldId id="262" r:id="rId16"/>
   </p:sldIdLst>
   <p:sldSz cx="9144000" cy="5143500" type="screen16x9"/>
   <p:notesSz cx="6858000" cy="9144000"/>
@@ -871,6 +876,567 @@
   <p:cSld>
     <p:spTree>
       <p:nvGrpSpPr>
+        <p:cNvPr id="1" name="Shape 74"/>
+        <p:cNvGrpSpPr/>
+        <p:nvPr/>
+      </p:nvGrpSpPr>
+      <p:grpSpPr>
+        <a:xfrm>
+          <a:off x="0" y="0"/>
+          <a:ext cx="0" cy="0"/>
+          <a:chOff x="0" y="0"/>
+          <a:chExt cx="0" cy="0"/>
+        </a:xfrm>
+      </p:grpSpPr>
+      <p:sp>
+        <p:nvSpPr>
+          <p:cNvPr id="75" name="Google Shape;75;gac10fef634_0_20:notes"/>
+          <p:cNvSpPr>
+            <a:spLocks noGrp="1" noRot="1" noChangeAspect="1"/>
+          </p:cNvSpPr>
+          <p:nvPr>
+            <p:ph type="sldImg" idx="2"/>
+          </p:nvPr>
+        </p:nvSpPr>
+        <p:spPr>
+          <a:xfrm>
+            <a:off x="381000" y="685800"/>
+            <a:ext cx="6096000" cy="3429000"/>
+          </a:xfrm>
+          <a:custGeom>
+            <a:avLst/>
+            <a:gdLst/>
+            <a:ahLst/>
+            <a:cxnLst/>
+            <a:rect l="l" t="t" r="r" b="b"/>
+            <a:pathLst>
+              <a:path w="120000" h="120000" extrusionOk="0">
+                <a:moveTo>
+                  <a:pt x="0" y="0"/>
+                </a:moveTo>
+                <a:lnTo>
+                  <a:pt x="120000" y="0"/>
+                </a:lnTo>
+                <a:lnTo>
+                  <a:pt x="120000" y="120000"/>
+                </a:lnTo>
+                <a:lnTo>
+                  <a:pt x="0" y="120000"/>
+                </a:lnTo>
+                <a:close/>
+              </a:path>
+            </a:pathLst>
+          </a:custGeom>
+        </p:spPr>
+      </p:sp>
+      <p:sp>
+        <p:nvSpPr>
+          <p:cNvPr id="76" name="Google Shape;76;gac10fef634_0_20:notes"/>
+          <p:cNvSpPr txBox="1">
+            <a:spLocks noGrp="1"/>
+          </p:cNvSpPr>
+          <p:nvPr>
+            <p:ph type="body" idx="1"/>
+          </p:nvPr>
+        </p:nvSpPr>
+        <p:spPr>
+          <a:xfrm>
+            <a:off x="685800" y="4343400"/>
+            <a:ext cx="5486400" cy="4114800"/>
+          </a:xfrm>
+          <a:prstGeom prst="rect">
+            <a:avLst/>
+          </a:prstGeom>
+        </p:spPr>
+        <p:txBody>
+          <a:bodyPr spcFirstLastPara="1" wrap="square" lIns="91425" tIns="91425" rIns="91425" bIns="91425" anchor="t" anchorCtr="0">
+            <a:noAutofit/>
+          </a:bodyPr>
+          <a:lstStyle/>
+          <a:p>
+            <a:pPr marL="0" lvl="0" indent="0" algn="l" rtl="0">
+              <a:spcBef>
+                <a:spcPts val="0"/>
+              </a:spcBef>
+              <a:spcAft>
+                <a:spcPts val="0"/>
+              </a:spcAft>
+              <a:buNone/>
+            </a:pPr>
+            <a:endParaRPr/>
+          </a:p>
+        </p:txBody>
+      </p:sp>
+    </p:spTree>
+    <p:extLst>
+      <p:ext uri="{BB962C8B-B14F-4D97-AF65-F5344CB8AC3E}">
+        <p14:creationId xmlns:p14="http://schemas.microsoft.com/office/powerpoint/2010/main" val="3885951740"/>
+      </p:ext>
+    </p:extLst>
+  </p:cSld>
+  <p:clrMapOvr>
+    <a:masterClrMapping/>
+  </p:clrMapOvr>
+</p:notes>
+</file>
+
+<file path=ppt/notesSlides/notesSlide11.xml><?xml version="1.0" encoding="utf-8"?>
+<p:notes xmlns:a="http://schemas.openxmlformats.org/drawingml/2006/main" xmlns:r="http://schemas.openxmlformats.org/officeDocument/2006/relationships" xmlns:p="http://schemas.openxmlformats.org/presentationml/2006/main" showMasterSp="0" showMasterPhAnim="0">
+  <p:cSld>
+    <p:spTree>
+      <p:nvGrpSpPr>
+        <p:cNvPr id="1" name="Shape 74"/>
+        <p:cNvGrpSpPr/>
+        <p:nvPr/>
+      </p:nvGrpSpPr>
+      <p:grpSpPr>
+        <a:xfrm>
+          <a:off x="0" y="0"/>
+          <a:ext cx="0" cy="0"/>
+          <a:chOff x="0" y="0"/>
+          <a:chExt cx="0" cy="0"/>
+        </a:xfrm>
+      </p:grpSpPr>
+      <p:sp>
+        <p:nvSpPr>
+          <p:cNvPr id="75" name="Google Shape;75;gac10fef634_0_20:notes"/>
+          <p:cNvSpPr>
+            <a:spLocks noGrp="1" noRot="1" noChangeAspect="1"/>
+          </p:cNvSpPr>
+          <p:nvPr>
+            <p:ph type="sldImg" idx="2"/>
+          </p:nvPr>
+        </p:nvSpPr>
+        <p:spPr>
+          <a:xfrm>
+            <a:off x="381000" y="685800"/>
+            <a:ext cx="6096000" cy="3429000"/>
+          </a:xfrm>
+          <a:custGeom>
+            <a:avLst/>
+            <a:gdLst/>
+            <a:ahLst/>
+            <a:cxnLst/>
+            <a:rect l="l" t="t" r="r" b="b"/>
+            <a:pathLst>
+              <a:path w="120000" h="120000" extrusionOk="0">
+                <a:moveTo>
+                  <a:pt x="0" y="0"/>
+                </a:moveTo>
+                <a:lnTo>
+                  <a:pt x="120000" y="0"/>
+                </a:lnTo>
+                <a:lnTo>
+                  <a:pt x="120000" y="120000"/>
+                </a:lnTo>
+                <a:lnTo>
+                  <a:pt x="0" y="120000"/>
+                </a:lnTo>
+                <a:close/>
+              </a:path>
+            </a:pathLst>
+          </a:custGeom>
+        </p:spPr>
+      </p:sp>
+      <p:sp>
+        <p:nvSpPr>
+          <p:cNvPr id="76" name="Google Shape;76;gac10fef634_0_20:notes"/>
+          <p:cNvSpPr txBox="1">
+            <a:spLocks noGrp="1"/>
+          </p:cNvSpPr>
+          <p:nvPr>
+            <p:ph type="body" idx="1"/>
+          </p:nvPr>
+        </p:nvSpPr>
+        <p:spPr>
+          <a:xfrm>
+            <a:off x="685800" y="4343400"/>
+            <a:ext cx="5486400" cy="4114800"/>
+          </a:xfrm>
+          <a:prstGeom prst="rect">
+            <a:avLst/>
+          </a:prstGeom>
+        </p:spPr>
+        <p:txBody>
+          <a:bodyPr spcFirstLastPara="1" wrap="square" lIns="91425" tIns="91425" rIns="91425" bIns="91425" anchor="t" anchorCtr="0">
+            <a:noAutofit/>
+          </a:bodyPr>
+          <a:lstStyle/>
+          <a:p>
+            <a:pPr marL="0" lvl="0" indent="0" algn="l" rtl="0">
+              <a:spcBef>
+                <a:spcPts val="0"/>
+              </a:spcBef>
+              <a:spcAft>
+                <a:spcPts val="0"/>
+              </a:spcAft>
+              <a:buNone/>
+            </a:pPr>
+            <a:endParaRPr/>
+          </a:p>
+        </p:txBody>
+      </p:sp>
+    </p:spTree>
+    <p:extLst>
+      <p:ext uri="{BB962C8B-B14F-4D97-AF65-F5344CB8AC3E}">
+        <p14:creationId xmlns:p14="http://schemas.microsoft.com/office/powerpoint/2010/main" val="379021524"/>
+      </p:ext>
+    </p:extLst>
+  </p:cSld>
+  <p:clrMapOvr>
+    <a:masterClrMapping/>
+  </p:clrMapOvr>
+</p:notes>
+</file>
+
+<file path=ppt/notesSlides/notesSlide12.xml><?xml version="1.0" encoding="utf-8"?>
+<p:notes xmlns:a="http://schemas.openxmlformats.org/drawingml/2006/main" xmlns:r="http://schemas.openxmlformats.org/officeDocument/2006/relationships" xmlns:p="http://schemas.openxmlformats.org/presentationml/2006/main" showMasterSp="0" showMasterPhAnim="0">
+  <p:cSld>
+    <p:spTree>
+      <p:nvGrpSpPr>
+        <p:cNvPr id="1" name="Shape 69"/>
+        <p:cNvGrpSpPr/>
+        <p:nvPr/>
+      </p:nvGrpSpPr>
+      <p:grpSpPr>
+        <a:xfrm>
+          <a:off x="0" y="0"/>
+          <a:ext cx="0" cy="0"/>
+          <a:chOff x="0" y="0"/>
+          <a:chExt cx="0" cy="0"/>
+        </a:xfrm>
+      </p:grpSpPr>
+      <p:sp>
+        <p:nvSpPr>
+          <p:cNvPr id="70" name="Google Shape;70;gac10fef634_0_16:notes"/>
+          <p:cNvSpPr>
+            <a:spLocks noGrp="1" noRot="1" noChangeAspect="1"/>
+          </p:cNvSpPr>
+          <p:nvPr>
+            <p:ph type="sldImg" idx="2"/>
+          </p:nvPr>
+        </p:nvSpPr>
+        <p:spPr>
+          <a:xfrm>
+            <a:off x="381000" y="685800"/>
+            <a:ext cx="6096000" cy="3429000"/>
+          </a:xfrm>
+          <a:custGeom>
+            <a:avLst/>
+            <a:gdLst/>
+            <a:ahLst/>
+            <a:cxnLst/>
+            <a:rect l="l" t="t" r="r" b="b"/>
+            <a:pathLst>
+              <a:path w="120000" h="120000" extrusionOk="0">
+                <a:moveTo>
+                  <a:pt x="0" y="0"/>
+                </a:moveTo>
+                <a:lnTo>
+                  <a:pt x="120000" y="0"/>
+                </a:lnTo>
+                <a:lnTo>
+                  <a:pt x="120000" y="120000"/>
+                </a:lnTo>
+                <a:lnTo>
+                  <a:pt x="0" y="120000"/>
+                </a:lnTo>
+                <a:close/>
+              </a:path>
+            </a:pathLst>
+          </a:custGeom>
+        </p:spPr>
+      </p:sp>
+      <p:sp>
+        <p:nvSpPr>
+          <p:cNvPr id="71" name="Google Shape;71;gac10fef634_0_16:notes"/>
+          <p:cNvSpPr txBox="1">
+            <a:spLocks noGrp="1"/>
+          </p:cNvSpPr>
+          <p:nvPr>
+            <p:ph type="body" idx="1"/>
+          </p:nvPr>
+        </p:nvSpPr>
+        <p:spPr>
+          <a:xfrm>
+            <a:off x="685800" y="4343400"/>
+            <a:ext cx="5486400" cy="4114800"/>
+          </a:xfrm>
+          <a:prstGeom prst="rect">
+            <a:avLst/>
+          </a:prstGeom>
+        </p:spPr>
+        <p:txBody>
+          <a:bodyPr spcFirstLastPara="1" wrap="square" lIns="91425" tIns="91425" rIns="91425" bIns="91425" anchor="t" anchorCtr="0">
+            <a:noAutofit/>
+          </a:bodyPr>
+          <a:lstStyle/>
+          <a:p>
+            <a:pPr marL="0" lvl="0" indent="0" algn="l" rtl="0">
+              <a:spcBef>
+                <a:spcPts val="0"/>
+              </a:spcBef>
+              <a:spcAft>
+                <a:spcPts val="0"/>
+              </a:spcAft>
+              <a:buNone/>
+            </a:pPr>
+            <a:endParaRPr/>
+          </a:p>
+        </p:txBody>
+      </p:sp>
+    </p:spTree>
+    <p:extLst>
+      <p:ext uri="{BB962C8B-B14F-4D97-AF65-F5344CB8AC3E}">
+        <p14:creationId xmlns:p14="http://schemas.microsoft.com/office/powerpoint/2010/main" val="1959815427"/>
+      </p:ext>
+    </p:extLst>
+  </p:cSld>
+  <p:clrMapOvr>
+    <a:masterClrMapping/>
+  </p:clrMapOvr>
+</p:notes>
+</file>
+
+<file path=ppt/notesSlides/notesSlide13.xml><?xml version="1.0" encoding="utf-8"?>
+<p:notes xmlns:a="http://schemas.openxmlformats.org/drawingml/2006/main" xmlns:r="http://schemas.openxmlformats.org/officeDocument/2006/relationships" xmlns:p="http://schemas.openxmlformats.org/presentationml/2006/main" showMasterSp="0" showMasterPhAnim="0">
+  <p:cSld>
+    <p:spTree>
+      <p:nvGrpSpPr>
+        <p:cNvPr id="1" name="Shape 74"/>
+        <p:cNvGrpSpPr/>
+        <p:nvPr/>
+      </p:nvGrpSpPr>
+      <p:grpSpPr>
+        <a:xfrm>
+          <a:off x="0" y="0"/>
+          <a:ext cx="0" cy="0"/>
+          <a:chOff x="0" y="0"/>
+          <a:chExt cx="0" cy="0"/>
+        </a:xfrm>
+      </p:grpSpPr>
+      <p:sp>
+        <p:nvSpPr>
+          <p:cNvPr id="75" name="Google Shape;75;gac10fef634_0_20:notes"/>
+          <p:cNvSpPr>
+            <a:spLocks noGrp="1" noRot="1" noChangeAspect="1"/>
+          </p:cNvSpPr>
+          <p:nvPr>
+            <p:ph type="sldImg" idx="2"/>
+          </p:nvPr>
+        </p:nvSpPr>
+        <p:spPr>
+          <a:xfrm>
+            <a:off x="381000" y="685800"/>
+            <a:ext cx="6096000" cy="3429000"/>
+          </a:xfrm>
+          <a:custGeom>
+            <a:avLst/>
+            <a:gdLst/>
+            <a:ahLst/>
+            <a:cxnLst/>
+            <a:rect l="l" t="t" r="r" b="b"/>
+            <a:pathLst>
+              <a:path w="120000" h="120000" extrusionOk="0">
+                <a:moveTo>
+                  <a:pt x="0" y="0"/>
+                </a:moveTo>
+                <a:lnTo>
+                  <a:pt x="120000" y="0"/>
+                </a:lnTo>
+                <a:lnTo>
+                  <a:pt x="120000" y="120000"/>
+                </a:lnTo>
+                <a:lnTo>
+                  <a:pt x="0" y="120000"/>
+                </a:lnTo>
+                <a:close/>
+              </a:path>
+            </a:pathLst>
+          </a:custGeom>
+        </p:spPr>
+      </p:sp>
+      <p:sp>
+        <p:nvSpPr>
+          <p:cNvPr id="76" name="Google Shape;76;gac10fef634_0_20:notes"/>
+          <p:cNvSpPr txBox="1">
+            <a:spLocks noGrp="1"/>
+          </p:cNvSpPr>
+          <p:nvPr>
+            <p:ph type="body" idx="1"/>
+          </p:nvPr>
+        </p:nvSpPr>
+        <p:spPr>
+          <a:xfrm>
+            <a:off x="685800" y="4343400"/>
+            <a:ext cx="5486400" cy="4114800"/>
+          </a:xfrm>
+          <a:prstGeom prst="rect">
+            <a:avLst/>
+          </a:prstGeom>
+        </p:spPr>
+        <p:txBody>
+          <a:bodyPr spcFirstLastPara="1" wrap="square" lIns="91425" tIns="91425" rIns="91425" bIns="91425" anchor="t" anchorCtr="0">
+            <a:noAutofit/>
+          </a:bodyPr>
+          <a:lstStyle/>
+          <a:p>
+            <a:pPr marL="0" lvl="0" indent="0" algn="l" rtl="0">
+              <a:spcBef>
+                <a:spcPts val="0"/>
+              </a:spcBef>
+              <a:spcAft>
+                <a:spcPts val="0"/>
+              </a:spcAft>
+              <a:buNone/>
+            </a:pPr>
+            <a:endParaRPr/>
+          </a:p>
+        </p:txBody>
+      </p:sp>
+    </p:spTree>
+    <p:extLst>
+      <p:ext uri="{BB962C8B-B14F-4D97-AF65-F5344CB8AC3E}">
+        <p14:creationId xmlns:p14="http://schemas.microsoft.com/office/powerpoint/2010/main" val="1655442931"/>
+      </p:ext>
+    </p:extLst>
+  </p:cSld>
+  <p:clrMapOvr>
+    <a:masterClrMapping/>
+  </p:clrMapOvr>
+</p:notes>
+</file>
+
+<file path=ppt/notesSlides/notesSlide14.xml><?xml version="1.0" encoding="utf-8"?>
+<p:notes xmlns:a="http://schemas.openxmlformats.org/drawingml/2006/main" xmlns:r="http://schemas.openxmlformats.org/officeDocument/2006/relationships" xmlns:p="http://schemas.openxmlformats.org/presentationml/2006/main" showMasterSp="0" showMasterPhAnim="0">
+  <p:cSld>
+    <p:spTree>
+      <p:nvGrpSpPr>
+        <p:cNvPr id="1" name="Shape 80"/>
+        <p:cNvGrpSpPr/>
+        <p:nvPr/>
+      </p:nvGrpSpPr>
+      <p:grpSpPr>
+        <a:xfrm>
+          <a:off x="0" y="0"/>
+          <a:ext cx="0" cy="0"/>
+          <a:chOff x="0" y="0"/>
+          <a:chExt cx="0" cy="0"/>
+        </a:xfrm>
+      </p:grpSpPr>
+      <p:sp>
+        <p:nvSpPr>
+          <p:cNvPr id="81" name="Google Shape;81;gac10fef634_0_25:notes"/>
+          <p:cNvSpPr>
+            <a:spLocks noGrp="1" noRot="1" noChangeAspect="1"/>
+          </p:cNvSpPr>
+          <p:nvPr>
+            <p:ph type="sldImg" idx="2"/>
+          </p:nvPr>
+        </p:nvSpPr>
+        <p:spPr>
+          <a:xfrm>
+            <a:off x="381000" y="685800"/>
+            <a:ext cx="6096000" cy="3429000"/>
+          </a:xfrm>
+          <a:custGeom>
+            <a:avLst/>
+            <a:gdLst/>
+            <a:ahLst/>
+            <a:cxnLst/>
+            <a:rect l="l" t="t" r="r" b="b"/>
+            <a:pathLst>
+              <a:path w="120000" h="120000" extrusionOk="0">
+                <a:moveTo>
+                  <a:pt x="0" y="0"/>
+                </a:moveTo>
+                <a:lnTo>
+                  <a:pt x="120000" y="0"/>
+                </a:lnTo>
+                <a:lnTo>
+                  <a:pt x="120000" y="120000"/>
+                </a:lnTo>
+                <a:lnTo>
+                  <a:pt x="0" y="120000"/>
+                </a:lnTo>
+                <a:close/>
+              </a:path>
+            </a:pathLst>
+          </a:custGeom>
+        </p:spPr>
+      </p:sp>
+      <p:sp>
+        <p:nvSpPr>
+          <p:cNvPr id="82" name="Google Shape;82;gac10fef634_0_25:notes"/>
+          <p:cNvSpPr txBox="1">
+            <a:spLocks noGrp="1"/>
+          </p:cNvSpPr>
+          <p:nvPr>
+            <p:ph type="body" idx="1"/>
+          </p:nvPr>
+        </p:nvSpPr>
+        <p:spPr>
+          <a:xfrm>
+            <a:off x="685800" y="4343400"/>
+            <a:ext cx="5486400" cy="4114800"/>
+          </a:xfrm>
+          <a:prstGeom prst="rect">
+            <a:avLst/>
+          </a:prstGeom>
+        </p:spPr>
+        <p:txBody>
+          <a:bodyPr spcFirstLastPara="1" wrap="square" lIns="91425" tIns="91425" rIns="91425" bIns="91425" anchor="t" anchorCtr="0">
+            <a:noAutofit/>
+          </a:bodyPr>
+          <a:lstStyle/>
+          <a:p>
+            <a:pPr marL="0" lvl="0" indent="0" algn="l" rtl="0">
+              <a:spcBef>
+                <a:spcPts val="0"/>
+              </a:spcBef>
+              <a:spcAft>
+                <a:spcPts val="0"/>
+              </a:spcAft>
+              <a:buClr>
+                <a:schemeClr val="dk1"/>
+              </a:buClr>
+              <a:buSzPts val="1100"/>
+              <a:buFont typeface="Arial"/>
+              <a:buNone/>
+            </a:pPr>
+            <a:r>
+              <a:rPr lang="en"/>
+              <a:t>Your version control evidence should go here.  This could be in the form of annotated screenshots which show you you managed this process or you could make a brief screencast explaining how you implemented version control.</a:t>
+            </a:r>
+            <a:endParaRPr/>
+          </a:p>
+          <a:p>
+            <a:pPr marL="0" lvl="0" indent="0" algn="l" rtl="0">
+              <a:spcBef>
+                <a:spcPts val="0"/>
+              </a:spcBef>
+              <a:spcAft>
+                <a:spcPts val="0"/>
+              </a:spcAft>
+              <a:buNone/>
+            </a:pPr>
+            <a:endParaRPr/>
+          </a:p>
+        </p:txBody>
+      </p:sp>
+    </p:spTree>
+  </p:cSld>
+  <p:clrMapOvr>
+    <a:masterClrMapping/>
+  </p:clrMapOvr>
+</p:notes>
+</file>
+
+<file path=ppt/notesSlides/notesSlide15.xml><?xml version="1.0" encoding="utf-8"?>
+<p:notes xmlns:a="http://schemas.openxmlformats.org/drawingml/2006/main" xmlns:r="http://schemas.openxmlformats.org/officeDocument/2006/relationships" xmlns:p="http://schemas.openxmlformats.org/presentationml/2006/main" showMasterSp="0" showMasterPhAnim="0">
+  <p:cSld>
+    <p:spTree>
+      <p:nvGrpSpPr>
         <p:cNvPr id="1" name="Shape 86"/>
         <p:cNvGrpSpPr/>
         <p:nvPr/>
@@ -1732,7 +2298,7 @@
     </p:spTree>
     <p:extLst>
       <p:ext uri="{BB962C8B-B14F-4D97-AF65-F5344CB8AC3E}">
-        <p14:creationId xmlns:p14="http://schemas.microsoft.com/office/powerpoint/2010/main" val="1655442931"/>
+        <p14:creationId xmlns:p14="http://schemas.microsoft.com/office/powerpoint/2010/main" val="3405483479"/>
       </p:ext>
     </p:extLst>
   </p:cSld>
@@ -1747,7 +2313,7 @@
   <p:cSld>
     <p:spTree>
       <p:nvGrpSpPr>
-        <p:cNvPr id="1" name="Shape 80"/>
+        <p:cNvPr id="1" name="Shape 74"/>
         <p:cNvGrpSpPr/>
         <p:nvPr/>
       </p:nvGrpSpPr>
@@ -1761,7 +2327,7 @@
       </p:grpSpPr>
       <p:sp>
         <p:nvSpPr>
-          <p:cNvPr id="81" name="Google Shape;81;gac10fef634_0_25:notes"/>
+          <p:cNvPr id="75" name="Google Shape;75;gac10fef634_0_20:notes"/>
           <p:cNvSpPr>
             <a:spLocks noGrp="1" noRot="1" noChangeAspect="1"/>
           </p:cNvSpPr>
@@ -1802,7 +2368,7 @@
       </p:sp>
       <p:sp>
         <p:nvSpPr>
-          <p:cNvPr id="82" name="Google Shape;82;gac10fef634_0_25:notes"/>
+          <p:cNvPr id="76" name="Google Shape;76;gac10fef634_0_20:notes"/>
           <p:cNvSpPr txBox="1">
             <a:spLocks noGrp="1"/>
           </p:cNvSpPr>
@@ -1832,27 +2398,6 @@
               <a:spcAft>
                 <a:spcPts val="0"/>
               </a:spcAft>
-              <a:buClr>
-                <a:schemeClr val="dk1"/>
-              </a:buClr>
-              <a:buSzPts val="1100"/>
-              <a:buFont typeface="Arial"/>
-              <a:buNone/>
-            </a:pPr>
-            <a:r>
-              <a:rPr lang="en"/>
-              <a:t>Your version control evidence should go here.  This could be in the form of annotated screenshots which show you you managed this process or you could make a brief screencast explaining how you implemented version control.</a:t>
-            </a:r>
-            <a:endParaRPr/>
-          </a:p>
-          <a:p>
-            <a:pPr marL="0" lvl="0" indent="0" algn="l" rtl="0">
-              <a:spcBef>
-                <a:spcPts val="0"/>
-              </a:spcBef>
-              <a:spcAft>
-                <a:spcPts val="0"/>
-              </a:spcAft>
               <a:buNone/>
             </a:pPr>
             <a:endParaRPr/>
@@ -1860,6 +2405,11 @@
         </p:txBody>
       </p:sp>
     </p:spTree>
+    <p:extLst>
+      <p:ext uri="{BB962C8B-B14F-4D97-AF65-F5344CB8AC3E}">
+        <p14:creationId xmlns:p14="http://schemas.microsoft.com/office/powerpoint/2010/main" val="1116925877"/>
+      </p:ext>
+    </p:extLst>
   </p:cSld>
   <p:clrMapOvr>
     <a:masterClrMapping/>
@@ -6901,6 +7451,960 @@
 <file path=ppt/slides/slide10.xml><?xml version="1.0" encoding="utf-8"?>
 <p:sld xmlns:a="http://schemas.openxmlformats.org/drawingml/2006/main" xmlns:r="http://schemas.openxmlformats.org/officeDocument/2006/relationships" xmlns:p="http://schemas.openxmlformats.org/presentationml/2006/main">
   <p:cSld>
+    <p:spTree>
+      <p:nvGrpSpPr>
+        <p:cNvPr id="1" name="Shape 77"/>
+        <p:cNvGrpSpPr/>
+        <p:nvPr/>
+      </p:nvGrpSpPr>
+      <p:grpSpPr>
+        <a:xfrm>
+          <a:off x="0" y="0"/>
+          <a:ext cx="0" cy="0"/>
+          <a:chOff x="0" y="0"/>
+          <a:chExt cx="0" cy="0"/>
+        </a:xfrm>
+      </p:grpSpPr>
+      <p:sp>
+        <p:nvSpPr>
+          <p:cNvPr id="78" name="Google Shape;78;p17"/>
+          <p:cNvSpPr txBox="1">
+            <a:spLocks noGrp="1"/>
+          </p:cNvSpPr>
+          <p:nvPr>
+            <p:ph type="title"/>
+          </p:nvPr>
+        </p:nvSpPr>
+        <p:spPr>
+          <a:xfrm>
+            <a:off x="311700" y="445025"/>
+            <a:ext cx="8520600" cy="572700"/>
+          </a:xfrm>
+          <a:prstGeom prst="rect">
+            <a:avLst/>
+          </a:prstGeom>
+        </p:spPr>
+        <p:txBody>
+          <a:bodyPr spcFirstLastPara="1" wrap="square" lIns="91425" tIns="91425" rIns="91425" bIns="91425" anchor="t" anchorCtr="0">
+            <a:noAutofit/>
+          </a:bodyPr>
+          <a:lstStyle/>
+          <a:p>
+            <a:pPr marL="0" lvl="0" indent="0" algn="l" rtl="0">
+              <a:spcBef>
+                <a:spcPts val="0"/>
+              </a:spcBef>
+              <a:spcAft>
+                <a:spcPts val="0"/>
+              </a:spcAft>
+              <a:buNone/>
+            </a:pPr>
+            <a:r>
+              <a:rPr lang="en" dirty="0"/>
+              <a:t>Component 2 version 3 - Test Plan (?and screenshot)</a:t>
+            </a:r>
+            <a:endParaRPr dirty="0"/>
+          </a:p>
+        </p:txBody>
+      </p:sp>
+      <p:graphicFrame>
+        <p:nvGraphicFramePr>
+          <p:cNvPr id="79" name="Google Shape;79;p17"/>
+          <p:cNvGraphicFramePr/>
+          <p:nvPr>
+            <p:extLst>
+              <p:ext uri="{D42A27DB-BD31-4B8C-83A1-F6EECF244321}">
+                <p14:modId xmlns:p14="http://schemas.microsoft.com/office/powerpoint/2010/main" val="3108332458"/>
+              </p:ext>
+            </p:extLst>
+          </p:nvPr>
+        </p:nvGraphicFramePr>
+        <p:xfrm>
+          <a:off x="311700" y="3433572"/>
+          <a:ext cx="8520600" cy="1814469"/>
+        </p:xfrm>
+        <a:graphic>
+          <a:graphicData uri="http://schemas.openxmlformats.org/drawingml/2006/table">
+            <a:tbl>
+              <a:tblPr>
+                <a:noFill/>
+                <a:tableStyleId>{E1099E06-0E6B-448D-9D27-60429F06E6F4}</a:tableStyleId>
+              </a:tblPr>
+              <a:tblGrid>
+                <a:gridCol w="4260300">
+                  <a:extLst>
+                    <a:ext uri="{9D8B030D-6E8A-4147-A177-3AD203B41FA5}">
+                      <a16:colId xmlns:a16="http://schemas.microsoft.com/office/drawing/2014/main" val="20000"/>
+                    </a:ext>
+                  </a:extLst>
+                </a:gridCol>
+                <a:gridCol w="4260300">
+                  <a:extLst>
+                    <a:ext uri="{9D8B030D-6E8A-4147-A177-3AD203B41FA5}">
+                      <a16:colId xmlns:a16="http://schemas.microsoft.com/office/drawing/2014/main" val="20001"/>
+                    </a:ext>
+                  </a:extLst>
+                </a:gridCol>
+              </a:tblGrid>
+              <a:tr h="534339">
+                <a:tc>
+                  <a:txBody>
+                    <a:bodyPr/>
+                    <a:lstStyle/>
+                    <a:p>
+                      <a:pPr marL="0" lvl="0" indent="0" algn="l" rtl="0">
+                        <a:spcBef>
+                          <a:spcPts val="0"/>
+                        </a:spcBef>
+                        <a:spcAft>
+                          <a:spcPts val="0"/>
+                        </a:spcAft>
+                        <a:buNone/>
+                      </a:pPr>
+                      <a:r>
+                        <a:rPr lang="en" sz="1800" b="1"/>
+                        <a:t>Test Case</a:t>
+                      </a:r>
+                      <a:endParaRPr sz="1800" b="1"/>
+                    </a:p>
+                  </a:txBody>
+                  <a:tcPr marL="91425" marR="91425" marT="91425" marB="91425">
+                    <a:solidFill>
+                      <a:srgbClr val="CCCCCC"/>
+                    </a:solidFill>
+                  </a:tcPr>
+                </a:tc>
+                <a:tc>
+                  <a:txBody>
+                    <a:bodyPr/>
+                    <a:lstStyle/>
+                    <a:p>
+                      <a:pPr marL="0" lvl="0" indent="0" algn="l" rtl="0">
+                        <a:spcBef>
+                          <a:spcPts val="0"/>
+                        </a:spcBef>
+                        <a:spcAft>
+                          <a:spcPts val="0"/>
+                        </a:spcAft>
+                        <a:buNone/>
+                      </a:pPr>
+                      <a:r>
+                        <a:rPr lang="en" sz="1800" b="1"/>
+                        <a:t>Expected Values</a:t>
+                      </a:r>
+                      <a:endParaRPr sz="1800" b="1"/>
+                    </a:p>
+                  </a:txBody>
+                  <a:tcPr marL="91425" marR="91425" marT="91425" marB="91425">
+                    <a:solidFill>
+                      <a:srgbClr val="CCCCCC"/>
+                    </a:solidFill>
+                  </a:tcPr>
+                </a:tc>
+                <a:extLst>
+                  <a:ext uri="{0D108BD9-81ED-4DB2-BD59-A6C34878D82A}">
+                    <a16:rowId xmlns:a16="http://schemas.microsoft.com/office/drawing/2014/main" val="10000"/>
+                  </a:ext>
+                </a:extLst>
+              </a:tr>
+              <a:tr h="1175588">
+                <a:tc>
+                  <a:txBody>
+                    <a:bodyPr/>
+                    <a:lstStyle/>
+                    <a:p>
+                      <a:pPr marL="0" lvl="0" indent="0" algn="l" rtl="0">
+                        <a:spcBef>
+                          <a:spcPts val="0"/>
+                        </a:spcBef>
+                        <a:spcAft>
+                          <a:spcPts val="0"/>
+                        </a:spcAft>
+                        <a:buNone/>
+                      </a:pPr>
+                      <a:r>
+                        <a:rPr lang="en-US" sz="1800" dirty="0"/>
+                        <a:t>Run program</a:t>
+                      </a:r>
+                      <a:endParaRPr sz="1800" dirty="0"/>
+                    </a:p>
+                  </a:txBody>
+                  <a:tcPr marL="91425" marR="91425" marT="91425" marB="91425"/>
+                </a:tc>
+                <a:tc>
+                  <a:txBody>
+                    <a:bodyPr/>
+                    <a:lstStyle/>
+                    <a:p>
+                      <a:pPr marL="0" lvl="0" indent="0" algn="l" rtl="0">
+                        <a:spcBef>
+                          <a:spcPts val="0"/>
+                        </a:spcBef>
+                        <a:spcAft>
+                          <a:spcPts val="0"/>
+                        </a:spcAft>
+                        <a:buNone/>
+                      </a:pPr>
+                      <a:r>
+                        <a:rPr lang="en-US" sz="1800" dirty="0"/>
+                        <a:t>Enter 1 program prints pickup </a:t>
+                      </a:r>
+                    </a:p>
+                    <a:p>
+                      <a:pPr marL="0" lvl="0" indent="0" algn="l" rtl="0">
+                        <a:spcBef>
+                          <a:spcPts val="0"/>
+                        </a:spcBef>
+                        <a:spcAft>
+                          <a:spcPts val="0"/>
+                        </a:spcAft>
+                        <a:buNone/>
+                      </a:pPr>
+                      <a:r>
+                        <a:rPr lang="en-US" sz="1800" dirty="0"/>
+                        <a:t>Enter 2 program prints delivery</a:t>
+                      </a:r>
+                    </a:p>
+                    <a:p>
+                      <a:pPr marL="0" lvl="0" indent="0" algn="l" rtl="0">
+                        <a:spcBef>
+                          <a:spcPts val="0"/>
+                        </a:spcBef>
+                        <a:spcAft>
+                          <a:spcPts val="0"/>
+                        </a:spcAft>
+                        <a:buNone/>
+                      </a:pPr>
+                      <a:r>
+                        <a:rPr lang="en-US" sz="1800" dirty="0"/>
+                        <a:t>Enter invalid program displays value error</a:t>
+                      </a:r>
+                      <a:endParaRPr sz="1800" dirty="0"/>
+                    </a:p>
+                  </a:txBody>
+                  <a:tcPr marL="91425" marR="91425" marT="91425" marB="91425"/>
+                </a:tc>
+                <a:extLst>
+                  <a:ext uri="{0D108BD9-81ED-4DB2-BD59-A6C34878D82A}">
+                    <a16:rowId xmlns:a16="http://schemas.microsoft.com/office/drawing/2014/main" val="10001"/>
+                  </a:ext>
+                </a:extLst>
+              </a:tr>
+            </a:tbl>
+          </a:graphicData>
+        </a:graphic>
+      </p:graphicFrame>
+      <p:pic>
+        <p:nvPicPr>
+          <p:cNvPr id="4" name="Picture 3">
+            <a:extLst>
+              <a:ext uri="{FF2B5EF4-FFF2-40B4-BE49-F238E27FC236}">
+                <a16:creationId xmlns:a16="http://schemas.microsoft.com/office/drawing/2014/main" id="{C1D4A2A7-61E3-4BE8-9958-D6E966E5785B}"/>
+              </a:ext>
+            </a:extLst>
+          </p:cNvPr>
+          <p:cNvPicPr>
+            <a:picLocks noChangeAspect="1"/>
+          </p:cNvPicPr>
+          <p:nvPr/>
+        </p:nvPicPr>
+        <p:blipFill>
+          <a:blip r:embed="rId3"/>
+          <a:stretch>
+            <a:fillRect/>
+          </a:stretch>
+        </p:blipFill>
+        <p:spPr>
+          <a:xfrm>
+            <a:off x="2557780" y="1016862"/>
+            <a:ext cx="3511716" cy="2416711"/>
+          </a:xfrm>
+          <a:prstGeom prst="rect">
+            <a:avLst/>
+          </a:prstGeom>
+        </p:spPr>
+      </p:pic>
+    </p:spTree>
+    <p:extLst>
+      <p:ext uri="{BB962C8B-B14F-4D97-AF65-F5344CB8AC3E}">
+        <p14:creationId xmlns:p14="http://schemas.microsoft.com/office/powerpoint/2010/main" val="3785972370"/>
+      </p:ext>
+    </p:extLst>
+  </p:cSld>
+  <p:clrMapOvr>
+    <a:masterClrMapping/>
+  </p:clrMapOvr>
+</p:sld>
+</file>
+
+<file path=ppt/slides/slide11.xml><?xml version="1.0" encoding="utf-8"?>
+<p:sld xmlns:a="http://schemas.openxmlformats.org/drawingml/2006/main" xmlns:r="http://schemas.openxmlformats.org/officeDocument/2006/relationships" xmlns:p="http://schemas.openxmlformats.org/presentationml/2006/main">
+  <p:cSld>
+    <p:spTree>
+      <p:nvGrpSpPr>
+        <p:cNvPr id="1" name="Shape 77"/>
+        <p:cNvGrpSpPr/>
+        <p:nvPr/>
+      </p:nvGrpSpPr>
+      <p:grpSpPr>
+        <a:xfrm>
+          <a:off x="0" y="0"/>
+          <a:ext cx="0" cy="0"/>
+          <a:chOff x="0" y="0"/>
+          <a:chExt cx="0" cy="0"/>
+        </a:xfrm>
+      </p:grpSpPr>
+      <p:sp>
+        <p:nvSpPr>
+          <p:cNvPr id="78" name="Google Shape;78;p17"/>
+          <p:cNvSpPr txBox="1">
+            <a:spLocks noGrp="1"/>
+          </p:cNvSpPr>
+          <p:nvPr>
+            <p:ph type="title"/>
+          </p:nvPr>
+        </p:nvSpPr>
+        <p:spPr>
+          <a:xfrm>
+            <a:off x="311700" y="445025"/>
+            <a:ext cx="8520600" cy="572700"/>
+          </a:xfrm>
+          <a:prstGeom prst="rect">
+            <a:avLst/>
+          </a:prstGeom>
+        </p:spPr>
+        <p:txBody>
+          <a:bodyPr spcFirstLastPara="1" wrap="square" lIns="91425" tIns="91425" rIns="91425" bIns="91425" anchor="t" anchorCtr="0">
+            <a:noAutofit/>
+          </a:bodyPr>
+          <a:lstStyle/>
+          <a:p>
+            <a:pPr marL="0" lvl="0" indent="0" algn="l" rtl="0">
+              <a:spcBef>
+                <a:spcPts val="0"/>
+              </a:spcBef>
+              <a:spcAft>
+                <a:spcPts val="0"/>
+              </a:spcAft>
+              <a:buNone/>
+            </a:pPr>
+            <a:r>
+              <a:rPr lang="en" dirty="0"/>
+              <a:t>Component 2 version 4 - Test Plan (?and screenshot)</a:t>
+            </a:r>
+            <a:endParaRPr dirty="0"/>
+          </a:p>
+        </p:txBody>
+      </p:sp>
+      <p:graphicFrame>
+        <p:nvGraphicFramePr>
+          <p:cNvPr id="79" name="Google Shape;79;p17"/>
+          <p:cNvGraphicFramePr/>
+          <p:nvPr/>
+        </p:nvGraphicFramePr>
+        <p:xfrm>
+          <a:off x="311700" y="3433573"/>
+          <a:ext cx="8520600" cy="1737300"/>
+        </p:xfrm>
+        <a:graphic>
+          <a:graphicData uri="http://schemas.openxmlformats.org/drawingml/2006/table">
+            <a:tbl>
+              <a:tblPr>
+                <a:noFill/>
+                <a:tableStyleId>{E1099E06-0E6B-448D-9D27-60429F06E6F4}</a:tableStyleId>
+              </a:tblPr>
+              <a:tblGrid>
+                <a:gridCol w="4260300">
+                  <a:extLst>
+                    <a:ext uri="{9D8B030D-6E8A-4147-A177-3AD203B41FA5}">
+                      <a16:colId xmlns:a16="http://schemas.microsoft.com/office/drawing/2014/main" val="20000"/>
+                    </a:ext>
+                  </a:extLst>
+                </a:gridCol>
+                <a:gridCol w="4260300">
+                  <a:extLst>
+                    <a:ext uri="{9D8B030D-6E8A-4147-A177-3AD203B41FA5}">
+                      <a16:colId xmlns:a16="http://schemas.microsoft.com/office/drawing/2014/main" val="20001"/>
+                    </a:ext>
+                  </a:extLst>
+                </a:gridCol>
+              </a:tblGrid>
+              <a:tr h="381000">
+                <a:tc>
+                  <a:txBody>
+                    <a:bodyPr/>
+                    <a:lstStyle/>
+                    <a:p>
+                      <a:pPr marL="0" lvl="0" indent="0" algn="l" rtl="0">
+                        <a:spcBef>
+                          <a:spcPts val="0"/>
+                        </a:spcBef>
+                        <a:spcAft>
+                          <a:spcPts val="0"/>
+                        </a:spcAft>
+                        <a:buNone/>
+                      </a:pPr>
+                      <a:r>
+                        <a:rPr lang="en" sz="1800" b="1"/>
+                        <a:t>Test Case</a:t>
+                      </a:r>
+                      <a:endParaRPr sz="1800" b="1"/>
+                    </a:p>
+                  </a:txBody>
+                  <a:tcPr marL="91425" marR="91425" marT="91425" marB="91425">
+                    <a:solidFill>
+                      <a:srgbClr val="CCCCCC"/>
+                    </a:solidFill>
+                  </a:tcPr>
+                </a:tc>
+                <a:tc>
+                  <a:txBody>
+                    <a:bodyPr/>
+                    <a:lstStyle/>
+                    <a:p>
+                      <a:pPr marL="0" lvl="0" indent="0" algn="l" rtl="0">
+                        <a:spcBef>
+                          <a:spcPts val="0"/>
+                        </a:spcBef>
+                        <a:spcAft>
+                          <a:spcPts val="0"/>
+                        </a:spcAft>
+                        <a:buNone/>
+                      </a:pPr>
+                      <a:r>
+                        <a:rPr lang="en" sz="1800" b="1"/>
+                        <a:t>Expected Values</a:t>
+                      </a:r>
+                      <a:endParaRPr sz="1800" b="1"/>
+                    </a:p>
+                  </a:txBody>
+                  <a:tcPr marL="91425" marR="91425" marT="91425" marB="91425">
+                    <a:solidFill>
+                      <a:srgbClr val="CCCCCC"/>
+                    </a:solidFill>
+                  </a:tcPr>
+                </a:tc>
+                <a:extLst>
+                  <a:ext uri="{0D108BD9-81ED-4DB2-BD59-A6C34878D82A}">
+                    <a16:rowId xmlns:a16="http://schemas.microsoft.com/office/drawing/2014/main" val="10000"/>
+                  </a:ext>
+                </a:extLst>
+              </a:tr>
+              <a:tr h="396200">
+                <a:tc>
+                  <a:txBody>
+                    <a:bodyPr/>
+                    <a:lstStyle/>
+                    <a:p>
+                      <a:pPr marL="0" lvl="0" indent="0" algn="l" rtl="0">
+                        <a:spcBef>
+                          <a:spcPts val="0"/>
+                        </a:spcBef>
+                        <a:spcAft>
+                          <a:spcPts val="0"/>
+                        </a:spcAft>
+                        <a:buNone/>
+                      </a:pPr>
+                      <a:r>
+                        <a:rPr lang="en-US" sz="1800" dirty="0"/>
+                        <a:t>Run program</a:t>
+                      </a:r>
+                      <a:endParaRPr sz="1800" dirty="0"/>
+                    </a:p>
+                  </a:txBody>
+                  <a:tcPr marL="91425" marR="91425" marT="91425" marB="91425"/>
+                </a:tc>
+                <a:tc>
+                  <a:txBody>
+                    <a:bodyPr/>
+                    <a:lstStyle/>
+                    <a:p>
+                      <a:pPr marL="0" lvl="0" indent="0" algn="l" rtl="0">
+                        <a:spcBef>
+                          <a:spcPts val="0"/>
+                        </a:spcBef>
+                        <a:spcAft>
+                          <a:spcPts val="0"/>
+                        </a:spcAft>
+                        <a:buNone/>
+                      </a:pPr>
+                      <a:r>
+                        <a:rPr lang="en-US" sz="1800" dirty="0"/>
+                        <a:t>Enter p program prints pickup </a:t>
+                      </a:r>
+                    </a:p>
+                    <a:p>
+                      <a:pPr marL="0" lvl="0" indent="0" algn="l" rtl="0">
+                        <a:spcBef>
+                          <a:spcPts val="0"/>
+                        </a:spcBef>
+                        <a:spcAft>
+                          <a:spcPts val="0"/>
+                        </a:spcAft>
+                        <a:buNone/>
+                      </a:pPr>
+                      <a:r>
+                        <a:rPr lang="en-US" sz="1800" dirty="0"/>
+                        <a:t>Enter d program prints delivery</a:t>
+                      </a:r>
+                    </a:p>
+                    <a:p>
+                      <a:pPr marL="0" lvl="0" indent="0" algn="l" rtl="0">
+                        <a:spcBef>
+                          <a:spcPts val="0"/>
+                        </a:spcBef>
+                        <a:spcAft>
+                          <a:spcPts val="0"/>
+                        </a:spcAft>
+                        <a:buNone/>
+                      </a:pPr>
+                      <a:r>
+                        <a:rPr lang="en-US" sz="1800" dirty="0"/>
+                        <a:t>Enter invalid program prints error message</a:t>
+                      </a:r>
+                      <a:endParaRPr sz="1800" dirty="0"/>
+                    </a:p>
+                  </a:txBody>
+                  <a:tcPr marL="91425" marR="91425" marT="91425" marB="91425"/>
+                </a:tc>
+                <a:extLst>
+                  <a:ext uri="{0D108BD9-81ED-4DB2-BD59-A6C34878D82A}">
+                    <a16:rowId xmlns:a16="http://schemas.microsoft.com/office/drawing/2014/main" val="10001"/>
+                  </a:ext>
+                </a:extLst>
+              </a:tr>
+            </a:tbl>
+          </a:graphicData>
+        </a:graphic>
+      </p:graphicFrame>
+    </p:spTree>
+    <p:extLst>
+      <p:ext uri="{BB962C8B-B14F-4D97-AF65-F5344CB8AC3E}">
+        <p14:creationId xmlns:p14="http://schemas.microsoft.com/office/powerpoint/2010/main" val="355618526"/>
+      </p:ext>
+    </p:extLst>
+  </p:cSld>
+  <p:clrMapOvr>
+    <a:masterClrMapping/>
+  </p:clrMapOvr>
+</p:sld>
+</file>
+
+<file path=ppt/slides/slide12.xml><?xml version="1.0" encoding="utf-8"?>
+<p:sld xmlns:a="http://schemas.openxmlformats.org/drawingml/2006/main" xmlns:r="http://schemas.openxmlformats.org/officeDocument/2006/relationships" xmlns:p="http://schemas.openxmlformats.org/presentationml/2006/main">
+  <p:cSld>
+    <p:bg>
+      <p:bgPr>
+        <a:solidFill>
+          <a:srgbClr val="D9EAD3"/>
+        </a:solidFill>
+        <a:effectLst/>
+      </p:bgPr>
+    </p:bg>
+    <p:spTree>
+      <p:nvGrpSpPr>
+        <p:cNvPr id="1" name="Shape 72"/>
+        <p:cNvGrpSpPr/>
+        <p:nvPr/>
+      </p:nvGrpSpPr>
+      <p:grpSpPr>
+        <a:xfrm>
+          <a:off x="0" y="0"/>
+          <a:ext cx="0" cy="0"/>
+          <a:chOff x="0" y="0"/>
+          <a:chExt cx="0" cy="0"/>
+        </a:xfrm>
+      </p:grpSpPr>
+      <p:sp>
+        <p:nvSpPr>
+          <p:cNvPr id="73" name="Google Shape;73;p16"/>
+          <p:cNvSpPr txBox="1">
+            <a:spLocks noGrp="1"/>
+          </p:cNvSpPr>
+          <p:nvPr>
+            <p:ph type="title"/>
+          </p:nvPr>
+        </p:nvSpPr>
+        <p:spPr>
+          <a:xfrm>
+            <a:off x="311700" y="445025"/>
+            <a:ext cx="8520600" cy="572700"/>
+          </a:xfrm>
+          <a:prstGeom prst="rect">
+            <a:avLst/>
+          </a:prstGeom>
+        </p:spPr>
+        <p:txBody>
+          <a:bodyPr spcFirstLastPara="1" wrap="square" lIns="91425" tIns="91425" rIns="91425" bIns="91425" anchor="t" anchorCtr="0">
+            <a:noAutofit/>
+          </a:bodyPr>
+          <a:lstStyle/>
+          <a:p>
+            <a:pPr marL="0" lvl="0" indent="0" algn="l" rtl="0">
+              <a:spcBef>
+                <a:spcPts val="0"/>
+              </a:spcBef>
+              <a:spcAft>
+                <a:spcPts val="0"/>
+              </a:spcAft>
+              <a:buNone/>
+            </a:pPr>
+            <a:r>
+              <a:rPr lang="en" dirty="0"/>
+              <a:t>Component 2 (Trello screenshot)</a:t>
+            </a:r>
+            <a:endParaRPr dirty="0"/>
+          </a:p>
+        </p:txBody>
+      </p:sp>
+    </p:spTree>
+    <p:extLst>
+      <p:ext uri="{BB962C8B-B14F-4D97-AF65-F5344CB8AC3E}">
+        <p14:creationId xmlns:p14="http://schemas.microsoft.com/office/powerpoint/2010/main" val="4210859157"/>
+      </p:ext>
+    </p:extLst>
+  </p:cSld>
+  <p:clrMapOvr>
+    <a:masterClrMapping/>
+  </p:clrMapOvr>
+</p:sld>
+</file>
+
+<file path=ppt/slides/slide13.xml><?xml version="1.0" encoding="utf-8"?>
+<p:sld xmlns:a="http://schemas.openxmlformats.org/drawingml/2006/main" xmlns:r="http://schemas.openxmlformats.org/officeDocument/2006/relationships" xmlns:p="http://schemas.openxmlformats.org/presentationml/2006/main">
+  <p:cSld>
+    <p:spTree>
+      <p:nvGrpSpPr>
+        <p:cNvPr id="1" name="Shape 77"/>
+        <p:cNvGrpSpPr/>
+        <p:nvPr/>
+      </p:nvGrpSpPr>
+      <p:grpSpPr>
+        <a:xfrm>
+          <a:off x="0" y="0"/>
+          <a:ext cx="0" cy="0"/>
+          <a:chOff x="0" y="0"/>
+          <a:chExt cx="0" cy="0"/>
+        </a:xfrm>
+      </p:grpSpPr>
+      <p:sp>
+        <p:nvSpPr>
+          <p:cNvPr id="78" name="Google Shape;78;p17"/>
+          <p:cNvSpPr txBox="1">
+            <a:spLocks noGrp="1"/>
+          </p:cNvSpPr>
+          <p:nvPr>
+            <p:ph type="title"/>
+          </p:nvPr>
+        </p:nvSpPr>
+        <p:spPr>
+          <a:xfrm>
+            <a:off x="311700" y="445025"/>
+            <a:ext cx="8520600" cy="572700"/>
+          </a:xfrm>
+          <a:prstGeom prst="rect">
+            <a:avLst/>
+          </a:prstGeom>
+        </p:spPr>
+        <p:txBody>
+          <a:bodyPr spcFirstLastPara="1" wrap="square" lIns="91425" tIns="91425" rIns="91425" bIns="91425" anchor="t" anchorCtr="0">
+            <a:noAutofit/>
+          </a:bodyPr>
+          <a:lstStyle/>
+          <a:p>
+            <a:pPr marL="0" lvl="0" indent="0" algn="l" rtl="0">
+              <a:spcBef>
+                <a:spcPts val="0"/>
+              </a:spcBef>
+              <a:spcAft>
+                <a:spcPts val="0"/>
+              </a:spcAft>
+              <a:buNone/>
+            </a:pPr>
+            <a:r>
+              <a:rPr lang="en" dirty="0"/>
+              <a:t>Component 2 - Test Plan (?and screenshot)</a:t>
+            </a:r>
+            <a:endParaRPr dirty="0"/>
+          </a:p>
+        </p:txBody>
+      </p:sp>
+      <p:graphicFrame>
+        <p:nvGraphicFramePr>
+          <p:cNvPr id="79" name="Google Shape;79;p17"/>
+          <p:cNvGraphicFramePr/>
+          <p:nvPr/>
+        </p:nvGraphicFramePr>
+        <p:xfrm>
+          <a:off x="382475" y="1267725"/>
+          <a:ext cx="8520600" cy="914340"/>
+        </p:xfrm>
+        <a:graphic>
+          <a:graphicData uri="http://schemas.openxmlformats.org/drawingml/2006/table">
+            <a:tbl>
+              <a:tblPr>
+                <a:noFill/>
+                <a:tableStyleId>{E1099E06-0E6B-448D-9D27-60429F06E6F4}</a:tableStyleId>
+              </a:tblPr>
+              <a:tblGrid>
+                <a:gridCol w="4260300">
+                  <a:extLst>
+                    <a:ext uri="{9D8B030D-6E8A-4147-A177-3AD203B41FA5}">
+                      <a16:colId xmlns:a16="http://schemas.microsoft.com/office/drawing/2014/main" val="20000"/>
+                    </a:ext>
+                  </a:extLst>
+                </a:gridCol>
+                <a:gridCol w="4260300">
+                  <a:extLst>
+                    <a:ext uri="{9D8B030D-6E8A-4147-A177-3AD203B41FA5}">
+                      <a16:colId xmlns:a16="http://schemas.microsoft.com/office/drawing/2014/main" val="20001"/>
+                    </a:ext>
+                  </a:extLst>
+                </a:gridCol>
+              </a:tblGrid>
+              <a:tr h="381000">
+                <a:tc>
+                  <a:txBody>
+                    <a:bodyPr/>
+                    <a:lstStyle/>
+                    <a:p>
+                      <a:pPr marL="0" lvl="0" indent="0" algn="l" rtl="0">
+                        <a:spcBef>
+                          <a:spcPts val="0"/>
+                        </a:spcBef>
+                        <a:spcAft>
+                          <a:spcPts val="0"/>
+                        </a:spcAft>
+                        <a:buNone/>
+                      </a:pPr>
+                      <a:r>
+                        <a:rPr lang="en" sz="1800" b="1"/>
+                        <a:t>Test Case</a:t>
+                      </a:r>
+                      <a:endParaRPr sz="1800" b="1"/>
+                    </a:p>
+                  </a:txBody>
+                  <a:tcPr marL="91425" marR="91425" marT="91425" marB="91425">
+                    <a:solidFill>
+                      <a:srgbClr val="CCCCCC"/>
+                    </a:solidFill>
+                  </a:tcPr>
+                </a:tc>
+                <a:tc>
+                  <a:txBody>
+                    <a:bodyPr/>
+                    <a:lstStyle/>
+                    <a:p>
+                      <a:pPr marL="0" lvl="0" indent="0" algn="l" rtl="0">
+                        <a:spcBef>
+                          <a:spcPts val="0"/>
+                        </a:spcBef>
+                        <a:spcAft>
+                          <a:spcPts val="0"/>
+                        </a:spcAft>
+                        <a:buNone/>
+                      </a:pPr>
+                      <a:r>
+                        <a:rPr lang="en" sz="1800" b="1"/>
+                        <a:t>Expected Values</a:t>
+                      </a:r>
+                      <a:endParaRPr sz="1800" b="1"/>
+                    </a:p>
+                  </a:txBody>
+                  <a:tcPr marL="91425" marR="91425" marT="91425" marB="91425">
+                    <a:solidFill>
+                      <a:srgbClr val="CCCCCC"/>
+                    </a:solidFill>
+                  </a:tcPr>
+                </a:tc>
+                <a:extLst>
+                  <a:ext uri="{0D108BD9-81ED-4DB2-BD59-A6C34878D82A}">
+                    <a16:rowId xmlns:a16="http://schemas.microsoft.com/office/drawing/2014/main" val="10000"/>
+                  </a:ext>
+                </a:extLst>
+              </a:tr>
+              <a:tr h="396200">
+                <a:tc>
+                  <a:txBody>
+                    <a:bodyPr/>
+                    <a:lstStyle/>
+                    <a:p>
+                      <a:pPr marL="0" lvl="0" indent="0" algn="l" rtl="0">
+                        <a:spcBef>
+                          <a:spcPts val="0"/>
+                        </a:spcBef>
+                        <a:spcAft>
+                          <a:spcPts val="0"/>
+                        </a:spcAft>
+                        <a:buNone/>
+                      </a:pPr>
+                      <a:endParaRPr sz="1800"/>
+                    </a:p>
+                  </a:txBody>
+                  <a:tcPr marL="91425" marR="91425" marT="91425" marB="91425"/>
+                </a:tc>
+                <a:tc>
+                  <a:txBody>
+                    <a:bodyPr/>
+                    <a:lstStyle/>
+                    <a:p>
+                      <a:pPr marL="0" lvl="0" indent="0" algn="l" rtl="0">
+                        <a:spcBef>
+                          <a:spcPts val="0"/>
+                        </a:spcBef>
+                        <a:spcAft>
+                          <a:spcPts val="0"/>
+                        </a:spcAft>
+                        <a:buNone/>
+                      </a:pPr>
+                      <a:endParaRPr sz="1800"/>
+                    </a:p>
+                  </a:txBody>
+                  <a:tcPr marL="91425" marR="91425" marT="91425" marB="91425"/>
+                </a:tc>
+                <a:extLst>
+                  <a:ext uri="{0D108BD9-81ED-4DB2-BD59-A6C34878D82A}">
+                    <a16:rowId xmlns:a16="http://schemas.microsoft.com/office/drawing/2014/main" val="10001"/>
+                  </a:ext>
+                </a:extLst>
+              </a:tr>
+            </a:tbl>
+          </a:graphicData>
+        </a:graphic>
+      </p:graphicFrame>
+    </p:spTree>
+    <p:extLst>
+      <p:ext uri="{BB962C8B-B14F-4D97-AF65-F5344CB8AC3E}">
+        <p14:creationId xmlns:p14="http://schemas.microsoft.com/office/powerpoint/2010/main" val="2121840653"/>
+      </p:ext>
+    </p:extLst>
+  </p:cSld>
+  <p:clrMapOvr>
+    <a:masterClrMapping/>
+  </p:clrMapOvr>
+</p:sld>
+</file>
+
+<file path=ppt/slides/slide14.xml><?xml version="1.0" encoding="utf-8"?>
+<p:sld xmlns:a="http://schemas.openxmlformats.org/drawingml/2006/main" xmlns:r="http://schemas.openxmlformats.org/officeDocument/2006/relationships" xmlns:p="http://schemas.openxmlformats.org/presentationml/2006/main">
+  <p:cSld>
+    <p:bg>
+      <p:bgPr>
+        <a:solidFill>
+          <a:srgbClr val="D9EAD3"/>
+        </a:solidFill>
+        <a:effectLst/>
+      </p:bgPr>
+    </p:bg>
+    <p:spTree>
+      <p:nvGrpSpPr>
+        <p:cNvPr id="1" name="Shape 83"/>
+        <p:cNvGrpSpPr/>
+        <p:nvPr/>
+      </p:nvGrpSpPr>
+      <p:grpSpPr>
+        <a:xfrm>
+          <a:off x="0" y="0"/>
+          <a:ext cx="0" cy="0"/>
+          <a:chOff x="0" y="0"/>
+          <a:chExt cx="0" cy="0"/>
+        </a:xfrm>
+      </p:grpSpPr>
+      <p:sp>
+        <p:nvSpPr>
+          <p:cNvPr id="84" name="Google Shape;84;p18"/>
+          <p:cNvSpPr txBox="1">
+            <a:spLocks noGrp="1"/>
+          </p:cNvSpPr>
+          <p:nvPr>
+            <p:ph type="title"/>
+          </p:nvPr>
+        </p:nvSpPr>
+        <p:spPr>
+          <a:xfrm>
+            <a:off x="311700" y="445025"/>
+            <a:ext cx="8520600" cy="572700"/>
+          </a:xfrm>
+          <a:prstGeom prst="rect">
+            <a:avLst/>
+          </a:prstGeom>
+        </p:spPr>
+        <p:txBody>
+          <a:bodyPr spcFirstLastPara="1" wrap="square" lIns="91425" tIns="91425" rIns="91425" bIns="91425" anchor="t" anchorCtr="0">
+            <a:noAutofit/>
+          </a:bodyPr>
+          <a:lstStyle/>
+          <a:p>
+            <a:pPr marL="0" lvl="0" indent="0" algn="l" rtl="0">
+              <a:spcBef>
+                <a:spcPts val="0"/>
+              </a:spcBef>
+              <a:spcAft>
+                <a:spcPts val="0"/>
+              </a:spcAft>
+              <a:buNone/>
+            </a:pPr>
+            <a:r>
+              <a:rPr lang="en"/>
+              <a:t>Version Control Evidence</a:t>
+            </a:r>
+            <a:endParaRPr/>
+          </a:p>
+        </p:txBody>
+      </p:sp>
+      <p:sp>
+        <p:nvSpPr>
+          <p:cNvPr id="85" name="Google Shape;85;p18"/>
+          <p:cNvSpPr txBox="1">
+            <a:spLocks noGrp="1"/>
+          </p:cNvSpPr>
+          <p:nvPr>
+            <p:ph type="body" idx="1"/>
+          </p:nvPr>
+        </p:nvSpPr>
+        <p:spPr>
+          <a:xfrm>
+            <a:off x="311700" y="1152475"/>
+            <a:ext cx="8464200" cy="3739200"/>
+          </a:xfrm>
+          <a:prstGeom prst="rect">
+            <a:avLst/>
+          </a:prstGeom>
+        </p:spPr>
+        <p:txBody>
+          <a:bodyPr spcFirstLastPara="1" wrap="square" lIns="91425" tIns="91425" rIns="91425" bIns="91425" anchor="t" anchorCtr="0">
+            <a:noAutofit/>
+          </a:bodyPr>
+          <a:lstStyle/>
+          <a:p>
+            <a:pPr marL="0" lvl="0" indent="0" algn="l" rtl="0">
+              <a:spcBef>
+                <a:spcPts val="0"/>
+              </a:spcBef>
+              <a:spcAft>
+                <a:spcPts val="1600"/>
+              </a:spcAft>
+              <a:buNone/>
+            </a:pPr>
+            <a:r>
+              <a:rPr lang="en" i="1"/>
+              <a:t>Your version control evidence should go here.  This could be in the form of annotated screenshots which show you you managed this process or you could make a brief screencast explaining how you implemented version control.</a:t>
+            </a:r>
+            <a:endParaRPr i="1"/>
+          </a:p>
+        </p:txBody>
+      </p:sp>
+    </p:spTree>
+  </p:cSld>
+  <p:clrMapOvr>
+    <a:masterClrMapping/>
+  </p:clrMapOvr>
+</p:sld>
+</file>
+
+<file path=ppt/slides/slide15.xml><?xml version="1.0" encoding="utf-8"?>
+<p:sld xmlns:a="http://schemas.openxmlformats.org/drawingml/2006/main" xmlns:r="http://schemas.openxmlformats.org/officeDocument/2006/relationships" xmlns:p="http://schemas.openxmlformats.org/presentationml/2006/main">
+  <p:cSld>
     <p:bg>
       <p:bgPr>
         <a:solidFill>
@@ -8110,6 +9614,36 @@
           </a:p>
         </p:txBody>
       </p:sp>
+      <p:pic>
+        <p:nvPicPr>
+          <p:cNvPr id="3" name="Picture 2">
+            <a:extLst>
+              <a:ext uri="{FF2B5EF4-FFF2-40B4-BE49-F238E27FC236}">
+                <a16:creationId xmlns:a16="http://schemas.microsoft.com/office/drawing/2014/main" id="{52692193-D72F-4909-8902-56383AC326CE}"/>
+              </a:ext>
+            </a:extLst>
+          </p:cNvPr>
+          <p:cNvPicPr>
+            <a:picLocks noChangeAspect="1"/>
+          </p:cNvPicPr>
+          <p:nvPr/>
+        </p:nvPicPr>
+        <p:blipFill>
+          <a:blip r:embed="rId3"/>
+          <a:stretch>
+            <a:fillRect/>
+          </a:stretch>
+        </p:blipFill>
+        <p:spPr>
+          <a:xfrm>
+            <a:off x="410818" y="1197944"/>
+            <a:ext cx="8098823" cy="3771621"/>
+          </a:xfrm>
+          <a:prstGeom prst="rect">
+            <a:avLst/>
+          </a:prstGeom>
+        </p:spPr>
+      </p:pic>
     </p:spTree>
     <p:extLst>
       <p:ext uri="{BB962C8B-B14F-4D97-AF65-F5344CB8AC3E}">
@@ -8176,7 +9710,7 @@
             </a:pPr>
             <a:r>
               <a:rPr lang="en" dirty="0"/>
-              <a:t>Component 2 - Test Plan (?and screenshot)</a:t>
+              <a:t>Component 2 version 1 - Test Plan (?and screenshot)</a:t>
             </a:r>
             <a:endParaRPr dirty="0"/>
           </a:p>
@@ -8186,11 +9720,17 @@
         <p:nvGraphicFramePr>
           <p:cNvPr id="79" name="Google Shape;79;p17"/>
           <p:cNvGraphicFramePr/>
-          <p:nvPr/>
+          <p:nvPr>
+            <p:extLst>
+              <p:ext uri="{D42A27DB-BD31-4B8C-83A1-F6EECF244321}">
+                <p14:modId xmlns:p14="http://schemas.microsoft.com/office/powerpoint/2010/main" val="2736190381"/>
+              </p:ext>
+            </p:extLst>
+          </p:nvPr>
         </p:nvGraphicFramePr>
         <p:xfrm>
-          <a:off x="382475" y="1267725"/>
-          <a:ext cx="8520600" cy="914340"/>
+          <a:off x="311700" y="3433573"/>
+          <a:ext cx="8520600" cy="1462980"/>
         </p:xfrm>
         <a:graphic>
           <a:graphicData uri="http://schemas.openxmlformats.org/drawingml/2006/table">
@@ -8291,7 +9831,11 @@
                         </a:spcAft>
                         <a:buNone/>
                       </a:pPr>
-                      <a:endParaRPr sz="1800"/>
+                      <a:r>
+                        <a:rPr lang="en-US" sz="1800" dirty="0"/>
+                        <a:t>Run program</a:t>
+                      </a:r>
+                      <a:endParaRPr sz="1800" dirty="0"/>
                     </a:p>
                   </a:txBody>
                   <a:tcPr marL="91425" marR="91425" marT="91425" marB="91425"/>
@@ -8310,7 +9854,41 @@
                         </a:spcAft>
                         <a:buNone/>
                       </a:pPr>
-                      <a:endParaRPr sz="1800"/>
+                      <a:r>
+                        <a:rPr lang="en-US" sz="1800" dirty="0"/>
+                        <a:t>Enter p program prints pickup </a:t>
+                      </a:r>
+                    </a:p>
+                    <a:p>
+                      <a:pPr marL="0" lvl="0" indent="0" algn="l" rtl="0">
+                        <a:spcBef>
+                          <a:spcPts val="0"/>
+                        </a:spcBef>
+                        <a:spcAft>
+                          <a:spcPts val="0"/>
+                        </a:spcAft>
+                        <a:buNone/>
+                      </a:pPr>
+                      <a:r>
+                        <a:rPr lang="en-US" sz="1800" dirty="0"/>
+                        <a:t>Enter d program prints delivery</a:t>
+                      </a:r>
+                    </a:p>
+                    <a:p>
+                      <a:pPr marL="0" lvl="0" indent="0" algn="l" rtl="0">
+                        <a:spcBef>
+                          <a:spcPts val="0"/>
+                        </a:spcBef>
+                        <a:spcAft>
+                          <a:spcPts val="0"/>
+                        </a:spcAft>
+                        <a:buNone/>
+                      </a:pPr>
+                      <a:r>
+                        <a:rPr lang="en-US" sz="1800" dirty="0"/>
+                        <a:t>Enter invalid program stops</a:t>
+                      </a:r>
+                      <a:endParaRPr sz="1800" dirty="0"/>
                     </a:p>
                   </a:txBody>
                   <a:tcPr marL="91425" marR="91425" marT="91425" marB="91425"/>
@@ -8325,10 +9903,40 @@
           </a:graphicData>
         </a:graphic>
       </p:graphicFrame>
+      <p:pic>
+        <p:nvPicPr>
+          <p:cNvPr id="3" name="Picture 2">
+            <a:extLst>
+              <a:ext uri="{FF2B5EF4-FFF2-40B4-BE49-F238E27FC236}">
+                <a16:creationId xmlns:a16="http://schemas.microsoft.com/office/drawing/2014/main" id="{C194188A-17BC-4895-A3AD-339186BE31EC}"/>
+              </a:ext>
+            </a:extLst>
+          </p:cNvPr>
+          <p:cNvPicPr>
+            <a:picLocks noChangeAspect="1"/>
+          </p:cNvPicPr>
+          <p:nvPr/>
+        </p:nvPicPr>
+        <p:blipFill>
+          <a:blip r:embed="rId3"/>
+          <a:stretch>
+            <a:fillRect/>
+          </a:stretch>
+        </p:blipFill>
+        <p:spPr>
+          <a:xfrm>
+            <a:off x="2283516" y="1017725"/>
+            <a:ext cx="2669626" cy="2255562"/>
+          </a:xfrm>
+          <a:prstGeom prst="rect">
+            <a:avLst/>
+          </a:prstGeom>
+        </p:spPr>
+      </p:pic>
     </p:spTree>
     <p:extLst>
       <p:ext uri="{BB962C8B-B14F-4D97-AF65-F5344CB8AC3E}">
-        <p14:creationId xmlns:p14="http://schemas.microsoft.com/office/powerpoint/2010/main" val="2121840653"/>
+        <p14:creationId xmlns:p14="http://schemas.microsoft.com/office/powerpoint/2010/main" val="1610753565"/>
       </p:ext>
     </p:extLst>
   </p:cSld>
@@ -8341,17 +9949,9 @@
 <file path=ppt/slides/slide9.xml><?xml version="1.0" encoding="utf-8"?>
 <p:sld xmlns:a="http://schemas.openxmlformats.org/drawingml/2006/main" xmlns:r="http://schemas.openxmlformats.org/officeDocument/2006/relationships" xmlns:p="http://schemas.openxmlformats.org/presentationml/2006/main">
   <p:cSld>
-    <p:bg>
-      <p:bgPr>
-        <a:solidFill>
-          <a:srgbClr val="D9EAD3"/>
-        </a:solidFill>
-        <a:effectLst/>
-      </p:bgPr>
-    </p:bg>
     <p:spTree>
       <p:nvGrpSpPr>
-        <p:cNvPr id="1" name="Shape 83"/>
+        <p:cNvPr id="1" name="Shape 77"/>
         <p:cNvGrpSpPr/>
         <p:nvPr/>
       </p:nvGrpSpPr>
@@ -8365,7 +9965,7 @@
       </p:grpSpPr>
       <p:sp>
         <p:nvSpPr>
-          <p:cNvPr id="84" name="Google Shape;84;p18"/>
+          <p:cNvPr id="78" name="Google Shape;78;p17"/>
           <p:cNvSpPr txBox="1">
             <a:spLocks noGrp="1"/>
           </p:cNvSpPr>
@@ -8398,56 +9998,236 @@
               <a:buNone/>
             </a:pPr>
             <a:r>
-              <a:rPr lang="en"/>
-              <a:t>Version Control Evidence</a:t>
+              <a:rPr lang="en" dirty="0"/>
+              <a:t>Component 2 version 2 - Test Plan (?and screenshot)</a:t>
             </a:r>
-            <a:endParaRPr/>
+            <a:endParaRPr dirty="0"/>
           </a:p>
         </p:txBody>
       </p:sp>
-      <p:sp>
-        <p:nvSpPr>
-          <p:cNvPr id="85" name="Google Shape;85;p18"/>
-          <p:cNvSpPr txBox="1">
-            <a:spLocks noGrp="1"/>
-          </p:cNvSpPr>
+      <p:graphicFrame>
+        <p:nvGraphicFramePr>
+          <p:cNvPr id="79" name="Google Shape;79;p17"/>
+          <p:cNvGraphicFramePr/>
           <p:nvPr>
-            <p:ph type="body" idx="1"/>
+            <p:extLst>
+              <p:ext uri="{D42A27DB-BD31-4B8C-83A1-F6EECF244321}">
+                <p14:modId xmlns:p14="http://schemas.microsoft.com/office/powerpoint/2010/main" val="1775466017"/>
+              </p:ext>
+            </p:extLst>
           </p:nvPr>
-        </p:nvSpPr>
+        </p:nvGraphicFramePr>
+        <p:xfrm>
+          <a:off x="311700" y="3433573"/>
+          <a:ext cx="8520600" cy="1737300"/>
+        </p:xfrm>
+        <a:graphic>
+          <a:graphicData uri="http://schemas.openxmlformats.org/drawingml/2006/table">
+            <a:tbl>
+              <a:tblPr>
+                <a:noFill/>
+                <a:tableStyleId>{E1099E06-0E6B-448D-9D27-60429F06E6F4}</a:tableStyleId>
+              </a:tblPr>
+              <a:tblGrid>
+                <a:gridCol w="4260300">
+                  <a:extLst>
+                    <a:ext uri="{9D8B030D-6E8A-4147-A177-3AD203B41FA5}">
+                      <a16:colId xmlns:a16="http://schemas.microsoft.com/office/drawing/2014/main" val="20000"/>
+                    </a:ext>
+                  </a:extLst>
+                </a:gridCol>
+                <a:gridCol w="4260300">
+                  <a:extLst>
+                    <a:ext uri="{9D8B030D-6E8A-4147-A177-3AD203B41FA5}">
+                      <a16:colId xmlns:a16="http://schemas.microsoft.com/office/drawing/2014/main" val="20001"/>
+                    </a:ext>
+                  </a:extLst>
+                </a:gridCol>
+              </a:tblGrid>
+              <a:tr h="381000">
+                <a:tc>
+                  <a:txBody>
+                    <a:bodyPr/>
+                    <a:lstStyle/>
+                    <a:p>
+                      <a:pPr marL="0" lvl="0" indent="0" algn="l" rtl="0">
+                        <a:spcBef>
+                          <a:spcPts val="0"/>
+                        </a:spcBef>
+                        <a:spcAft>
+                          <a:spcPts val="0"/>
+                        </a:spcAft>
+                        <a:buNone/>
+                      </a:pPr>
+                      <a:r>
+                        <a:rPr lang="en" sz="1800" b="1"/>
+                        <a:t>Test Case</a:t>
+                      </a:r>
+                      <a:endParaRPr sz="1800" b="1"/>
+                    </a:p>
+                  </a:txBody>
+                  <a:tcPr marL="91425" marR="91425" marT="91425" marB="91425">
+                    <a:solidFill>
+                      <a:srgbClr val="CCCCCC"/>
+                    </a:solidFill>
+                  </a:tcPr>
+                </a:tc>
+                <a:tc>
+                  <a:txBody>
+                    <a:bodyPr/>
+                    <a:lstStyle/>
+                    <a:p>
+                      <a:pPr marL="0" lvl="0" indent="0" algn="l" rtl="0">
+                        <a:spcBef>
+                          <a:spcPts val="0"/>
+                        </a:spcBef>
+                        <a:spcAft>
+                          <a:spcPts val="0"/>
+                        </a:spcAft>
+                        <a:buNone/>
+                      </a:pPr>
+                      <a:r>
+                        <a:rPr lang="en" sz="1800" b="1"/>
+                        <a:t>Expected Values</a:t>
+                      </a:r>
+                      <a:endParaRPr sz="1800" b="1"/>
+                    </a:p>
+                  </a:txBody>
+                  <a:tcPr marL="91425" marR="91425" marT="91425" marB="91425">
+                    <a:solidFill>
+                      <a:srgbClr val="CCCCCC"/>
+                    </a:solidFill>
+                  </a:tcPr>
+                </a:tc>
+                <a:extLst>
+                  <a:ext uri="{0D108BD9-81ED-4DB2-BD59-A6C34878D82A}">
+                    <a16:rowId xmlns:a16="http://schemas.microsoft.com/office/drawing/2014/main" val="10000"/>
+                  </a:ext>
+                </a:extLst>
+              </a:tr>
+              <a:tr h="396200">
+                <a:tc>
+                  <a:txBody>
+                    <a:bodyPr/>
+                    <a:lstStyle/>
+                    <a:p>
+                      <a:pPr marL="0" lvl="0" indent="0" algn="l" rtl="0">
+                        <a:spcBef>
+                          <a:spcPts val="0"/>
+                        </a:spcBef>
+                        <a:spcAft>
+                          <a:spcPts val="0"/>
+                        </a:spcAft>
+                        <a:buNone/>
+                      </a:pPr>
+                      <a:r>
+                        <a:rPr lang="en-US" sz="1800" dirty="0"/>
+                        <a:t>Run program</a:t>
+                      </a:r>
+                      <a:endParaRPr sz="1800" dirty="0"/>
+                    </a:p>
+                  </a:txBody>
+                  <a:tcPr marL="91425" marR="91425" marT="91425" marB="91425"/>
+                </a:tc>
+                <a:tc>
+                  <a:txBody>
+                    <a:bodyPr/>
+                    <a:lstStyle/>
+                    <a:p>
+                      <a:pPr marL="0" lvl="0" indent="0" algn="l" rtl="0">
+                        <a:spcBef>
+                          <a:spcPts val="0"/>
+                        </a:spcBef>
+                        <a:spcAft>
+                          <a:spcPts val="0"/>
+                        </a:spcAft>
+                        <a:buNone/>
+                      </a:pPr>
+                      <a:r>
+                        <a:rPr lang="en-US" sz="1800" dirty="0"/>
+                        <a:t>Enter p program prints pickup </a:t>
+                      </a:r>
+                    </a:p>
+                    <a:p>
+                      <a:pPr marL="0" lvl="0" indent="0" algn="l" rtl="0">
+                        <a:spcBef>
+                          <a:spcPts val="0"/>
+                        </a:spcBef>
+                        <a:spcAft>
+                          <a:spcPts val="0"/>
+                        </a:spcAft>
+                        <a:buNone/>
+                      </a:pPr>
+                      <a:r>
+                        <a:rPr lang="en-US" sz="1800" dirty="0"/>
+                        <a:t>Enter d program prints delivery</a:t>
+                      </a:r>
+                    </a:p>
+                    <a:p>
+                      <a:pPr marL="0" lvl="0" indent="0" algn="l" rtl="0">
+                        <a:spcBef>
+                          <a:spcPts val="0"/>
+                        </a:spcBef>
+                        <a:spcAft>
+                          <a:spcPts val="0"/>
+                        </a:spcAft>
+                        <a:buNone/>
+                      </a:pPr>
+                      <a:r>
+                        <a:rPr lang="en-US" sz="1800" dirty="0"/>
+                        <a:t>Enter invalid program prints error message</a:t>
+                      </a:r>
+                      <a:endParaRPr sz="1800" dirty="0"/>
+                    </a:p>
+                  </a:txBody>
+                  <a:tcPr marL="91425" marR="91425" marT="91425" marB="91425"/>
+                </a:tc>
+                <a:extLst>
+                  <a:ext uri="{0D108BD9-81ED-4DB2-BD59-A6C34878D82A}">
+                    <a16:rowId xmlns:a16="http://schemas.microsoft.com/office/drawing/2014/main" val="10001"/>
+                  </a:ext>
+                </a:extLst>
+              </a:tr>
+            </a:tbl>
+          </a:graphicData>
+        </a:graphic>
+      </p:graphicFrame>
+      <p:pic>
+        <p:nvPicPr>
+          <p:cNvPr id="4" name="Picture 3">
+            <a:extLst>
+              <a:ext uri="{FF2B5EF4-FFF2-40B4-BE49-F238E27FC236}">
+                <a16:creationId xmlns:a16="http://schemas.microsoft.com/office/drawing/2014/main" id="{A81A5C77-67E9-4621-A23C-14F7C079BBB7}"/>
+              </a:ext>
+            </a:extLst>
+          </p:cNvPr>
+          <p:cNvPicPr>
+            <a:picLocks noChangeAspect="1"/>
+          </p:cNvPicPr>
+          <p:nvPr/>
+        </p:nvPicPr>
+        <p:blipFill>
+          <a:blip r:embed="rId3"/>
+          <a:stretch>
+            <a:fillRect/>
+          </a:stretch>
+        </p:blipFill>
         <p:spPr>
           <a:xfrm>
-            <a:off x="311700" y="1152475"/>
-            <a:ext cx="8464200" cy="3739200"/>
+            <a:off x="2785825" y="1089226"/>
+            <a:ext cx="2687323" cy="2121821"/>
           </a:xfrm>
           <a:prstGeom prst="rect">
             <a:avLst/>
           </a:prstGeom>
         </p:spPr>
-        <p:txBody>
-          <a:bodyPr spcFirstLastPara="1" wrap="square" lIns="91425" tIns="91425" rIns="91425" bIns="91425" anchor="t" anchorCtr="0">
-            <a:noAutofit/>
-          </a:bodyPr>
-          <a:lstStyle/>
-          <a:p>
-            <a:pPr marL="0" lvl="0" indent="0" algn="l" rtl="0">
-              <a:spcBef>
-                <a:spcPts val="0"/>
-              </a:spcBef>
-              <a:spcAft>
-                <a:spcPts val="1600"/>
-              </a:spcAft>
-              <a:buNone/>
-            </a:pPr>
-            <a:r>
-              <a:rPr lang="en" i="1"/>
-              <a:t>Your version control evidence should go here.  This could be in the form of annotated screenshots which show you you managed this process or you could make a brief screencast explaining how you implemented version control.</a:t>
-            </a:r>
-            <a:endParaRPr i="1"/>
-          </a:p>
-        </p:txBody>
-      </p:sp>
+      </p:pic>
     </p:spTree>
+    <p:extLst>
+      <p:ext uri="{BB962C8B-B14F-4D97-AF65-F5344CB8AC3E}">
+        <p14:creationId xmlns:p14="http://schemas.microsoft.com/office/powerpoint/2010/main" val="877091840"/>
+      </p:ext>
+    </p:extLst>
   </p:cSld>
   <p:clrMapOvr>
     <a:masterClrMapping/>

</xml_diff>

<commit_message>
Added customer details dictionary
Added a dictionary to store customer details
Name
Phone
</commit_message>
<xml_diff>
--- a/022_91893+_+91897+Documentation.pptx
+++ b/022_91893+_+91897+Documentation.pptx
@@ -5,7 +5,7 @@
     <p:sldMasterId id="2147483659" r:id="rId1"/>
   </p:sldMasterIdLst>
   <p:notesMasterIdLst>
-    <p:notesMasterId r:id="rId21"/>
+    <p:notesMasterId r:id="rId23"/>
   </p:notesMasterIdLst>
   <p:sldIdLst>
     <p:sldId id="256" r:id="rId2"/>
@@ -25,8 +25,10 @@
     <p:sldId id="264" r:id="rId16"/>
     <p:sldId id="274" r:id="rId17"/>
     <p:sldId id="273" r:id="rId18"/>
-    <p:sldId id="261" r:id="rId19"/>
-    <p:sldId id="262" r:id="rId20"/>
+    <p:sldId id="276" r:id="rId19"/>
+    <p:sldId id="275" r:id="rId20"/>
+    <p:sldId id="261" r:id="rId21"/>
+    <p:sldId id="262" r:id="rId22"/>
   </p:sldIdLst>
   <p:sldSz cx="9144000" cy="5143500" type="screen16x9"/>
   <p:notesSz cx="6858000" cy="9144000"/>
@@ -1752,7 +1754,7 @@
   <p:cSld>
     <p:spTree>
       <p:nvGrpSpPr>
-        <p:cNvPr id="1" name="Shape 80"/>
+        <p:cNvPr id="1" name="Shape 69"/>
         <p:cNvGrpSpPr/>
         <p:nvPr/>
       </p:nvGrpSpPr>
@@ -1766,7 +1768,7 @@
       </p:grpSpPr>
       <p:sp>
         <p:nvSpPr>
-          <p:cNvPr id="81" name="Google Shape;81;gac10fef634_0_25:notes"/>
+          <p:cNvPr id="70" name="Google Shape;70;gac10fef634_0_16:notes"/>
           <p:cNvSpPr>
             <a:spLocks noGrp="1" noRot="1" noChangeAspect="1"/>
           </p:cNvSpPr>
@@ -1807,7 +1809,7 @@
       </p:sp>
       <p:sp>
         <p:nvSpPr>
-          <p:cNvPr id="82" name="Google Shape;82;gac10fef634_0_25:notes"/>
+          <p:cNvPr id="71" name="Google Shape;71;gac10fef634_0_16:notes"/>
           <p:cNvSpPr txBox="1">
             <a:spLocks noGrp="1"/>
           </p:cNvSpPr>
@@ -1837,27 +1839,6 @@
               <a:spcAft>
                 <a:spcPts val="0"/>
               </a:spcAft>
-              <a:buClr>
-                <a:schemeClr val="dk1"/>
-              </a:buClr>
-              <a:buSzPts val="1100"/>
-              <a:buFont typeface="Arial"/>
-              <a:buNone/>
-            </a:pPr>
-            <a:r>
-              <a:rPr lang="en"/>
-              <a:t>Your version control evidence should go here.  This could be in the form of annotated screenshots which show you you managed this process or you could make a brief screencast explaining how you implemented version control.</a:t>
-            </a:r>
-            <a:endParaRPr/>
-          </a:p>
-          <a:p>
-            <a:pPr marL="0" lvl="0" indent="0" algn="l" rtl="0">
-              <a:spcBef>
-                <a:spcPts val="0"/>
-              </a:spcBef>
-              <a:spcAft>
-                <a:spcPts val="0"/>
-              </a:spcAft>
               <a:buNone/>
             </a:pPr>
             <a:endParaRPr/>
@@ -1865,6 +1846,11 @@
         </p:txBody>
       </p:sp>
     </p:spTree>
+    <p:extLst>
+      <p:ext uri="{BB962C8B-B14F-4D97-AF65-F5344CB8AC3E}">
+        <p14:creationId xmlns:p14="http://schemas.microsoft.com/office/powerpoint/2010/main" val="3707784998"/>
+      </p:ext>
+    </p:extLst>
   </p:cSld>
   <p:clrMapOvr>
     <a:masterClrMapping/>
@@ -1877,7 +1863,7 @@
   <p:cSld>
     <p:spTree>
       <p:nvGrpSpPr>
-        <p:cNvPr id="1" name="Shape 86"/>
+        <p:cNvPr id="1" name="Shape 74"/>
         <p:cNvGrpSpPr/>
         <p:nvPr/>
       </p:nvGrpSpPr>
@@ -1891,7 +1877,7 @@
       </p:grpSpPr>
       <p:sp>
         <p:nvSpPr>
-          <p:cNvPr id="87" name="Google Shape;87;gac10fef634_0_30:notes"/>
+          <p:cNvPr id="75" name="Google Shape;75;gac10fef634_0_20:notes"/>
           <p:cNvSpPr>
             <a:spLocks noGrp="1" noRot="1" noChangeAspect="1"/>
           </p:cNvSpPr>
@@ -1932,7 +1918,7 @@
       </p:sp>
       <p:sp>
         <p:nvSpPr>
-          <p:cNvPr id="88" name="Google Shape;88;gac10fef634_0_30:notes"/>
+          <p:cNvPr id="76" name="Google Shape;76;gac10fef634_0_20:notes"/>
           <p:cNvSpPr txBox="1">
             <a:spLocks noGrp="1"/>
           </p:cNvSpPr>
@@ -1964,15 +1950,16 @@
               </a:spcAft>
               <a:buNone/>
             </a:pPr>
-            <a:r>
-              <a:rPr lang="en"/>
-              <a:t>Discusses how the information from planning, testing and trialling of components assisted in the development of a high-quality outcome</a:t>
-            </a:r>
             <a:endParaRPr/>
           </a:p>
         </p:txBody>
       </p:sp>
     </p:spTree>
+    <p:extLst>
+      <p:ext uri="{BB962C8B-B14F-4D97-AF65-F5344CB8AC3E}">
+        <p14:creationId xmlns:p14="http://schemas.microsoft.com/office/powerpoint/2010/main" val="3345766261"/>
+      </p:ext>
+    </p:extLst>
   </p:cSld>
   <p:clrMapOvr>
     <a:masterClrMapping/>
@@ -2075,6 +2062,239 @@
             <a:r>
               <a:rPr lang="en"/>
               <a:t>Explain the relevant implications here.  Then as you work, develop your code, discuss how the implications are being met.</a:t>
+            </a:r>
+            <a:endParaRPr/>
+          </a:p>
+        </p:txBody>
+      </p:sp>
+    </p:spTree>
+  </p:cSld>
+  <p:clrMapOvr>
+    <a:masterClrMapping/>
+  </p:clrMapOvr>
+</p:notes>
+</file>
+
+<file path=ppt/notesSlides/notesSlide20.xml><?xml version="1.0" encoding="utf-8"?>
+<p:notes xmlns:a="http://schemas.openxmlformats.org/drawingml/2006/main" xmlns:r="http://schemas.openxmlformats.org/officeDocument/2006/relationships" xmlns:p="http://schemas.openxmlformats.org/presentationml/2006/main" showMasterSp="0" showMasterPhAnim="0">
+  <p:cSld>
+    <p:spTree>
+      <p:nvGrpSpPr>
+        <p:cNvPr id="1" name="Shape 80"/>
+        <p:cNvGrpSpPr/>
+        <p:nvPr/>
+      </p:nvGrpSpPr>
+      <p:grpSpPr>
+        <a:xfrm>
+          <a:off x="0" y="0"/>
+          <a:ext cx="0" cy="0"/>
+          <a:chOff x="0" y="0"/>
+          <a:chExt cx="0" cy="0"/>
+        </a:xfrm>
+      </p:grpSpPr>
+      <p:sp>
+        <p:nvSpPr>
+          <p:cNvPr id="81" name="Google Shape;81;gac10fef634_0_25:notes"/>
+          <p:cNvSpPr>
+            <a:spLocks noGrp="1" noRot="1" noChangeAspect="1"/>
+          </p:cNvSpPr>
+          <p:nvPr>
+            <p:ph type="sldImg" idx="2"/>
+          </p:nvPr>
+        </p:nvSpPr>
+        <p:spPr>
+          <a:xfrm>
+            <a:off x="381000" y="685800"/>
+            <a:ext cx="6096000" cy="3429000"/>
+          </a:xfrm>
+          <a:custGeom>
+            <a:avLst/>
+            <a:gdLst/>
+            <a:ahLst/>
+            <a:cxnLst/>
+            <a:rect l="l" t="t" r="r" b="b"/>
+            <a:pathLst>
+              <a:path w="120000" h="120000" extrusionOk="0">
+                <a:moveTo>
+                  <a:pt x="0" y="0"/>
+                </a:moveTo>
+                <a:lnTo>
+                  <a:pt x="120000" y="0"/>
+                </a:lnTo>
+                <a:lnTo>
+                  <a:pt x="120000" y="120000"/>
+                </a:lnTo>
+                <a:lnTo>
+                  <a:pt x="0" y="120000"/>
+                </a:lnTo>
+                <a:close/>
+              </a:path>
+            </a:pathLst>
+          </a:custGeom>
+        </p:spPr>
+      </p:sp>
+      <p:sp>
+        <p:nvSpPr>
+          <p:cNvPr id="82" name="Google Shape;82;gac10fef634_0_25:notes"/>
+          <p:cNvSpPr txBox="1">
+            <a:spLocks noGrp="1"/>
+          </p:cNvSpPr>
+          <p:nvPr>
+            <p:ph type="body" idx="1"/>
+          </p:nvPr>
+        </p:nvSpPr>
+        <p:spPr>
+          <a:xfrm>
+            <a:off x="685800" y="4343400"/>
+            <a:ext cx="5486400" cy="4114800"/>
+          </a:xfrm>
+          <a:prstGeom prst="rect">
+            <a:avLst/>
+          </a:prstGeom>
+        </p:spPr>
+        <p:txBody>
+          <a:bodyPr spcFirstLastPara="1" wrap="square" lIns="91425" tIns="91425" rIns="91425" bIns="91425" anchor="t" anchorCtr="0">
+            <a:noAutofit/>
+          </a:bodyPr>
+          <a:lstStyle/>
+          <a:p>
+            <a:pPr marL="0" lvl="0" indent="0" algn="l" rtl="0">
+              <a:spcBef>
+                <a:spcPts val="0"/>
+              </a:spcBef>
+              <a:spcAft>
+                <a:spcPts val="0"/>
+              </a:spcAft>
+              <a:buClr>
+                <a:schemeClr val="dk1"/>
+              </a:buClr>
+              <a:buSzPts val="1100"/>
+              <a:buFont typeface="Arial"/>
+              <a:buNone/>
+            </a:pPr>
+            <a:r>
+              <a:rPr lang="en"/>
+              <a:t>Your version control evidence should go here.  This could be in the form of annotated screenshots which show you you managed this process or you could make a brief screencast explaining how you implemented version control.</a:t>
+            </a:r>
+            <a:endParaRPr/>
+          </a:p>
+          <a:p>
+            <a:pPr marL="0" lvl="0" indent="0" algn="l" rtl="0">
+              <a:spcBef>
+                <a:spcPts val="0"/>
+              </a:spcBef>
+              <a:spcAft>
+                <a:spcPts val="0"/>
+              </a:spcAft>
+              <a:buNone/>
+            </a:pPr>
+            <a:endParaRPr/>
+          </a:p>
+        </p:txBody>
+      </p:sp>
+    </p:spTree>
+  </p:cSld>
+  <p:clrMapOvr>
+    <a:masterClrMapping/>
+  </p:clrMapOvr>
+</p:notes>
+</file>
+
+<file path=ppt/notesSlides/notesSlide21.xml><?xml version="1.0" encoding="utf-8"?>
+<p:notes xmlns:a="http://schemas.openxmlformats.org/drawingml/2006/main" xmlns:r="http://schemas.openxmlformats.org/officeDocument/2006/relationships" xmlns:p="http://schemas.openxmlformats.org/presentationml/2006/main" showMasterSp="0" showMasterPhAnim="0">
+  <p:cSld>
+    <p:spTree>
+      <p:nvGrpSpPr>
+        <p:cNvPr id="1" name="Shape 86"/>
+        <p:cNvGrpSpPr/>
+        <p:nvPr/>
+      </p:nvGrpSpPr>
+      <p:grpSpPr>
+        <a:xfrm>
+          <a:off x="0" y="0"/>
+          <a:ext cx="0" cy="0"/>
+          <a:chOff x="0" y="0"/>
+          <a:chExt cx="0" cy="0"/>
+        </a:xfrm>
+      </p:grpSpPr>
+      <p:sp>
+        <p:nvSpPr>
+          <p:cNvPr id="87" name="Google Shape;87;gac10fef634_0_30:notes"/>
+          <p:cNvSpPr>
+            <a:spLocks noGrp="1" noRot="1" noChangeAspect="1"/>
+          </p:cNvSpPr>
+          <p:nvPr>
+            <p:ph type="sldImg" idx="2"/>
+          </p:nvPr>
+        </p:nvSpPr>
+        <p:spPr>
+          <a:xfrm>
+            <a:off x="381000" y="685800"/>
+            <a:ext cx="6096000" cy="3429000"/>
+          </a:xfrm>
+          <a:custGeom>
+            <a:avLst/>
+            <a:gdLst/>
+            <a:ahLst/>
+            <a:cxnLst/>
+            <a:rect l="l" t="t" r="r" b="b"/>
+            <a:pathLst>
+              <a:path w="120000" h="120000" extrusionOk="0">
+                <a:moveTo>
+                  <a:pt x="0" y="0"/>
+                </a:moveTo>
+                <a:lnTo>
+                  <a:pt x="120000" y="0"/>
+                </a:lnTo>
+                <a:lnTo>
+                  <a:pt x="120000" y="120000"/>
+                </a:lnTo>
+                <a:lnTo>
+                  <a:pt x="0" y="120000"/>
+                </a:lnTo>
+                <a:close/>
+              </a:path>
+            </a:pathLst>
+          </a:custGeom>
+        </p:spPr>
+      </p:sp>
+      <p:sp>
+        <p:nvSpPr>
+          <p:cNvPr id="88" name="Google Shape;88;gac10fef634_0_30:notes"/>
+          <p:cNvSpPr txBox="1">
+            <a:spLocks noGrp="1"/>
+          </p:cNvSpPr>
+          <p:nvPr>
+            <p:ph type="body" idx="1"/>
+          </p:nvPr>
+        </p:nvSpPr>
+        <p:spPr>
+          <a:xfrm>
+            <a:off x="685800" y="4343400"/>
+            <a:ext cx="5486400" cy="4114800"/>
+          </a:xfrm>
+          <a:prstGeom prst="rect">
+            <a:avLst/>
+          </a:prstGeom>
+        </p:spPr>
+        <p:txBody>
+          <a:bodyPr spcFirstLastPara="1" wrap="square" lIns="91425" tIns="91425" rIns="91425" bIns="91425" anchor="t" anchorCtr="0">
+            <a:noAutofit/>
+          </a:bodyPr>
+          <a:lstStyle/>
+          <a:p>
+            <a:pPr marL="0" lvl="0" indent="0" algn="l" rtl="0">
+              <a:spcBef>
+                <a:spcPts val="0"/>
+              </a:spcBef>
+              <a:spcAft>
+                <a:spcPts val="0"/>
+              </a:spcAft>
+              <a:buNone/>
+            </a:pPr>
+            <a:r>
+              <a:rPr lang="en"/>
+              <a:t>Discusses how the information from planning, testing and trialling of components assisted in the development of a high-quality outcome</a:t>
             </a:r>
             <a:endParaRPr/>
           </a:p>
@@ -10054,7 +10274,7 @@
     </p:bg>
     <p:spTree>
       <p:nvGrpSpPr>
-        <p:cNvPr id="1" name="Shape 83"/>
+        <p:cNvPr id="1" name="Shape 72"/>
         <p:cNvGrpSpPr/>
         <p:nvPr/>
       </p:nvGrpSpPr>
@@ -10068,7 +10288,7 @@
       </p:grpSpPr>
       <p:sp>
         <p:nvSpPr>
-          <p:cNvPr id="84" name="Google Shape;84;p18"/>
+          <p:cNvPr id="73" name="Google Shape;73;p16"/>
           <p:cNvSpPr txBox="1">
             <a:spLocks noGrp="1"/>
           </p:cNvSpPr>
@@ -10101,56 +10321,49 @@
               <a:buNone/>
             </a:pPr>
             <a:r>
-              <a:rPr lang="en"/>
-              <a:t>Version Control Evidence</a:t>
+              <a:rPr lang="en" dirty="0"/>
+              <a:t>Component 3 Pickup info v3 (Trello screenshot)</a:t>
             </a:r>
-            <a:endParaRPr/>
+            <a:endParaRPr dirty="0"/>
           </a:p>
         </p:txBody>
       </p:sp>
-      <p:sp>
-        <p:nvSpPr>
-          <p:cNvPr id="85" name="Google Shape;85;p18"/>
-          <p:cNvSpPr txBox="1">
-            <a:spLocks noGrp="1"/>
-          </p:cNvSpPr>
-          <p:nvPr>
-            <p:ph type="body" idx="1"/>
-          </p:nvPr>
-        </p:nvSpPr>
+      <p:pic>
+        <p:nvPicPr>
+          <p:cNvPr id="3" name="Picture 2">
+            <a:extLst>
+              <a:ext uri="{FF2B5EF4-FFF2-40B4-BE49-F238E27FC236}">
+                <a16:creationId xmlns:a16="http://schemas.microsoft.com/office/drawing/2014/main" id="{95B79D25-ACBD-496C-8ED3-C67784896CED}"/>
+              </a:ext>
+            </a:extLst>
+          </p:cNvPr>
+          <p:cNvPicPr>
+            <a:picLocks noChangeAspect="1"/>
+          </p:cNvPicPr>
+          <p:nvPr/>
+        </p:nvPicPr>
+        <p:blipFill>
+          <a:blip r:embed="rId3"/>
+          <a:stretch>
+            <a:fillRect/>
+          </a:stretch>
+        </p:blipFill>
         <p:spPr>
           <a:xfrm>
-            <a:off x="311700" y="1152475"/>
-            <a:ext cx="8464200" cy="3739200"/>
+            <a:off x="980660" y="1017725"/>
+            <a:ext cx="6626087" cy="3371167"/>
           </a:xfrm>
           <a:prstGeom prst="rect">
             <a:avLst/>
           </a:prstGeom>
         </p:spPr>
-        <p:txBody>
-          <a:bodyPr spcFirstLastPara="1" wrap="square" lIns="91425" tIns="91425" rIns="91425" bIns="91425" anchor="t" anchorCtr="0">
-            <a:noAutofit/>
-          </a:bodyPr>
-          <a:lstStyle/>
-          <a:p>
-            <a:pPr marL="0" lvl="0" indent="0" algn="l" rtl="0">
-              <a:spcBef>
-                <a:spcPts val="0"/>
-              </a:spcBef>
-              <a:spcAft>
-                <a:spcPts val="1600"/>
-              </a:spcAft>
-              <a:buNone/>
-            </a:pPr>
-            <a:r>
-              <a:rPr lang="en" i="1"/>
-              <a:t>Your version control evidence should go here.  This could be in the form of annotated screenshots which show you you managed this process or you could make a brief screencast explaining how you implemented version control.</a:t>
-            </a:r>
-            <a:endParaRPr i="1"/>
-          </a:p>
-        </p:txBody>
-      </p:sp>
+      </p:pic>
     </p:spTree>
+    <p:extLst>
+      <p:ext uri="{BB962C8B-B14F-4D97-AF65-F5344CB8AC3E}">
+        <p14:creationId xmlns:p14="http://schemas.microsoft.com/office/powerpoint/2010/main" val="3041130741"/>
+      </p:ext>
+    </p:extLst>
   </p:cSld>
   <p:clrMapOvr>
     <a:masterClrMapping/>
@@ -10161,17 +10374,9 @@
 <file path=ppt/slides/slide19.xml><?xml version="1.0" encoding="utf-8"?>
 <p:sld xmlns:a="http://schemas.openxmlformats.org/drawingml/2006/main" xmlns:r="http://schemas.openxmlformats.org/officeDocument/2006/relationships" xmlns:p="http://schemas.openxmlformats.org/presentationml/2006/main">
   <p:cSld>
-    <p:bg>
-      <p:bgPr>
-        <a:solidFill>
-          <a:srgbClr val="FFE599"/>
-        </a:solidFill>
-        <a:effectLst/>
-      </p:bgPr>
-    </p:bg>
     <p:spTree>
       <p:nvGrpSpPr>
-        <p:cNvPr id="1" name="Shape 89"/>
+        <p:cNvPr id="1" name="Shape 77"/>
         <p:cNvGrpSpPr/>
         <p:nvPr/>
       </p:nvGrpSpPr>
@@ -10185,18 +10390,18 @@
       </p:grpSpPr>
       <p:sp>
         <p:nvSpPr>
-          <p:cNvPr id="90" name="Google Shape;90;p19"/>
+          <p:cNvPr id="78" name="Google Shape;78;p17"/>
           <p:cNvSpPr txBox="1">
             <a:spLocks noGrp="1"/>
           </p:cNvSpPr>
           <p:nvPr>
-            <p:ph type="body" idx="1"/>
+            <p:ph type="title"/>
           </p:nvPr>
         </p:nvSpPr>
         <p:spPr>
           <a:xfrm>
-            <a:off x="311700" y="397700"/>
-            <a:ext cx="8520600" cy="4171200"/>
+            <a:off x="311700" y="445025"/>
+            <a:ext cx="8520600" cy="572700"/>
           </a:xfrm>
           <a:prstGeom prst="rect">
             <a:avLst/>
@@ -10213,23 +10418,295 @@
                 <a:spcPts val="0"/>
               </a:spcBef>
               <a:spcAft>
-                <a:spcPts val="1600"/>
+                <a:spcPts val="0"/>
               </a:spcAft>
               <a:buNone/>
             </a:pPr>
             <a:r>
-              <a:rPr lang="en" b="1" i="1">
-                <a:solidFill>
-                  <a:srgbClr val="595959"/>
-                </a:solidFill>
-              </a:rPr>
-              <a:t>Discusses how the information from planning, testing and trialling of components assisted in the development of a high-quality outcome</a:t>
+              <a:rPr lang="en" dirty="0"/>
+              <a:t>Component 3 v3 - Test Plan (?and screenshot)</a:t>
             </a:r>
-            <a:endParaRPr/>
+            <a:endParaRPr dirty="0"/>
           </a:p>
         </p:txBody>
       </p:sp>
+      <p:graphicFrame>
+        <p:nvGraphicFramePr>
+          <p:cNvPr id="79" name="Google Shape;79;p17"/>
+          <p:cNvGraphicFramePr/>
+          <p:nvPr/>
+        </p:nvGraphicFramePr>
+        <p:xfrm>
+          <a:off x="311700" y="3639864"/>
+          <a:ext cx="8520600" cy="1493460"/>
+        </p:xfrm>
+        <a:graphic>
+          <a:graphicData uri="http://schemas.openxmlformats.org/drawingml/2006/table">
+            <a:tbl>
+              <a:tblPr>
+                <a:noFill/>
+                <a:tableStyleId>{E1099E06-0E6B-448D-9D27-60429F06E6F4}</a:tableStyleId>
+              </a:tblPr>
+              <a:tblGrid>
+                <a:gridCol w="4260300">
+                  <a:extLst>
+                    <a:ext uri="{9D8B030D-6E8A-4147-A177-3AD203B41FA5}">
+                      <a16:colId xmlns:a16="http://schemas.microsoft.com/office/drawing/2014/main" val="20000"/>
+                    </a:ext>
+                  </a:extLst>
+                </a:gridCol>
+                <a:gridCol w="4260300">
+                  <a:extLst>
+                    <a:ext uri="{9D8B030D-6E8A-4147-A177-3AD203B41FA5}">
+                      <a16:colId xmlns:a16="http://schemas.microsoft.com/office/drawing/2014/main" val="20001"/>
+                    </a:ext>
+                  </a:extLst>
+                </a:gridCol>
+              </a:tblGrid>
+              <a:tr h="381000">
+                <a:tc>
+                  <a:txBody>
+                    <a:bodyPr/>
+                    <a:lstStyle/>
+                    <a:p>
+                      <a:pPr marL="0" lvl="0" indent="0" algn="l" rtl="0">
+                        <a:spcBef>
+                          <a:spcPts val="0"/>
+                        </a:spcBef>
+                        <a:spcAft>
+                          <a:spcPts val="0"/>
+                        </a:spcAft>
+                        <a:buNone/>
+                      </a:pPr>
+                      <a:r>
+                        <a:rPr lang="en" sz="1800" b="1"/>
+                        <a:t>Test Case</a:t>
+                      </a:r>
+                      <a:endParaRPr sz="1800" b="1"/>
+                    </a:p>
+                  </a:txBody>
+                  <a:tcPr marL="91425" marR="91425" marT="91425" marB="91425">
+                    <a:solidFill>
+                      <a:srgbClr val="CCCCCC"/>
+                    </a:solidFill>
+                  </a:tcPr>
+                </a:tc>
+                <a:tc>
+                  <a:txBody>
+                    <a:bodyPr/>
+                    <a:lstStyle/>
+                    <a:p>
+                      <a:pPr marL="0" lvl="0" indent="0" algn="l" rtl="0">
+                        <a:spcBef>
+                          <a:spcPts val="0"/>
+                        </a:spcBef>
+                        <a:spcAft>
+                          <a:spcPts val="0"/>
+                        </a:spcAft>
+                        <a:buNone/>
+                      </a:pPr>
+                      <a:r>
+                        <a:rPr lang="en" sz="1800" b="1"/>
+                        <a:t>Expected Values</a:t>
+                      </a:r>
+                      <a:endParaRPr sz="1800" b="1"/>
+                    </a:p>
+                  </a:txBody>
+                  <a:tcPr marL="91425" marR="91425" marT="91425" marB="91425">
+                    <a:solidFill>
+                      <a:srgbClr val="CCCCCC"/>
+                    </a:solidFill>
+                  </a:tcPr>
+                </a:tc>
+                <a:extLst>
+                  <a:ext uri="{0D108BD9-81ED-4DB2-BD59-A6C34878D82A}">
+                    <a16:rowId xmlns:a16="http://schemas.microsoft.com/office/drawing/2014/main" val="10000"/>
+                  </a:ext>
+                </a:extLst>
+              </a:tr>
+              <a:tr h="396200">
+                <a:tc>
+                  <a:txBody>
+                    <a:bodyPr/>
+                    <a:lstStyle/>
+                    <a:p>
+                      <a:pPr marL="0" lvl="0" indent="0" algn="l" rtl="0">
+                        <a:spcBef>
+                          <a:spcPts val="0"/>
+                        </a:spcBef>
+                        <a:spcAft>
+                          <a:spcPts val="0"/>
+                        </a:spcAft>
+                        <a:buNone/>
+                      </a:pPr>
+                      <a:r>
+                        <a:rPr lang="en-US" sz="1400" dirty="0"/>
+                        <a:t>Input name</a:t>
+                      </a:r>
+                    </a:p>
+                    <a:p>
+                      <a:pPr marL="0" lvl="0" indent="0" algn="l" rtl="0">
+                        <a:spcBef>
+                          <a:spcPts val="0"/>
+                        </a:spcBef>
+                        <a:spcAft>
+                          <a:spcPts val="0"/>
+                        </a:spcAft>
+                        <a:buNone/>
+                      </a:pPr>
+                      <a:r>
+                        <a:rPr lang="en-US" sz="1400" dirty="0"/>
+                        <a:t>Input phone number</a:t>
+                      </a:r>
+                    </a:p>
+                    <a:p>
+                      <a:pPr marL="0" lvl="0" indent="0" algn="l" rtl="0">
+                        <a:spcBef>
+                          <a:spcPts val="0"/>
+                        </a:spcBef>
+                        <a:spcAft>
+                          <a:spcPts val="0"/>
+                        </a:spcAft>
+                        <a:buNone/>
+                      </a:pPr>
+                      <a:r>
+                        <a:rPr lang="en-US" sz="1400" dirty="0"/>
+                        <a:t>Left input blank</a:t>
+                      </a:r>
+                      <a:endParaRPr sz="1400" dirty="0"/>
+                    </a:p>
+                  </a:txBody>
+                  <a:tcPr marL="91425" marR="91425" marT="91425" marB="91425"/>
+                </a:tc>
+                <a:tc>
+                  <a:txBody>
+                    <a:bodyPr/>
+                    <a:lstStyle/>
+                    <a:p>
+                      <a:pPr marL="0" lvl="0" indent="0" algn="l" rtl="0">
+                        <a:spcBef>
+                          <a:spcPts val="0"/>
+                        </a:spcBef>
+                        <a:spcAft>
+                          <a:spcPts val="0"/>
+                        </a:spcAft>
+                        <a:buNone/>
+                      </a:pPr>
+                      <a:r>
+                        <a:rPr lang="en-US" sz="1400" dirty="0"/>
+                        <a:t>Printed name correctly</a:t>
+                      </a:r>
+                    </a:p>
+                    <a:p>
+                      <a:pPr marL="0" lvl="0" indent="0" algn="l" rtl="0">
+                        <a:spcBef>
+                          <a:spcPts val="0"/>
+                        </a:spcBef>
+                        <a:spcAft>
+                          <a:spcPts val="0"/>
+                        </a:spcAft>
+                        <a:buNone/>
+                      </a:pPr>
+                      <a:r>
+                        <a:rPr lang="en-US" sz="1400" dirty="0"/>
+                        <a:t>Printed phone number</a:t>
+                      </a:r>
+                    </a:p>
+                    <a:p>
+                      <a:pPr marL="0" lvl="0" indent="0" algn="l" rtl="0">
+                        <a:spcBef>
+                          <a:spcPts val="0"/>
+                        </a:spcBef>
+                        <a:spcAft>
+                          <a:spcPts val="0"/>
+                        </a:spcAft>
+                        <a:buNone/>
+                      </a:pPr>
+                      <a:r>
+                        <a:rPr lang="en-US" sz="1400" dirty="0"/>
+                        <a:t>Prints “Sorry this cannot be blank” – goes back to input </a:t>
+                      </a:r>
+                      <a:endParaRPr sz="1400" dirty="0"/>
+                    </a:p>
+                  </a:txBody>
+                  <a:tcPr marL="91425" marR="91425" marT="91425" marB="91425"/>
+                </a:tc>
+                <a:extLst>
+                  <a:ext uri="{0D108BD9-81ED-4DB2-BD59-A6C34878D82A}">
+                    <a16:rowId xmlns:a16="http://schemas.microsoft.com/office/drawing/2014/main" val="10001"/>
+                  </a:ext>
+                </a:extLst>
+              </a:tr>
+            </a:tbl>
+          </a:graphicData>
+        </a:graphic>
+      </p:graphicFrame>
+      <p:pic>
+        <p:nvPicPr>
+          <p:cNvPr id="4" name="Picture 3">
+            <a:extLst>
+              <a:ext uri="{FF2B5EF4-FFF2-40B4-BE49-F238E27FC236}">
+                <a16:creationId xmlns:a16="http://schemas.microsoft.com/office/drawing/2014/main" id="{1AF626CD-1848-4634-9CA7-DF2D78D22310}"/>
+              </a:ext>
+            </a:extLst>
+          </p:cNvPr>
+          <p:cNvPicPr>
+            <a:picLocks noChangeAspect="1"/>
+          </p:cNvPicPr>
+          <p:nvPr/>
+        </p:nvPicPr>
+        <p:blipFill>
+          <a:blip r:embed="rId3"/>
+          <a:stretch>
+            <a:fillRect/>
+          </a:stretch>
+        </p:blipFill>
+        <p:spPr>
+          <a:xfrm>
+            <a:off x="1013792" y="1066698"/>
+            <a:ext cx="2837578" cy="2146852"/>
+          </a:xfrm>
+          <a:prstGeom prst="rect">
+            <a:avLst/>
+          </a:prstGeom>
+        </p:spPr>
+      </p:pic>
+      <p:pic>
+        <p:nvPicPr>
+          <p:cNvPr id="7" name="Picture 6">
+            <a:extLst>
+              <a:ext uri="{FF2B5EF4-FFF2-40B4-BE49-F238E27FC236}">
+                <a16:creationId xmlns:a16="http://schemas.microsoft.com/office/drawing/2014/main" id="{9C818AEE-3B6A-4155-A0D8-46769E703234}"/>
+              </a:ext>
+            </a:extLst>
+          </p:cNvPr>
+          <p:cNvPicPr>
+            <a:picLocks noChangeAspect="1"/>
+          </p:cNvPicPr>
+          <p:nvPr/>
+        </p:nvPicPr>
+        <p:blipFill>
+          <a:blip r:embed="rId4"/>
+          <a:stretch>
+            <a:fillRect/>
+          </a:stretch>
+        </p:blipFill>
+        <p:spPr>
+          <a:xfrm>
+            <a:off x="4015202" y="1500463"/>
+            <a:ext cx="4259170" cy="1656662"/>
+          </a:xfrm>
+          <a:prstGeom prst="rect">
+            <a:avLst/>
+          </a:prstGeom>
+        </p:spPr>
+      </p:pic>
     </p:spTree>
+    <p:extLst>
+      <p:ext uri="{BB962C8B-B14F-4D97-AF65-F5344CB8AC3E}">
+        <p14:creationId xmlns:p14="http://schemas.microsoft.com/office/powerpoint/2010/main" val="3655371901"/>
+      </p:ext>
+    </p:extLst>
   </p:cSld>
   <p:clrMapOvr>
     <a:masterClrMapping/>
@@ -10388,6 +10865,202 @@
               <a:t> to learn how to do this.</a:t>
             </a:r>
             <a:endParaRPr dirty="0"/>
+          </a:p>
+        </p:txBody>
+      </p:sp>
+    </p:spTree>
+  </p:cSld>
+  <p:clrMapOvr>
+    <a:masterClrMapping/>
+  </p:clrMapOvr>
+</p:sld>
+</file>
+
+<file path=ppt/slides/slide20.xml><?xml version="1.0" encoding="utf-8"?>
+<p:sld xmlns:a="http://schemas.openxmlformats.org/drawingml/2006/main" xmlns:r="http://schemas.openxmlformats.org/officeDocument/2006/relationships" xmlns:p="http://schemas.openxmlformats.org/presentationml/2006/main">
+  <p:cSld>
+    <p:bg>
+      <p:bgPr>
+        <a:solidFill>
+          <a:srgbClr val="D9EAD3"/>
+        </a:solidFill>
+        <a:effectLst/>
+      </p:bgPr>
+    </p:bg>
+    <p:spTree>
+      <p:nvGrpSpPr>
+        <p:cNvPr id="1" name="Shape 83"/>
+        <p:cNvGrpSpPr/>
+        <p:nvPr/>
+      </p:nvGrpSpPr>
+      <p:grpSpPr>
+        <a:xfrm>
+          <a:off x="0" y="0"/>
+          <a:ext cx="0" cy="0"/>
+          <a:chOff x="0" y="0"/>
+          <a:chExt cx="0" cy="0"/>
+        </a:xfrm>
+      </p:grpSpPr>
+      <p:sp>
+        <p:nvSpPr>
+          <p:cNvPr id="84" name="Google Shape;84;p18"/>
+          <p:cNvSpPr txBox="1">
+            <a:spLocks noGrp="1"/>
+          </p:cNvSpPr>
+          <p:nvPr>
+            <p:ph type="title"/>
+          </p:nvPr>
+        </p:nvSpPr>
+        <p:spPr>
+          <a:xfrm>
+            <a:off x="311700" y="445025"/>
+            <a:ext cx="8520600" cy="572700"/>
+          </a:xfrm>
+          <a:prstGeom prst="rect">
+            <a:avLst/>
+          </a:prstGeom>
+        </p:spPr>
+        <p:txBody>
+          <a:bodyPr spcFirstLastPara="1" wrap="square" lIns="91425" tIns="91425" rIns="91425" bIns="91425" anchor="t" anchorCtr="0">
+            <a:noAutofit/>
+          </a:bodyPr>
+          <a:lstStyle/>
+          <a:p>
+            <a:pPr marL="0" lvl="0" indent="0" algn="l" rtl="0">
+              <a:spcBef>
+                <a:spcPts val="0"/>
+              </a:spcBef>
+              <a:spcAft>
+                <a:spcPts val="0"/>
+              </a:spcAft>
+              <a:buNone/>
+            </a:pPr>
+            <a:r>
+              <a:rPr lang="en"/>
+              <a:t>Version Control Evidence</a:t>
+            </a:r>
+            <a:endParaRPr/>
+          </a:p>
+        </p:txBody>
+      </p:sp>
+      <p:sp>
+        <p:nvSpPr>
+          <p:cNvPr id="85" name="Google Shape;85;p18"/>
+          <p:cNvSpPr txBox="1">
+            <a:spLocks noGrp="1"/>
+          </p:cNvSpPr>
+          <p:nvPr>
+            <p:ph type="body" idx="1"/>
+          </p:nvPr>
+        </p:nvSpPr>
+        <p:spPr>
+          <a:xfrm>
+            <a:off x="311700" y="1152475"/>
+            <a:ext cx="8464200" cy="3739200"/>
+          </a:xfrm>
+          <a:prstGeom prst="rect">
+            <a:avLst/>
+          </a:prstGeom>
+        </p:spPr>
+        <p:txBody>
+          <a:bodyPr spcFirstLastPara="1" wrap="square" lIns="91425" tIns="91425" rIns="91425" bIns="91425" anchor="t" anchorCtr="0">
+            <a:noAutofit/>
+          </a:bodyPr>
+          <a:lstStyle/>
+          <a:p>
+            <a:pPr marL="0" lvl="0" indent="0" algn="l" rtl="0">
+              <a:spcBef>
+                <a:spcPts val="0"/>
+              </a:spcBef>
+              <a:spcAft>
+                <a:spcPts val="1600"/>
+              </a:spcAft>
+              <a:buNone/>
+            </a:pPr>
+            <a:r>
+              <a:rPr lang="en" i="1"/>
+              <a:t>Your version control evidence should go here.  This could be in the form of annotated screenshots which show you you managed this process or you could make a brief screencast explaining how you implemented version control.</a:t>
+            </a:r>
+            <a:endParaRPr i="1"/>
+          </a:p>
+        </p:txBody>
+      </p:sp>
+    </p:spTree>
+  </p:cSld>
+  <p:clrMapOvr>
+    <a:masterClrMapping/>
+  </p:clrMapOvr>
+</p:sld>
+</file>
+
+<file path=ppt/slides/slide21.xml><?xml version="1.0" encoding="utf-8"?>
+<p:sld xmlns:a="http://schemas.openxmlformats.org/drawingml/2006/main" xmlns:r="http://schemas.openxmlformats.org/officeDocument/2006/relationships" xmlns:p="http://schemas.openxmlformats.org/presentationml/2006/main">
+  <p:cSld>
+    <p:bg>
+      <p:bgPr>
+        <a:solidFill>
+          <a:srgbClr val="FFE599"/>
+        </a:solidFill>
+        <a:effectLst/>
+      </p:bgPr>
+    </p:bg>
+    <p:spTree>
+      <p:nvGrpSpPr>
+        <p:cNvPr id="1" name="Shape 89"/>
+        <p:cNvGrpSpPr/>
+        <p:nvPr/>
+      </p:nvGrpSpPr>
+      <p:grpSpPr>
+        <a:xfrm>
+          <a:off x="0" y="0"/>
+          <a:ext cx="0" cy="0"/>
+          <a:chOff x="0" y="0"/>
+          <a:chExt cx="0" cy="0"/>
+        </a:xfrm>
+      </p:grpSpPr>
+      <p:sp>
+        <p:nvSpPr>
+          <p:cNvPr id="90" name="Google Shape;90;p19"/>
+          <p:cNvSpPr txBox="1">
+            <a:spLocks noGrp="1"/>
+          </p:cNvSpPr>
+          <p:nvPr>
+            <p:ph type="body" idx="1"/>
+          </p:nvPr>
+        </p:nvSpPr>
+        <p:spPr>
+          <a:xfrm>
+            <a:off x="311700" y="397700"/>
+            <a:ext cx="8520600" cy="4171200"/>
+          </a:xfrm>
+          <a:prstGeom prst="rect">
+            <a:avLst/>
+          </a:prstGeom>
+        </p:spPr>
+        <p:txBody>
+          <a:bodyPr spcFirstLastPara="1" wrap="square" lIns="91425" tIns="91425" rIns="91425" bIns="91425" anchor="t" anchorCtr="0">
+            <a:noAutofit/>
+          </a:bodyPr>
+          <a:lstStyle/>
+          <a:p>
+            <a:pPr marL="0" lvl="0" indent="0" algn="l" rtl="0">
+              <a:spcBef>
+                <a:spcPts val="0"/>
+              </a:spcBef>
+              <a:spcAft>
+                <a:spcPts val="1600"/>
+              </a:spcAft>
+              <a:buNone/>
+            </a:pPr>
+            <a:r>
+              <a:rPr lang="en" b="1" i="1">
+                <a:solidFill>
+                  <a:srgbClr val="595959"/>
+                </a:solidFill>
+              </a:rPr>
+              <a:t>Discusses how the information from planning, testing and trialling of components assisted in the development of a high-quality outcome</a:t>
+            </a:r>
+            <a:endParaRPr/>
           </a:p>
         </p:txBody>
       </p:sp>

</xml_diff>

<commit_message>
Delivery info into main file
Put the delivery info into a function and moved it to the main file.
</commit_message>
<xml_diff>
--- a/022_91893+_+91897+Documentation.pptx
+++ b/022_91893+_+91897+Documentation.pptx
@@ -5,7 +5,7 @@
     <p:sldMasterId id="2147483659" r:id="rId1"/>
   </p:sldMasterIdLst>
   <p:notesMasterIdLst>
-    <p:notesMasterId r:id="rId27"/>
+    <p:notesMasterId r:id="rId30"/>
   </p:notesMasterIdLst>
   <p:sldIdLst>
     <p:sldId id="256" r:id="rId2"/>
@@ -31,8 +31,11 @@
     <p:sldId id="278" r:id="rId22"/>
     <p:sldId id="279" r:id="rId23"/>
     <p:sldId id="280" r:id="rId24"/>
-    <p:sldId id="261" r:id="rId25"/>
-    <p:sldId id="262" r:id="rId26"/>
+    <p:sldId id="281" r:id="rId25"/>
+    <p:sldId id="282" r:id="rId26"/>
+    <p:sldId id="283" r:id="rId27"/>
+    <p:sldId id="261" r:id="rId28"/>
+    <p:sldId id="262" r:id="rId29"/>
   </p:sldIdLst>
   <p:sldSz cx="9144000" cy="5143500" type="screen16x9"/>
   <p:notesSz cx="6858000" cy="9144000"/>
@@ -2520,6 +2523,333 @@
   <p:cSld>
     <p:spTree>
       <p:nvGrpSpPr>
+        <p:cNvPr id="1" name="Shape 69"/>
+        <p:cNvGrpSpPr/>
+        <p:nvPr/>
+      </p:nvGrpSpPr>
+      <p:grpSpPr>
+        <a:xfrm>
+          <a:off x="0" y="0"/>
+          <a:ext cx="0" cy="0"/>
+          <a:chOff x="0" y="0"/>
+          <a:chExt cx="0" cy="0"/>
+        </a:xfrm>
+      </p:grpSpPr>
+      <p:sp>
+        <p:nvSpPr>
+          <p:cNvPr id="70" name="Google Shape;70;gac10fef634_0_16:notes"/>
+          <p:cNvSpPr>
+            <a:spLocks noGrp="1" noRot="1" noChangeAspect="1"/>
+          </p:cNvSpPr>
+          <p:nvPr>
+            <p:ph type="sldImg" idx="2"/>
+          </p:nvPr>
+        </p:nvSpPr>
+        <p:spPr>
+          <a:xfrm>
+            <a:off x="381000" y="685800"/>
+            <a:ext cx="6096000" cy="3429000"/>
+          </a:xfrm>
+          <a:custGeom>
+            <a:avLst/>
+            <a:gdLst/>
+            <a:ahLst/>
+            <a:cxnLst/>
+            <a:rect l="l" t="t" r="r" b="b"/>
+            <a:pathLst>
+              <a:path w="120000" h="120000" extrusionOk="0">
+                <a:moveTo>
+                  <a:pt x="0" y="0"/>
+                </a:moveTo>
+                <a:lnTo>
+                  <a:pt x="120000" y="0"/>
+                </a:lnTo>
+                <a:lnTo>
+                  <a:pt x="120000" y="120000"/>
+                </a:lnTo>
+                <a:lnTo>
+                  <a:pt x="0" y="120000"/>
+                </a:lnTo>
+                <a:close/>
+              </a:path>
+            </a:pathLst>
+          </a:custGeom>
+        </p:spPr>
+      </p:sp>
+      <p:sp>
+        <p:nvSpPr>
+          <p:cNvPr id="71" name="Google Shape;71;gac10fef634_0_16:notes"/>
+          <p:cNvSpPr txBox="1">
+            <a:spLocks noGrp="1"/>
+          </p:cNvSpPr>
+          <p:nvPr>
+            <p:ph type="body" idx="1"/>
+          </p:nvPr>
+        </p:nvSpPr>
+        <p:spPr>
+          <a:xfrm>
+            <a:off x="685800" y="4343400"/>
+            <a:ext cx="5486400" cy="4114800"/>
+          </a:xfrm>
+          <a:prstGeom prst="rect">
+            <a:avLst/>
+          </a:prstGeom>
+        </p:spPr>
+        <p:txBody>
+          <a:bodyPr spcFirstLastPara="1" wrap="square" lIns="91425" tIns="91425" rIns="91425" bIns="91425" anchor="t" anchorCtr="0">
+            <a:noAutofit/>
+          </a:bodyPr>
+          <a:lstStyle/>
+          <a:p>
+            <a:pPr marL="0" lvl="0" indent="0" algn="l" rtl="0">
+              <a:spcBef>
+                <a:spcPts val="0"/>
+              </a:spcBef>
+              <a:spcAft>
+                <a:spcPts val="0"/>
+              </a:spcAft>
+              <a:buNone/>
+            </a:pPr>
+            <a:endParaRPr/>
+          </a:p>
+        </p:txBody>
+      </p:sp>
+    </p:spTree>
+    <p:extLst>
+      <p:ext uri="{BB962C8B-B14F-4D97-AF65-F5344CB8AC3E}">
+        <p14:creationId xmlns:p14="http://schemas.microsoft.com/office/powerpoint/2010/main" val="3308496737"/>
+      </p:ext>
+    </p:extLst>
+  </p:cSld>
+  <p:clrMapOvr>
+    <a:masterClrMapping/>
+  </p:clrMapOvr>
+</p:notes>
+</file>
+
+<file path=ppt/notesSlides/notesSlide25.xml><?xml version="1.0" encoding="utf-8"?>
+<p:notes xmlns:a="http://schemas.openxmlformats.org/drawingml/2006/main" xmlns:r="http://schemas.openxmlformats.org/officeDocument/2006/relationships" xmlns:p="http://schemas.openxmlformats.org/presentationml/2006/main" showMasterSp="0" showMasterPhAnim="0">
+  <p:cSld>
+    <p:spTree>
+      <p:nvGrpSpPr>
+        <p:cNvPr id="1" name="Shape 74"/>
+        <p:cNvGrpSpPr/>
+        <p:nvPr/>
+      </p:nvGrpSpPr>
+      <p:grpSpPr>
+        <a:xfrm>
+          <a:off x="0" y="0"/>
+          <a:ext cx="0" cy="0"/>
+          <a:chOff x="0" y="0"/>
+          <a:chExt cx="0" cy="0"/>
+        </a:xfrm>
+      </p:grpSpPr>
+      <p:sp>
+        <p:nvSpPr>
+          <p:cNvPr id="75" name="Google Shape;75;gac10fef634_0_20:notes"/>
+          <p:cNvSpPr>
+            <a:spLocks noGrp="1" noRot="1" noChangeAspect="1"/>
+          </p:cNvSpPr>
+          <p:nvPr>
+            <p:ph type="sldImg" idx="2"/>
+          </p:nvPr>
+        </p:nvSpPr>
+        <p:spPr>
+          <a:xfrm>
+            <a:off x="381000" y="685800"/>
+            <a:ext cx="6096000" cy="3429000"/>
+          </a:xfrm>
+          <a:custGeom>
+            <a:avLst/>
+            <a:gdLst/>
+            <a:ahLst/>
+            <a:cxnLst/>
+            <a:rect l="l" t="t" r="r" b="b"/>
+            <a:pathLst>
+              <a:path w="120000" h="120000" extrusionOk="0">
+                <a:moveTo>
+                  <a:pt x="0" y="0"/>
+                </a:moveTo>
+                <a:lnTo>
+                  <a:pt x="120000" y="0"/>
+                </a:lnTo>
+                <a:lnTo>
+                  <a:pt x="120000" y="120000"/>
+                </a:lnTo>
+                <a:lnTo>
+                  <a:pt x="0" y="120000"/>
+                </a:lnTo>
+                <a:close/>
+              </a:path>
+            </a:pathLst>
+          </a:custGeom>
+        </p:spPr>
+      </p:sp>
+      <p:sp>
+        <p:nvSpPr>
+          <p:cNvPr id="76" name="Google Shape;76;gac10fef634_0_20:notes"/>
+          <p:cNvSpPr txBox="1">
+            <a:spLocks noGrp="1"/>
+          </p:cNvSpPr>
+          <p:nvPr>
+            <p:ph type="body" idx="1"/>
+          </p:nvPr>
+        </p:nvSpPr>
+        <p:spPr>
+          <a:xfrm>
+            <a:off x="685800" y="4343400"/>
+            <a:ext cx="5486400" cy="4114800"/>
+          </a:xfrm>
+          <a:prstGeom prst="rect">
+            <a:avLst/>
+          </a:prstGeom>
+        </p:spPr>
+        <p:txBody>
+          <a:bodyPr spcFirstLastPara="1" wrap="square" lIns="91425" tIns="91425" rIns="91425" bIns="91425" anchor="t" anchorCtr="0">
+            <a:noAutofit/>
+          </a:bodyPr>
+          <a:lstStyle/>
+          <a:p>
+            <a:pPr marL="0" lvl="0" indent="0" algn="l" rtl="0">
+              <a:spcBef>
+                <a:spcPts val="0"/>
+              </a:spcBef>
+              <a:spcAft>
+                <a:spcPts val="0"/>
+              </a:spcAft>
+              <a:buNone/>
+            </a:pPr>
+            <a:endParaRPr/>
+          </a:p>
+        </p:txBody>
+      </p:sp>
+    </p:spTree>
+    <p:extLst>
+      <p:ext uri="{BB962C8B-B14F-4D97-AF65-F5344CB8AC3E}">
+        <p14:creationId xmlns:p14="http://schemas.microsoft.com/office/powerpoint/2010/main" val="70749333"/>
+      </p:ext>
+    </p:extLst>
+  </p:cSld>
+  <p:clrMapOvr>
+    <a:masterClrMapping/>
+  </p:clrMapOvr>
+</p:notes>
+</file>
+
+<file path=ppt/notesSlides/notesSlide26.xml><?xml version="1.0" encoding="utf-8"?>
+<p:notes xmlns:a="http://schemas.openxmlformats.org/drawingml/2006/main" xmlns:r="http://schemas.openxmlformats.org/officeDocument/2006/relationships" xmlns:p="http://schemas.openxmlformats.org/presentationml/2006/main" showMasterSp="0" showMasterPhAnim="0">
+  <p:cSld>
+    <p:spTree>
+      <p:nvGrpSpPr>
+        <p:cNvPr id="1" name="Shape 74"/>
+        <p:cNvGrpSpPr/>
+        <p:nvPr/>
+      </p:nvGrpSpPr>
+      <p:grpSpPr>
+        <a:xfrm>
+          <a:off x="0" y="0"/>
+          <a:ext cx="0" cy="0"/>
+          <a:chOff x="0" y="0"/>
+          <a:chExt cx="0" cy="0"/>
+        </a:xfrm>
+      </p:grpSpPr>
+      <p:sp>
+        <p:nvSpPr>
+          <p:cNvPr id="75" name="Google Shape;75;gac10fef634_0_20:notes"/>
+          <p:cNvSpPr>
+            <a:spLocks noGrp="1" noRot="1" noChangeAspect="1"/>
+          </p:cNvSpPr>
+          <p:nvPr>
+            <p:ph type="sldImg" idx="2"/>
+          </p:nvPr>
+        </p:nvSpPr>
+        <p:spPr>
+          <a:xfrm>
+            <a:off x="381000" y="685800"/>
+            <a:ext cx="6096000" cy="3429000"/>
+          </a:xfrm>
+          <a:custGeom>
+            <a:avLst/>
+            <a:gdLst/>
+            <a:ahLst/>
+            <a:cxnLst/>
+            <a:rect l="l" t="t" r="r" b="b"/>
+            <a:pathLst>
+              <a:path w="120000" h="120000" extrusionOk="0">
+                <a:moveTo>
+                  <a:pt x="0" y="0"/>
+                </a:moveTo>
+                <a:lnTo>
+                  <a:pt x="120000" y="0"/>
+                </a:lnTo>
+                <a:lnTo>
+                  <a:pt x="120000" y="120000"/>
+                </a:lnTo>
+                <a:lnTo>
+                  <a:pt x="0" y="120000"/>
+                </a:lnTo>
+                <a:close/>
+              </a:path>
+            </a:pathLst>
+          </a:custGeom>
+        </p:spPr>
+      </p:sp>
+      <p:sp>
+        <p:nvSpPr>
+          <p:cNvPr id="76" name="Google Shape;76;gac10fef634_0_20:notes"/>
+          <p:cNvSpPr txBox="1">
+            <a:spLocks noGrp="1"/>
+          </p:cNvSpPr>
+          <p:nvPr>
+            <p:ph type="body" idx="1"/>
+          </p:nvPr>
+        </p:nvSpPr>
+        <p:spPr>
+          <a:xfrm>
+            <a:off x="685800" y="4343400"/>
+            <a:ext cx="5486400" cy="4114800"/>
+          </a:xfrm>
+          <a:prstGeom prst="rect">
+            <a:avLst/>
+          </a:prstGeom>
+        </p:spPr>
+        <p:txBody>
+          <a:bodyPr spcFirstLastPara="1" wrap="square" lIns="91425" tIns="91425" rIns="91425" bIns="91425" anchor="t" anchorCtr="0">
+            <a:noAutofit/>
+          </a:bodyPr>
+          <a:lstStyle/>
+          <a:p>
+            <a:pPr marL="0" lvl="0" indent="0" algn="l" rtl="0">
+              <a:spcBef>
+                <a:spcPts val="0"/>
+              </a:spcBef>
+              <a:spcAft>
+                <a:spcPts val="0"/>
+              </a:spcAft>
+              <a:buNone/>
+            </a:pPr>
+            <a:endParaRPr/>
+          </a:p>
+        </p:txBody>
+      </p:sp>
+    </p:spTree>
+    <p:extLst>
+      <p:ext uri="{BB962C8B-B14F-4D97-AF65-F5344CB8AC3E}">
+        <p14:creationId xmlns:p14="http://schemas.microsoft.com/office/powerpoint/2010/main" val="4223261782"/>
+      </p:ext>
+    </p:extLst>
+  </p:cSld>
+  <p:clrMapOvr>
+    <a:masterClrMapping/>
+  </p:clrMapOvr>
+</p:notes>
+</file>
+
+<file path=ppt/notesSlides/notesSlide27.xml><?xml version="1.0" encoding="utf-8"?>
+<p:notes xmlns:a="http://schemas.openxmlformats.org/drawingml/2006/main" xmlns:r="http://schemas.openxmlformats.org/officeDocument/2006/relationships" xmlns:p="http://schemas.openxmlformats.org/presentationml/2006/main" showMasterSp="0" showMasterPhAnim="0">
+  <p:cSld>
+    <p:spTree>
+      <p:nvGrpSpPr>
         <p:cNvPr id="1" name="Shape 80"/>
         <p:cNvGrpSpPr/>
         <p:nvPr/>
@@ -2640,7 +2970,7 @@
 </p:notes>
 </file>
 
-<file path=ppt/notesSlides/notesSlide25.xml><?xml version="1.0" encoding="utf-8"?>
+<file path=ppt/notesSlides/notesSlide28.xml><?xml version="1.0" encoding="utf-8"?>
 <p:notes xmlns:a="http://schemas.openxmlformats.org/drawingml/2006/main" xmlns:r="http://schemas.openxmlformats.org/officeDocument/2006/relationships" xmlns:p="http://schemas.openxmlformats.org/presentationml/2006/main" showMasterSp="0" showMasterPhAnim="0">
   <p:cSld>
     <p:spTree>
@@ -12305,6 +12635,986 @@
     </p:bg>
     <p:spTree>
       <p:nvGrpSpPr>
+        <p:cNvPr id="1" name="Shape 72"/>
+        <p:cNvGrpSpPr/>
+        <p:nvPr/>
+      </p:nvGrpSpPr>
+      <p:grpSpPr>
+        <a:xfrm>
+          <a:off x="0" y="0"/>
+          <a:ext cx="0" cy="0"/>
+          <a:chOff x="0" y="0"/>
+          <a:chExt cx="0" cy="0"/>
+        </a:xfrm>
+      </p:grpSpPr>
+      <p:sp>
+        <p:nvSpPr>
+          <p:cNvPr id="73" name="Google Shape;73;p16"/>
+          <p:cNvSpPr txBox="1">
+            <a:spLocks noGrp="1"/>
+          </p:cNvSpPr>
+          <p:nvPr>
+            <p:ph type="title"/>
+          </p:nvPr>
+        </p:nvSpPr>
+        <p:spPr>
+          <a:xfrm>
+            <a:off x="311700" y="445025"/>
+            <a:ext cx="8520600" cy="572700"/>
+          </a:xfrm>
+          <a:prstGeom prst="rect">
+            <a:avLst/>
+          </a:prstGeom>
+        </p:spPr>
+        <p:txBody>
+          <a:bodyPr spcFirstLastPara="1" wrap="square" lIns="91425" tIns="91425" rIns="91425" bIns="91425" anchor="t" anchorCtr="0">
+            <a:noAutofit/>
+          </a:bodyPr>
+          <a:lstStyle/>
+          <a:p>
+            <a:pPr marL="0" lvl="0" indent="0" algn="l" rtl="0">
+              <a:spcBef>
+                <a:spcPts val="0"/>
+              </a:spcBef>
+              <a:spcAft>
+                <a:spcPts val="0"/>
+              </a:spcAft>
+              <a:buNone/>
+            </a:pPr>
+            <a:r>
+              <a:rPr lang="en" dirty="0"/>
+              <a:t>Component 4 v2 Delivery info (Trello screenshot)</a:t>
+            </a:r>
+            <a:endParaRPr dirty="0"/>
+          </a:p>
+        </p:txBody>
+      </p:sp>
+      <p:pic>
+        <p:nvPicPr>
+          <p:cNvPr id="4" name="Picture 3">
+            <a:extLst>
+              <a:ext uri="{FF2B5EF4-FFF2-40B4-BE49-F238E27FC236}">
+                <a16:creationId xmlns:a16="http://schemas.microsoft.com/office/drawing/2014/main" id="{1C651473-A77B-4664-A077-13352E574783}"/>
+              </a:ext>
+            </a:extLst>
+          </p:cNvPr>
+          <p:cNvPicPr>
+            <a:picLocks noChangeAspect="1"/>
+          </p:cNvPicPr>
+          <p:nvPr/>
+        </p:nvPicPr>
+        <p:blipFill>
+          <a:blip r:embed="rId3"/>
+          <a:stretch>
+            <a:fillRect/>
+          </a:stretch>
+        </p:blipFill>
+        <p:spPr>
+          <a:xfrm>
+            <a:off x="311700" y="1225784"/>
+            <a:ext cx="8163339" cy="2994779"/>
+          </a:xfrm>
+          <a:prstGeom prst="rect">
+            <a:avLst/>
+          </a:prstGeom>
+        </p:spPr>
+      </p:pic>
+    </p:spTree>
+    <p:extLst>
+      <p:ext uri="{BB962C8B-B14F-4D97-AF65-F5344CB8AC3E}">
+        <p14:creationId xmlns:p14="http://schemas.microsoft.com/office/powerpoint/2010/main" val="2752255078"/>
+      </p:ext>
+    </p:extLst>
+  </p:cSld>
+  <p:clrMapOvr>
+    <a:masterClrMapping/>
+  </p:clrMapOvr>
+</p:sld>
+</file>
+
+<file path=ppt/slides/slide25.xml><?xml version="1.0" encoding="utf-8"?>
+<p:sld xmlns:a="http://schemas.openxmlformats.org/drawingml/2006/main" xmlns:r="http://schemas.openxmlformats.org/officeDocument/2006/relationships" xmlns:p="http://schemas.openxmlformats.org/presentationml/2006/main">
+  <p:cSld>
+    <p:spTree>
+      <p:nvGrpSpPr>
+        <p:cNvPr id="1" name="Shape 77"/>
+        <p:cNvGrpSpPr/>
+        <p:nvPr/>
+      </p:nvGrpSpPr>
+      <p:grpSpPr>
+        <a:xfrm>
+          <a:off x="0" y="0"/>
+          <a:ext cx="0" cy="0"/>
+          <a:chOff x="0" y="0"/>
+          <a:chExt cx="0" cy="0"/>
+        </a:xfrm>
+      </p:grpSpPr>
+      <p:sp>
+        <p:nvSpPr>
+          <p:cNvPr id="78" name="Google Shape;78;p17"/>
+          <p:cNvSpPr txBox="1">
+            <a:spLocks noGrp="1"/>
+          </p:cNvSpPr>
+          <p:nvPr>
+            <p:ph type="title"/>
+          </p:nvPr>
+        </p:nvSpPr>
+        <p:spPr>
+          <a:xfrm>
+            <a:off x="311700" y="445025"/>
+            <a:ext cx="8520600" cy="572700"/>
+          </a:xfrm>
+          <a:prstGeom prst="rect">
+            <a:avLst/>
+          </a:prstGeom>
+        </p:spPr>
+        <p:txBody>
+          <a:bodyPr spcFirstLastPara="1" wrap="square" lIns="91425" tIns="91425" rIns="91425" bIns="91425" anchor="t" anchorCtr="0">
+            <a:noAutofit/>
+          </a:bodyPr>
+          <a:lstStyle/>
+          <a:p>
+            <a:pPr marL="0" lvl="0" indent="0" algn="l" rtl="0">
+              <a:spcBef>
+                <a:spcPts val="0"/>
+              </a:spcBef>
+              <a:spcAft>
+                <a:spcPts val="0"/>
+              </a:spcAft>
+              <a:buNone/>
+            </a:pPr>
+            <a:r>
+              <a:rPr lang="en" sz="2400" dirty="0"/>
+              <a:t>Component 4 v2 - Test Plan (?and screenshot)</a:t>
+            </a:r>
+            <a:endParaRPr sz="2400" dirty="0"/>
+          </a:p>
+        </p:txBody>
+      </p:sp>
+      <p:graphicFrame>
+        <p:nvGraphicFramePr>
+          <p:cNvPr id="79" name="Google Shape;79;p17"/>
+          <p:cNvGraphicFramePr/>
+          <p:nvPr>
+            <p:extLst>
+              <p:ext uri="{D42A27DB-BD31-4B8C-83A1-F6EECF244321}">
+                <p14:modId xmlns:p14="http://schemas.microsoft.com/office/powerpoint/2010/main" val="2469105662"/>
+              </p:ext>
+            </p:extLst>
+          </p:nvPr>
+        </p:nvGraphicFramePr>
+        <p:xfrm>
+          <a:off x="311700" y="3009960"/>
+          <a:ext cx="8520600" cy="1920180"/>
+        </p:xfrm>
+        <a:graphic>
+          <a:graphicData uri="http://schemas.openxmlformats.org/drawingml/2006/table">
+            <a:tbl>
+              <a:tblPr>
+                <a:noFill/>
+                <a:tableStyleId>{E1099E06-0E6B-448D-9D27-60429F06E6F4}</a:tableStyleId>
+              </a:tblPr>
+              <a:tblGrid>
+                <a:gridCol w="4260300">
+                  <a:extLst>
+                    <a:ext uri="{9D8B030D-6E8A-4147-A177-3AD203B41FA5}">
+                      <a16:colId xmlns:a16="http://schemas.microsoft.com/office/drawing/2014/main" val="20000"/>
+                    </a:ext>
+                  </a:extLst>
+                </a:gridCol>
+                <a:gridCol w="4260300">
+                  <a:extLst>
+                    <a:ext uri="{9D8B030D-6E8A-4147-A177-3AD203B41FA5}">
+                      <a16:colId xmlns:a16="http://schemas.microsoft.com/office/drawing/2014/main" val="20001"/>
+                    </a:ext>
+                  </a:extLst>
+                </a:gridCol>
+              </a:tblGrid>
+              <a:tr h="381000">
+                <a:tc>
+                  <a:txBody>
+                    <a:bodyPr/>
+                    <a:lstStyle/>
+                    <a:p>
+                      <a:pPr marL="0" lvl="0" indent="0" algn="l" rtl="0">
+                        <a:spcBef>
+                          <a:spcPts val="0"/>
+                        </a:spcBef>
+                        <a:spcAft>
+                          <a:spcPts val="0"/>
+                        </a:spcAft>
+                        <a:buNone/>
+                      </a:pPr>
+                      <a:r>
+                        <a:rPr lang="en" sz="1800" b="1"/>
+                        <a:t>Test Case</a:t>
+                      </a:r>
+                      <a:endParaRPr sz="1800" b="1"/>
+                    </a:p>
+                  </a:txBody>
+                  <a:tcPr marL="91425" marR="91425" marT="91425" marB="91425">
+                    <a:solidFill>
+                      <a:srgbClr val="CCCCCC"/>
+                    </a:solidFill>
+                  </a:tcPr>
+                </a:tc>
+                <a:tc>
+                  <a:txBody>
+                    <a:bodyPr/>
+                    <a:lstStyle/>
+                    <a:p>
+                      <a:pPr marL="0" lvl="0" indent="0" algn="l" rtl="0">
+                        <a:spcBef>
+                          <a:spcPts val="0"/>
+                        </a:spcBef>
+                        <a:spcAft>
+                          <a:spcPts val="0"/>
+                        </a:spcAft>
+                        <a:buNone/>
+                      </a:pPr>
+                      <a:r>
+                        <a:rPr lang="en" sz="1800" b="1"/>
+                        <a:t>Expected Values</a:t>
+                      </a:r>
+                      <a:endParaRPr sz="1800" b="1"/>
+                    </a:p>
+                  </a:txBody>
+                  <a:tcPr marL="91425" marR="91425" marT="91425" marB="91425">
+                    <a:solidFill>
+                      <a:srgbClr val="CCCCCC"/>
+                    </a:solidFill>
+                  </a:tcPr>
+                </a:tc>
+                <a:extLst>
+                  <a:ext uri="{0D108BD9-81ED-4DB2-BD59-A6C34878D82A}">
+                    <a16:rowId xmlns:a16="http://schemas.microsoft.com/office/drawing/2014/main" val="10000"/>
+                  </a:ext>
+                </a:extLst>
+              </a:tr>
+              <a:tr h="396200">
+                <a:tc>
+                  <a:txBody>
+                    <a:bodyPr/>
+                    <a:lstStyle/>
+                    <a:p>
+                      <a:pPr marL="0" lvl="0" indent="0" algn="l" rtl="0">
+                        <a:spcBef>
+                          <a:spcPts val="0"/>
+                        </a:spcBef>
+                        <a:spcAft>
+                          <a:spcPts val="0"/>
+                        </a:spcAft>
+                        <a:buNone/>
+                      </a:pPr>
+                      <a:r>
+                        <a:rPr lang="en-US" sz="1400" dirty="0"/>
+                        <a:t>Input name</a:t>
+                      </a:r>
+                    </a:p>
+                    <a:p>
+                      <a:pPr marL="0" lvl="0" indent="0" algn="l" rtl="0">
+                        <a:spcBef>
+                          <a:spcPts val="0"/>
+                        </a:spcBef>
+                        <a:spcAft>
+                          <a:spcPts val="0"/>
+                        </a:spcAft>
+                        <a:buNone/>
+                      </a:pPr>
+                      <a:r>
+                        <a:rPr lang="en-US" sz="1400" dirty="0"/>
+                        <a:t>Input phone number</a:t>
+                      </a:r>
+                    </a:p>
+                    <a:p>
+                      <a:pPr marL="0" lvl="0" indent="0" algn="l" rtl="0">
+                        <a:spcBef>
+                          <a:spcPts val="0"/>
+                        </a:spcBef>
+                        <a:spcAft>
+                          <a:spcPts val="0"/>
+                        </a:spcAft>
+                        <a:buNone/>
+                      </a:pPr>
+                      <a:r>
+                        <a:rPr lang="en-US" sz="1400" dirty="0"/>
+                        <a:t>Input house number</a:t>
+                      </a:r>
+                    </a:p>
+                    <a:p>
+                      <a:pPr marL="0" lvl="0" indent="0" algn="l" rtl="0">
+                        <a:spcBef>
+                          <a:spcPts val="0"/>
+                        </a:spcBef>
+                        <a:spcAft>
+                          <a:spcPts val="0"/>
+                        </a:spcAft>
+                        <a:buNone/>
+                      </a:pPr>
+                      <a:r>
+                        <a:rPr lang="en-US" sz="1400" dirty="0"/>
+                        <a:t>Input street name</a:t>
+                      </a:r>
+                    </a:p>
+                    <a:p>
+                      <a:pPr marL="0" lvl="0" indent="0" algn="l" rtl="0">
+                        <a:spcBef>
+                          <a:spcPts val="0"/>
+                        </a:spcBef>
+                        <a:spcAft>
+                          <a:spcPts val="0"/>
+                        </a:spcAft>
+                        <a:buNone/>
+                      </a:pPr>
+                      <a:r>
+                        <a:rPr lang="en-US" sz="1400" dirty="0"/>
+                        <a:t>Input suburb</a:t>
+                      </a:r>
+                    </a:p>
+                    <a:p>
+                      <a:pPr marL="0" lvl="0" indent="0" algn="l" rtl="0">
+                        <a:spcBef>
+                          <a:spcPts val="0"/>
+                        </a:spcBef>
+                        <a:spcAft>
+                          <a:spcPts val="0"/>
+                        </a:spcAft>
+                        <a:buNone/>
+                      </a:pPr>
+                      <a:r>
+                        <a:rPr lang="en-US" sz="1400" dirty="0"/>
+                        <a:t>Left input blank</a:t>
+                      </a:r>
+                      <a:endParaRPr sz="1400" dirty="0"/>
+                    </a:p>
+                  </a:txBody>
+                  <a:tcPr marL="91425" marR="91425" marT="91425" marB="91425"/>
+                </a:tc>
+                <a:tc>
+                  <a:txBody>
+                    <a:bodyPr/>
+                    <a:lstStyle/>
+                    <a:p>
+                      <a:pPr marL="0" lvl="0" indent="0" algn="l" rtl="0">
+                        <a:spcBef>
+                          <a:spcPts val="0"/>
+                        </a:spcBef>
+                        <a:spcAft>
+                          <a:spcPts val="0"/>
+                        </a:spcAft>
+                        <a:buNone/>
+                      </a:pPr>
+                      <a:r>
+                        <a:rPr lang="en-US" sz="1400" dirty="0"/>
+                        <a:t>Printed name correctly</a:t>
+                      </a:r>
+                    </a:p>
+                    <a:p>
+                      <a:pPr marL="0" lvl="0" indent="0" algn="l" rtl="0">
+                        <a:spcBef>
+                          <a:spcPts val="0"/>
+                        </a:spcBef>
+                        <a:spcAft>
+                          <a:spcPts val="0"/>
+                        </a:spcAft>
+                        <a:buNone/>
+                      </a:pPr>
+                      <a:r>
+                        <a:rPr lang="en-US" sz="1400" dirty="0"/>
+                        <a:t>Printed phone number</a:t>
+                      </a:r>
+                    </a:p>
+                    <a:p>
+                      <a:pPr marL="0" lvl="0" indent="0" algn="l" rtl="0">
+                        <a:spcBef>
+                          <a:spcPts val="0"/>
+                        </a:spcBef>
+                        <a:spcAft>
+                          <a:spcPts val="0"/>
+                        </a:spcAft>
+                        <a:buNone/>
+                      </a:pPr>
+                      <a:r>
+                        <a:rPr lang="en-US" sz="1400" dirty="0"/>
+                        <a:t>Printed house number</a:t>
+                      </a:r>
+                    </a:p>
+                    <a:p>
+                      <a:pPr marL="0" lvl="0" indent="0" algn="l" rtl="0">
+                        <a:spcBef>
+                          <a:spcPts val="0"/>
+                        </a:spcBef>
+                        <a:spcAft>
+                          <a:spcPts val="0"/>
+                        </a:spcAft>
+                        <a:buNone/>
+                      </a:pPr>
+                      <a:r>
+                        <a:rPr lang="en-US" sz="1400" dirty="0"/>
+                        <a:t>Printed street name</a:t>
+                      </a:r>
+                    </a:p>
+                    <a:p>
+                      <a:pPr marL="0" lvl="0" indent="0" algn="l" rtl="0">
+                        <a:spcBef>
+                          <a:spcPts val="0"/>
+                        </a:spcBef>
+                        <a:spcAft>
+                          <a:spcPts val="0"/>
+                        </a:spcAft>
+                        <a:buNone/>
+                      </a:pPr>
+                      <a:r>
+                        <a:rPr lang="en-US" sz="1400" dirty="0"/>
+                        <a:t>Printed suburb name</a:t>
+                      </a:r>
+                    </a:p>
+                    <a:p>
+                      <a:pPr marL="0" lvl="0" indent="0" algn="l" rtl="0">
+                        <a:spcBef>
+                          <a:spcPts val="0"/>
+                        </a:spcBef>
+                        <a:spcAft>
+                          <a:spcPts val="0"/>
+                        </a:spcAft>
+                        <a:buNone/>
+                      </a:pPr>
+                      <a:r>
+                        <a:rPr lang="en-US" sz="1400" dirty="0"/>
+                        <a:t>Asked for input again</a:t>
+                      </a:r>
+                    </a:p>
+                  </a:txBody>
+                  <a:tcPr marL="91425" marR="91425" marT="91425" marB="91425"/>
+                </a:tc>
+                <a:extLst>
+                  <a:ext uri="{0D108BD9-81ED-4DB2-BD59-A6C34878D82A}">
+                    <a16:rowId xmlns:a16="http://schemas.microsoft.com/office/drawing/2014/main" val="10001"/>
+                  </a:ext>
+                </a:extLst>
+              </a:tr>
+            </a:tbl>
+          </a:graphicData>
+        </a:graphic>
+      </p:graphicFrame>
+      <p:pic>
+        <p:nvPicPr>
+          <p:cNvPr id="3" name="Picture 2">
+            <a:extLst>
+              <a:ext uri="{FF2B5EF4-FFF2-40B4-BE49-F238E27FC236}">
+                <a16:creationId xmlns:a16="http://schemas.microsoft.com/office/drawing/2014/main" id="{1F3F38A9-DEB5-4F97-A71D-A19A71E20AFD}"/>
+              </a:ext>
+            </a:extLst>
+          </p:cNvPr>
+          <p:cNvPicPr>
+            <a:picLocks noChangeAspect="1"/>
+          </p:cNvPicPr>
+          <p:nvPr/>
+        </p:nvPicPr>
+        <p:blipFill>
+          <a:blip r:embed="rId3"/>
+          <a:stretch>
+            <a:fillRect/>
+          </a:stretch>
+        </p:blipFill>
+        <p:spPr>
+          <a:xfrm>
+            <a:off x="1071057" y="1015033"/>
+            <a:ext cx="2122717" cy="1923346"/>
+          </a:xfrm>
+          <a:prstGeom prst="rect">
+            <a:avLst/>
+          </a:prstGeom>
+        </p:spPr>
+      </p:pic>
+      <p:pic>
+        <p:nvPicPr>
+          <p:cNvPr id="7" name="Picture 6">
+            <a:extLst>
+              <a:ext uri="{FF2B5EF4-FFF2-40B4-BE49-F238E27FC236}">
+                <a16:creationId xmlns:a16="http://schemas.microsoft.com/office/drawing/2014/main" id="{5CB53243-8C67-4C11-83A1-82C0E60766B8}"/>
+              </a:ext>
+            </a:extLst>
+          </p:cNvPr>
+          <p:cNvPicPr>
+            <a:picLocks noChangeAspect="1"/>
+          </p:cNvPicPr>
+          <p:nvPr/>
+        </p:nvPicPr>
+        <p:blipFill>
+          <a:blip r:embed="rId4"/>
+          <a:stretch>
+            <a:fillRect/>
+          </a:stretch>
+        </p:blipFill>
+        <p:spPr>
+          <a:xfrm>
+            <a:off x="3786877" y="907514"/>
+            <a:ext cx="2587418" cy="2030865"/>
+          </a:xfrm>
+          <a:prstGeom prst="rect">
+            <a:avLst/>
+          </a:prstGeom>
+        </p:spPr>
+      </p:pic>
+    </p:spTree>
+    <p:extLst>
+      <p:ext uri="{BB962C8B-B14F-4D97-AF65-F5344CB8AC3E}">
+        <p14:creationId xmlns:p14="http://schemas.microsoft.com/office/powerpoint/2010/main" val="932398523"/>
+      </p:ext>
+    </p:extLst>
+  </p:cSld>
+  <p:clrMapOvr>
+    <a:masterClrMapping/>
+  </p:clrMapOvr>
+</p:sld>
+</file>
+
+<file path=ppt/slides/slide26.xml><?xml version="1.0" encoding="utf-8"?>
+<p:sld xmlns:a="http://schemas.openxmlformats.org/drawingml/2006/main" xmlns:r="http://schemas.openxmlformats.org/officeDocument/2006/relationships" xmlns:p="http://schemas.openxmlformats.org/presentationml/2006/main">
+  <p:cSld>
+    <p:spTree>
+      <p:nvGrpSpPr>
+        <p:cNvPr id="1" name="Shape 77"/>
+        <p:cNvGrpSpPr/>
+        <p:nvPr/>
+      </p:nvGrpSpPr>
+      <p:grpSpPr>
+        <a:xfrm>
+          <a:off x="0" y="0"/>
+          <a:ext cx="0" cy="0"/>
+          <a:chOff x="0" y="0"/>
+          <a:chExt cx="0" cy="0"/>
+        </a:xfrm>
+      </p:grpSpPr>
+      <p:sp>
+        <p:nvSpPr>
+          <p:cNvPr id="78" name="Google Shape;78;p17"/>
+          <p:cNvSpPr txBox="1">
+            <a:spLocks noGrp="1"/>
+          </p:cNvSpPr>
+          <p:nvPr>
+            <p:ph type="title"/>
+          </p:nvPr>
+        </p:nvSpPr>
+        <p:spPr>
+          <a:xfrm>
+            <a:off x="311700" y="445025"/>
+            <a:ext cx="8520600" cy="572700"/>
+          </a:xfrm>
+          <a:prstGeom prst="rect">
+            <a:avLst/>
+          </a:prstGeom>
+        </p:spPr>
+        <p:txBody>
+          <a:bodyPr spcFirstLastPara="1" wrap="square" lIns="91425" tIns="91425" rIns="91425" bIns="91425" anchor="t" anchorCtr="0">
+            <a:noAutofit/>
+          </a:bodyPr>
+          <a:lstStyle/>
+          <a:p>
+            <a:pPr marL="0" lvl="0" indent="0" algn="l" rtl="0">
+              <a:spcBef>
+                <a:spcPts val="0"/>
+              </a:spcBef>
+              <a:spcAft>
+                <a:spcPts val="0"/>
+              </a:spcAft>
+              <a:buNone/>
+            </a:pPr>
+            <a:r>
+              <a:rPr lang="en" sz="2400" dirty="0"/>
+              <a:t>Component 4 v2 - Test Plan (?and screenshot)</a:t>
+            </a:r>
+            <a:endParaRPr sz="2400" dirty="0"/>
+          </a:p>
+        </p:txBody>
+      </p:sp>
+      <p:graphicFrame>
+        <p:nvGraphicFramePr>
+          <p:cNvPr id="79" name="Google Shape;79;p17"/>
+          <p:cNvGraphicFramePr/>
+          <p:nvPr/>
+        </p:nvGraphicFramePr>
+        <p:xfrm>
+          <a:off x="311700" y="3009960"/>
+          <a:ext cx="8520600" cy="1920180"/>
+        </p:xfrm>
+        <a:graphic>
+          <a:graphicData uri="http://schemas.openxmlformats.org/drawingml/2006/table">
+            <a:tbl>
+              <a:tblPr>
+                <a:noFill/>
+                <a:tableStyleId>{E1099E06-0E6B-448D-9D27-60429F06E6F4}</a:tableStyleId>
+              </a:tblPr>
+              <a:tblGrid>
+                <a:gridCol w="4260300">
+                  <a:extLst>
+                    <a:ext uri="{9D8B030D-6E8A-4147-A177-3AD203B41FA5}">
+                      <a16:colId xmlns:a16="http://schemas.microsoft.com/office/drawing/2014/main" val="20000"/>
+                    </a:ext>
+                  </a:extLst>
+                </a:gridCol>
+                <a:gridCol w="4260300">
+                  <a:extLst>
+                    <a:ext uri="{9D8B030D-6E8A-4147-A177-3AD203B41FA5}">
+                      <a16:colId xmlns:a16="http://schemas.microsoft.com/office/drawing/2014/main" val="20001"/>
+                    </a:ext>
+                  </a:extLst>
+                </a:gridCol>
+              </a:tblGrid>
+              <a:tr h="381000">
+                <a:tc>
+                  <a:txBody>
+                    <a:bodyPr/>
+                    <a:lstStyle/>
+                    <a:p>
+                      <a:pPr marL="0" lvl="0" indent="0" algn="l" rtl="0">
+                        <a:spcBef>
+                          <a:spcPts val="0"/>
+                        </a:spcBef>
+                        <a:spcAft>
+                          <a:spcPts val="0"/>
+                        </a:spcAft>
+                        <a:buNone/>
+                      </a:pPr>
+                      <a:r>
+                        <a:rPr lang="en" sz="1800" b="1"/>
+                        <a:t>Test Case</a:t>
+                      </a:r>
+                      <a:endParaRPr sz="1800" b="1"/>
+                    </a:p>
+                  </a:txBody>
+                  <a:tcPr marL="91425" marR="91425" marT="91425" marB="91425">
+                    <a:solidFill>
+                      <a:srgbClr val="CCCCCC"/>
+                    </a:solidFill>
+                  </a:tcPr>
+                </a:tc>
+                <a:tc>
+                  <a:txBody>
+                    <a:bodyPr/>
+                    <a:lstStyle/>
+                    <a:p>
+                      <a:pPr marL="0" lvl="0" indent="0" algn="l" rtl="0">
+                        <a:spcBef>
+                          <a:spcPts val="0"/>
+                        </a:spcBef>
+                        <a:spcAft>
+                          <a:spcPts val="0"/>
+                        </a:spcAft>
+                        <a:buNone/>
+                      </a:pPr>
+                      <a:r>
+                        <a:rPr lang="en" sz="1800" b="1"/>
+                        <a:t>Expected Values</a:t>
+                      </a:r>
+                      <a:endParaRPr sz="1800" b="1"/>
+                    </a:p>
+                  </a:txBody>
+                  <a:tcPr marL="91425" marR="91425" marT="91425" marB="91425">
+                    <a:solidFill>
+                      <a:srgbClr val="CCCCCC"/>
+                    </a:solidFill>
+                  </a:tcPr>
+                </a:tc>
+                <a:extLst>
+                  <a:ext uri="{0D108BD9-81ED-4DB2-BD59-A6C34878D82A}">
+                    <a16:rowId xmlns:a16="http://schemas.microsoft.com/office/drawing/2014/main" val="10000"/>
+                  </a:ext>
+                </a:extLst>
+              </a:tr>
+              <a:tr h="396200">
+                <a:tc>
+                  <a:txBody>
+                    <a:bodyPr/>
+                    <a:lstStyle/>
+                    <a:p>
+                      <a:pPr marL="0" lvl="0" indent="0" algn="l" rtl="0">
+                        <a:spcBef>
+                          <a:spcPts val="0"/>
+                        </a:spcBef>
+                        <a:spcAft>
+                          <a:spcPts val="0"/>
+                        </a:spcAft>
+                        <a:buNone/>
+                      </a:pPr>
+                      <a:r>
+                        <a:rPr lang="en-US" sz="1400" dirty="0"/>
+                        <a:t>Input name</a:t>
+                      </a:r>
+                    </a:p>
+                    <a:p>
+                      <a:pPr marL="0" lvl="0" indent="0" algn="l" rtl="0">
+                        <a:spcBef>
+                          <a:spcPts val="0"/>
+                        </a:spcBef>
+                        <a:spcAft>
+                          <a:spcPts val="0"/>
+                        </a:spcAft>
+                        <a:buNone/>
+                      </a:pPr>
+                      <a:r>
+                        <a:rPr lang="en-US" sz="1400" dirty="0"/>
+                        <a:t>Input phone number</a:t>
+                      </a:r>
+                    </a:p>
+                    <a:p>
+                      <a:pPr marL="0" lvl="0" indent="0" algn="l" rtl="0">
+                        <a:spcBef>
+                          <a:spcPts val="0"/>
+                        </a:spcBef>
+                        <a:spcAft>
+                          <a:spcPts val="0"/>
+                        </a:spcAft>
+                        <a:buNone/>
+                      </a:pPr>
+                      <a:r>
+                        <a:rPr lang="en-US" sz="1400" dirty="0"/>
+                        <a:t>Input house number</a:t>
+                      </a:r>
+                    </a:p>
+                    <a:p>
+                      <a:pPr marL="0" lvl="0" indent="0" algn="l" rtl="0">
+                        <a:spcBef>
+                          <a:spcPts val="0"/>
+                        </a:spcBef>
+                        <a:spcAft>
+                          <a:spcPts val="0"/>
+                        </a:spcAft>
+                        <a:buNone/>
+                      </a:pPr>
+                      <a:r>
+                        <a:rPr lang="en-US" sz="1400" dirty="0"/>
+                        <a:t>Input street name</a:t>
+                      </a:r>
+                    </a:p>
+                    <a:p>
+                      <a:pPr marL="0" lvl="0" indent="0" algn="l" rtl="0">
+                        <a:spcBef>
+                          <a:spcPts val="0"/>
+                        </a:spcBef>
+                        <a:spcAft>
+                          <a:spcPts val="0"/>
+                        </a:spcAft>
+                        <a:buNone/>
+                      </a:pPr>
+                      <a:r>
+                        <a:rPr lang="en-US" sz="1400" dirty="0"/>
+                        <a:t>Input suburb</a:t>
+                      </a:r>
+                    </a:p>
+                    <a:p>
+                      <a:pPr marL="0" lvl="0" indent="0" algn="l" rtl="0">
+                        <a:spcBef>
+                          <a:spcPts val="0"/>
+                        </a:spcBef>
+                        <a:spcAft>
+                          <a:spcPts val="0"/>
+                        </a:spcAft>
+                        <a:buNone/>
+                      </a:pPr>
+                      <a:r>
+                        <a:rPr lang="en-US" sz="1400" dirty="0"/>
+                        <a:t>Left input blank</a:t>
+                      </a:r>
+                      <a:endParaRPr sz="1400" dirty="0"/>
+                    </a:p>
+                  </a:txBody>
+                  <a:tcPr marL="91425" marR="91425" marT="91425" marB="91425"/>
+                </a:tc>
+                <a:tc>
+                  <a:txBody>
+                    <a:bodyPr/>
+                    <a:lstStyle/>
+                    <a:p>
+                      <a:pPr marL="0" lvl="0" indent="0" algn="l" rtl="0">
+                        <a:spcBef>
+                          <a:spcPts val="0"/>
+                        </a:spcBef>
+                        <a:spcAft>
+                          <a:spcPts val="0"/>
+                        </a:spcAft>
+                        <a:buNone/>
+                      </a:pPr>
+                      <a:r>
+                        <a:rPr lang="en-US" sz="1400" dirty="0"/>
+                        <a:t>Printed name correctly</a:t>
+                      </a:r>
+                    </a:p>
+                    <a:p>
+                      <a:pPr marL="0" lvl="0" indent="0" algn="l" rtl="0">
+                        <a:spcBef>
+                          <a:spcPts val="0"/>
+                        </a:spcBef>
+                        <a:spcAft>
+                          <a:spcPts val="0"/>
+                        </a:spcAft>
+                        <a:buNone/>
+                      </a:pPr>
+                      <a:r>
+                        <a:rPr lang="en-US" sz="1400" dirty="0"/>
+                        <a:t>Printed phone number</a:t>
+                      </a:r>
+                    </a:p>
+                    <a:p>
+                      <a:pPr marL="0" lvl="0" indent="0" algn="l" rtl="0">
+                        <a:spcBef>
+                          <a:spcPts val="0"/>
+                        </a:spcBef>
+                        <a:spcAft>
+                          <a:spcPts val="0"/>
+                        </a:spcAft>
+                        <a:buNone/>
+                      </a:pPr>
+                      <a:r>
+                        <a:rPr lang="en-US" sz="1400" dirty="0"/>
+                        <a:t>Printed house number</a:t>
+                      </a:r>
+                    </a:p>
+                    <a:p>
+                      <a:pPr marL="0" lvl="0" indent="0" algn="l" rtl="0">
+                        <a:spcBef>
+                          <a:spcPts val="0"/>
+                        </a:spcBef>
+                        <a:spcAft>
+                          <a:spcPts val="0"/>
+                        </a:spcAft>
+                        <a:buNone/>
+                      </a:pPr>
+                      <a:r>
+                        <a:rPr lang="en-US" sz="1400" dirty="0"/>
+                        <a:t>Printed street name</a:t>
+                      </a:r>
+                    </a:p>
+                    <a:p>
+                      <a:pPr marL="0" lvl="0" indent="0" algn="l" rtl="0">
+                        <a:spcBef>
+                          <a:spcPts val="0"/>
+                        </a:spcBef>
+                        <a:spcAft>
+                          <a:spcPts val="0"/>
+                        </a:spcAft>
+                        <a:buNone/>
+                      </a:pPr>
+                      <a:r>
+                        <a:rPr lang="en-US" sz="1400" dirty="0"/>
+                        <a:t>Printed suburb name</a:t>
+                      </a:r>
+                    </a:p>
+                    <a:p>
+                      <a:pPr marL="0" lvl="0" indent="0" algn="l" rtl="0">
+                        <a:spcBef>
+                          <a:spcPts val="0"/>
+                        </a:spcBef>
+                        <a:spcAft>
+                          <a:spcPts val="0"/>
+                        </a:spcAft>
+                        <a:buNone/>
+                      </a:pPr>
+                      <a:r>
+                        <a:rPr lang="en-US" sz="1400" dirty="0"/>
+                        <a:t>Asked for input again</a:t>
+                      </a:r>
+                    </a:p>
+                  </a:txBody>
+                  <a:tcPr marL="91425" marR="91425" marT="91425" marB="91425"/>
+                </a:tc>
+                <a:extLst>
+                  <a:ext uri="{0D108BD9-81ED-4DB2-BD59-A6C34878D82A}">
+                    <a16:rowId xmlns:a16="http://schemas.microsoft.com/office/drawing/2014/main" val="10001"/>
+                  </a:ext>
+                </a:extLst>
+              </a:tr>
+            </a:tbl>
+          </a:graphicData>
+        </a:graphic>
+      </p:graphicFrame>
+      <p:pic>
+        <p:nvPicPr>
+          <p:cNvPr id="4" name="Picture 3">
+            <a:extLst>
+              <a:ext uri="{FF2B5EF4-FFF2-40B4-BE49-F238E27FC236}">
+                <a16:creationId xmlns:a16="http://schemas.microsoft.com/office/drawing/2014/main" id="{7875FF7C-20C7-4ECA-A56A-366193B684A7}"/>
+              </a:ext>
+            </a:extLst>
+          </p:cNvPr>
+          <p:cNvPicPr>
+            <a:picLocks noChangeAspect="1"/>
+          </p:cNvPicPr>
+          <p:nvPr/>
+        </p:nvPicPr>
+        <p:blipFill>
+          <a:blip r:embed="rId3"/>
+          <a:stretch>
+            <a:fillRect/>
+          </a:stretch>
+        </p:blipFill>
+        <p:spPr>
+          <a:xfrm>
+            <a:off x="1603515" y="912985"/>
+            <a:ext cx="4068416" cy="2074299"/>
+          </a:xfrm>
+          <a:prstGeom prst="rect">
+            <a:avLst/>
+          </a:prstGeom>
+        </p:spPr>
+      </p:pic>
+      <p:pic>
+        <p:nvPicPr>
+          <p:cNvPr id="6" name="Picture 5">
+            <a:extLst>
+              <a:ext uri="{FF2B5EF4-FFF2-40B4-BE49-F238E27FC236}">
+                <a16:creationId xmlns:a16="http://schemas.microsoft.com/office/drawing/2014/main" id="{1E68B06D-26F5-437A-83E0-CD0667C20D88}"/>
+              </a:ext>
+            </a:extLst>
+          </p:cNvPr>
+          <p:cNvPicPr>
+            <a:picLocks noChangeAspect="1"/>
+          </p:cNvPicPr>
+          <p:nvPr/>
+        </p:nvPicPr>
+        <p:blipFill>
+          <a:blip r:embed="rId4"/>
+          <a:stretch>
+            <a:fillRect/>
+          </a:stretch>
+        </p:blipFill>
+        <p:spPr>
+          <a:xfrm>
+            <a:off x="5914620" y="1034407"/>
+            <a:ext cx="2098252" cy="1831454"/>
+          </a:xfrm>
+          <a:prstGeom prst="rect">
+            <a:avLst/>
+          </a:prstGeom>
+        </p:spPr>
+      </p:pic>
+    </p:spTree>
+    <p:extLst>
+      <p:ext uri="{BB962C8B-B14F-4D97-AF65-F5344CB8AC3E}">
+        <p14:creationId xmlns:p14="http://schemas.microsoft.com/office/powerpoint/2010/main" val="2090451148"/>
+      </p:ext>
+    </p:extLst>
+  </p:cSld>
+  <p:clrMapOvr>
+    <a:masterClrMapping/>
+  </p:clrMapOvr>
+</p:sld>
+</file>
+
+<file path=ppt/slides/slide27.xml><?xml version="1.0" encoding="utf-8"?>
+<p:sld xmlns:a="http://schemas.openxmlformats.org/drawingml/2006/main" xmlns:r="http://schemas.openxmlformats.org/officeDocument/2006/relationships" xmlns:p="http://schemas.openxmlformats.org/presentationml/2006/main">
+  <p:cSld>
+    <p:bg>
+      <p:bgPr>
+        <a:solidFill>
+          <a:srgbClr val="D9EAD3"/>
+        </a:solidFill>
+        <a:effectLst/>
+      </p:bgPr>
+    </p:bg>
+    <p:spTree>
+      <p:nvGrpSpPr>
         <p:cNvPr id="1" name="Shape 83"/>
         <p:cNvGrpSpPr/>
         <p:nvPr/>
@@ -12409,7 +13719,7 @@
 </p:sld>
 </file>
 
-<file path=ppt/slides/slide25.xml><?xml version="1.0" encoding="utf-8"?>
+<file path=ppt/slides/slide28.xml><?xml version="1.0" encoding="utf-8"?>
 <p:sld xmlns:a="http://schemas.openxmlformats.org/drawingml/2006/main" xmlns:r="http://schemas.openxmlformats.org/officeDocument/2006/relationships" xmlns:p="http://schemas.openxmlformats.org/presentationml/2006/main">
   <p:cSld>
     <p:bg>

</xml_diff>

<commit_message>
Added version 1 pizza menu
Created a basic pizza menu
</commit_message>
<xml_diff>
--- a/022_91893+_+91897+Documentation.pptx
+++ b/022_91893+_+91897+Documentation.pptx
@@ -5,7 +5,7 @@
     <p:sldMasterId id="2147483659" r:id="rId1"/>
   </p:sldMasterIdLst>
   <p:notesMasterIdLst>
-    <p:notesMasterId r:id="rId30"/>
+    <p:notesMasterId r:id="rId32"/>
   </p:notesMasterIdLst>
   <p:sldIdLst>
     <p:sldId id="256" r:id="rId2"/>
@@ -34,8 +34,10 @@
     <p:sldId id="281" r:id="rId25"/>
     <p:sldId id="282" r:id="rId26"/>
     <p:sldId id="283" r:id="rId27"/>
-    <p:sldId id="261" r:id="rId28"/>
-    <p:sldId id="262" r:id="rId29"/>
+    <p:sldId id="284" r:id="rId28"/>
+    <p:sldId id="285" r:id="rId29"/>
+    <p:sldId id="261" r:id="rId30"/>
+    <p:sldId id="262" r:id="rId31"/>
   </p:sldIdLst>
   <p:sldSz cx="9144000" cy="5143500" type="screen16x9"/>
   <p:notesSz cx="6858000" cy="9144000"/>
@@ -2850,6 +2852,224 @@
   <p:cSld>
     <p:spTree>
       <p:nvGrpSpPr>
+        <p:cNvPr id="1" name="Shape 69"/>
+        <p:cNvGrpSpPr/>
+        <p:nvPr/>
+      </p:nvGrpSpPr>
+      <p:grpSpPr>
+        <a:xfrm>
+          <a:off x="0" y="0"/>
+          <a:ext cx="0" cy="0"/>
+          <a:chOff x="0" y="0"/>
+          <a:chExt cx="0" cy="0"/>
+        </a:xfrm>
+      </p:grpSpPr>
+      <p:sp>
+        <p:nvSpPr>
+          <p:cNvPr id="70" name="Google Shape;70;gac10fef634_0_16:notes"/>
+          <p:cNvSpPr>
+            <a:spLocks noGrp="1" noRot="1" noChangeAspect="1"/>
+          </p:cNvSpPr>
+          <p:nvPr>
+            <p:ph type="sldImg" idx="2"/>
+          </p:nvPr>
+        </p:nvSpPr>
+        <p:spPr>
+          <a:xfrm>
+            <a:off x="381000" y="685800"/>
+            <a:ext cx="6096000" cy="3429000"/>
+          </a:xfrm>
+          <a:custGeom>
+            <a:avLst/>
+            <a:gdLst/>
+            <a:ahLst/>
+            <a:cxnLst/>
+            <a:rect l="l" t="t" r="r" b="b"/>
+            <a:pathLst>
+              <a:path w="120000" h="120000" extrusionOk="0">
+                <a:moveTo>
+                  <a:pt x="0" y="0"/>
+                </a:moveTo>
+                <a:lnTo>
+                  <a:pt x="120000" y="0"/>
+                </a:lnTo>
+                <a:lnTo>
+                  <a:pt x="120000" y="120000"/>
+                </a:lnTo>
+                <a:lnTo>
+                  <a:pt x="0" y="120000"/>
+                </a:lnTo>
+                <a:close/>
+              </a:path>
+            </a:pathLst>
+          </a:custGeom>
+        </p:spPr>
+      </p:sp>
+      <p:sp>
+        <p:nvSpPr>
+          <p:cNvPr id="71" name="Google Shape;71;gac10fef634_0_16:notes"/>
+          <p:cNvSpPr txBox="1">
+            <a:spLocks noGrp="1"/>
+          </p:cNvSpPr>
+          <p:nvPr>
+            <p:ph type="body" idx="1"/>
+          </p:nvPr>
+        </p:nvSpPr>
+        <p:spPr>
+          <a:xfrm>
+            <a:off x="685800" y="4343400"/>
+            <a:ext cx="5486400" cy="4114800"/>
+          </a:xfrm>
+          <a:prstGeom prst="rect">
+            <a:avLst/>
+          </a:prstGeom>
+        </p:spPr>
+        <p:txBody>
+          <a:bodyPr spcFirstLastPara="1" wrap="square" lIns="91425" tIns="91425" rIns="91425" bIns="91425" anchor="t" anchorCtr="0">
+            <a:noAutofit/>
+          </a:bodyPr>
+          <a:lstStyle/>
+          <a:p>
+            <a:pPr marL="0" lvl="0" indent="0" algn="l" rtl="0">
+              <a:spcBef>
+                <a:spcPts val="0"/>
+              </a:spcBef>
+              <a:spcAft>
+                <a:spcPts val="0"/>
+              </a:spcAft>
+              <a:buNone/>
+            </a:pPr>
+            <a:endParaRPr/>
+          </a:p>
+        </p:txBody>
+      </p:sp>
+    </p:spTree>
+    <p:extLst>
+      <p:ext uri="{BB962C8B-B14F-4D97-AF65-F5344CB8AC3E}">
+        <p14:creationId xmlns:p14="http://schemas.microsoft.com/office/powerpoint/2010/main" val="1857565214"/>
+      </p:ext>
+    </p:extLst>
+  </p:cSld>
+  <p:clrMapOvr>
+    <a:masterClrMapping/>
+  </p:clrMapOvr>
+</p:notes>
+</file>
+
+<file path=ppt/notesSlides/notesSlide28.xml><?xml version="1.0" encoding="utf-8"?>
+<p:notes xmlns:a="http://schemas.openxmlformats.org/drawingml/2006/main" xmlns:r="http://schemas.openxmlformats.org/officeDocument/2006/relationships" xmlns:p="http://schemas.openxmlformats.org/presentationml/2006/main" showMasterSp="0" showMasterPhAnim="0">
+  <p:cSld>
+    <p:spTree>
+      <p:nvGrpSpPr>
+        <p:cNvPr id="1" name="Shape 74"/>
+        <p:cNvGrpSpPr/>
+        <p:nvPr/>
+      </p:nvGrpSpPr>
+      <p:grpSpPr>
+        <a:xfrm>
+          <a:off x="0" y="0"/>
+          <a:ext cx="0" cy="0"/>
+          <a:chOff x="0" y="0"/>
+          <a:chExt cx="0" cy="0"/>
+        </a:xfrm>
+      </p:grpSpPr>
+      <p:sp>
+        <p:nvSpPr>
+          <p:cNvPr id="75" name="Google Shape;75;gac10fef634_0_20:notes"/>
+          <p:cNvSpPr>
+            <a:spLocks noGrp="1" noRot="1" noChangeAspect="1"/>
+          </p:cNvSpPr>
+          <p:nvPr>
+            <p:ph type="sldImg" idx="2"/>
+          </p:nvPr>
+        </p:nvSpPr>
+        <p:spPr>
+          <a:xfrm>
+            <a:off x="381000" y="685800"/>
+            <a:ext cx="6096000" cy="3429000"/>
+          </a:xfrm>
+          <a:custGeom>
+            <a:avLst/>
+            <a:gdLst/>
+            <a:ahLst/>
+            <a:cxnLst/>
+            <a:rect l="l" t="t" r="r" b="b"/>
+            <a:pathLst>
+              <a:path w="120000" h="120000" extrusionOk="0">
+                <a:moveTo>
+                  <a:pt x="0" y="0"/>
+                </a:moveTo>
+                <a:lnTo>
+                  <a:pt x="120000" y="0"/>
+                </a:lnTo>
+                <a:lnTo>
+                  <a:pt x="120000" y="120000"/>
+                </a:lnTo>
+                <a:lnTo>
+                  <a:pt x="0" y="120000"/>
+                </a:lnTo>
+                <a:close/>
+              </a:path>
+            </a:pathLst>
+          </a:custGeom>
+        </p:spPr>
+      </p:sp>
+      <p:sp>
+        <p:nvSpPr>
+          <p:cNvPr id="76" name="Google Shape;76;gac10fef634_0_20:notes"/>
+          <p:cNvSpPr txBox="1">
+            <a:spLocks noGrp="1"/>
+          </p:cNvSpPr>
+          <p:nvPr>
+            <p:ph type="body" idx="1"/>
+          </p:nvPr>
+        </p:nvSpPr>
+        <p:spPr>
+          <a:xfrm>
+            <a:off x="685800" y="4343400"/>
+            <a:ext cx="5486400" cy="4114800"/>
+          </a:xfrm>
+          <a:prstGeom prst="rect">
+            <a:avLst/>
+          </a:prstGeom>
+        </p:spPr>
+        <p:txBody>
+          <a:bodyPr spcFirstLastPara="1" wrap="square" lIns="91425" tIns="91425" rIns="91425" bIns="91425" anchor="t" anchorCtr="0">
+            <a:noAutofit/>
+          </a:bodyPr>
+          <a:lstStyle/>
+          <a:p>
+            <a:pPr marL="0" lvl="0" indent="0" algn="l" rtl="0">
+              <a:spcBef>
+                <a:spcPts val="0"/>
+              </a:spcBef>
+              <a:spcAft>
+                <a:spcPts val="0"/>
+              </a:spcAft>
+              <a:buNone/>
+            </a:pPr>
+            <a:endParaRPr/>
+          </a:p>
+        </p:txBody>
+      </p:sp>
+    </p:spTree>
+    <p:extLst>
+      <p:ext uri="{BB962C8B-B14F-4D97-AF65-F5344CB8AC3E}">
+        <p14:creationId xmlns:p14="http://schemas.microsoft.com/office/powerpoint/2010/main" val="1487489589"/>
+      </p:ext>
+    </p:extLst>
+  </p:cSld>
+  <p:clrMapOvr>
+    <a:masterClrMapping/>
+  </p:clrMapOvr>
+</p:notes>
+</file>
+
+<file path=ppt/notesSlides/notesSlide29.xml><?xml version="1.0" encoding="utf-8"?>
+<p:notes xmlns:a="http://schemas.openxmlformats.org/drawingml/2006/main" xmlns:r="http://schemas.openxmlformats.org/officeDocument/2006/relationships" xmlns:p="http://schemas.openxmlformats.org/presentationml/2006/main" showMasterSp="0" showMasterPhAnim="0">
+  <p:cSld>
+    <p:spTree>
+      <p:nvGrpSpPr>
         <p:cNvPr id="1" name="Shape 80"/>
         <p:cNvGrpSpPr/>
         <p:nvPr/>
@@ -2958,114 +3178,6 @@
               </a:spcAft>
               <a:buNone/>
             </a:pPr>
-            <a:endParaRPr/>
-          </a:p>
-        </p:txBody>
-      </p:sp>
-    </p:spTree>
-  </p:cSld>
-  <p:clrMapOvr>
-    <a:masterClrMapping/>
-  </p:clrMapOvr>
-</p:notes>
-</file>
-
-<file path=ppt/notesSlides/notesSlide28.xml><?xml version="1.0" encoding="utf-8"?>
-<p:notes xmlns:a="http://schemas.openxmlformats.org/drawingml/2006/main" xmlns:r="http://schemas.openxmlformats.org/officeDocument/2006/relationships" xmlns:p="http://schemas.openxmlformats.org/presentationml/2006/main" showMasterSp="0" showMasterPhAnim="0">
-  <p:cSld>
-    <p:spTree>
-      <p:nvGrpSpPr>
-        <p:cNvPr id="1" name="Shape 86"/>
-        <p:cNvGrpSpPr/>
-        <p:nvPr/>
-      </p:nvGrpSpPr>
-      <p:grpSpPr>
-        <a:xfrm>
-          <a:off x="0" y="0"/>
-          <a:ext cx="0" cy="0"/>
-          <a:chOff x="0" y="0"/>
-          <a:chExt cx="0" cy="0"/>
-        </a:xfrm>
-      </p:grpSpPr>
-      <p:sp>
-        <p:nvSpPr>
-          <p:cNvPr id="87" name="Google Shape;87;gac10fef634_0_30:notes"/>
-          <p:cNvSpPr>
-            <a:spLocks noGrp="1" noRot="1" noChangeAspect="1"/>
-          </p:cNvSpPr>
-          <p:nvPr>
-            <p:ph type="sldImg" idx="2"/>
-          </p:nvPr>
-        </p:nvSpPr>
-        <p:spPr>
-          <a:xfrm>
-            <a:off x="381000" y="685800"/>
-            <a:ext cx="6096000" cy="3429000"/>
-          </a:xfrm>
-          <a:custGeom>
-            <a:avLst/>
-            <a:gdLst/>
-            <a:ahLst/>
-            <a:cxnLst/>
-            <a:rect l="l" t="t" r="r" b="b"/>
-            <a:pathLst>
-              <a:path w="120000" h="120000" extrusionOk="0">
-                <a:moveTo>
-                  <a:pt x="0" y="0"/>
-                </a:moveTo>
-                <a:lnTo>
-                  <a:pt x="120000" y="0"/>
-                </a:lnTo>
-                <a:lnTo>
-                  <a:pt x="120000" y="120000"/>
-                </a:lnTo>
-                <a:lnTo>
-                  <a:pt x="0" y="120000"/>
-                </a:lnTo>
-                <a:close/>
-              </a:path>
-            </a:pathLst>
-          </a:custGeom>
-        </p:spPr>
-      </p:sp>
-      <p:sp>
-        <p:nvSpPr>
-          <p:cNvPr id="88" name="Google Shape;88;gac10fef634_0_30:notes"/>
-          <p:cNvSpPr txBox="1">
-            <a:spLocks noGrp="1"/>
-          </p:cNvSpPr>
-          <p:nvPr>
-            <p:ph type="body" idx="1"/>
-          </p:nvPr>
-        </p:nvSpPr>
-        <p:spPr>
-          <a:xfrm>
-            <a:off x="685800" y="4343400"/>
-            <a:ext cx="5486400" cy="4114800"/>
-          </a:xfrm>
-          <a:prstGeom prst="rect">
-            <a:avLst/>
-          </a:prstGeom>
-        </p:spPr>
-        <p:txBody>
-          <a:bodyPr spcFirstLastPara="1" wrap="square" lIns="91425" tIns="91425" rIns="91425" bIns="91425" anchor="t" anchorCtr="0">
-            <a:noAutofit/>
-          </a:bodyPr>
-          <a:lstStyle/>
-          <a:p>
-            <a:pPr marL="0" lvl="0" indent="0" algn="l" rtl="0">
-              <a:spcBef>
-                <a:spcPts val="0"/>
-              </a:spcBef>
-              <a:spcAft>
-                <a:spcPts val="0"/>
-              </a:spcAft>
-              <a:buNone/>
-            </a:pPr>
-            <a:r>
-              <a:rPr lang="en"/>
-              <a:t>Discusses how the information from planning, testing and trialling of components assisted in the development of a high-quality outcome</a:t>
-            </a:r>
             <a:endParaRPr/>
           </a:p>
         </p:txBody>
@@ -3191,6 +3303,114 @@
               </a:spcAft>
               <a:buNone/>
             </a:pPr>
+            <a:endParaRPr/>
+          </a:p>
+        </p:txBody>
+      </p:sp>
+    </p:spTree>
+  </p:cSld>
+  <p:clrMapOvr>
+    <a:masterClrMapping/>
+  </p:clrMapOvr>
+</p:notes>
+</file>
+
+<file path=ppt/notesSlides/notesSlide30.xml><?xml version="1.0" encoding="utf-8"?>
+<p:notes xmlns:a="http://schemas.openxmlformats.org/drawingml/2006/main" xmlns:r="http://schemas.openxmlformats.org/officeDocument/2006/relationships" xmlns:p="http://schemas.openxmlformats.org/presentationml/2006/main" showMasterSp="0" showMasterPhAnim="0">
+  <p:cSld>
+    <p:spTree>
+      <p:nvGrpSpPr>
+        <p:cNvPr id="1" name="Shape 86"/>
+        <p:cNvGrpSpPr/>
+        <p:nvPr/>
+      </p:nvGrpSpPr>
+      <p:grpSpPr>
+        <a:xfrm>
+          <a:off x="0" y="0"/>
+          <a:ext cx="0" cy="0"/>
+          <a:chOff x="0" y="0"/>
+          <a:chExt cx="0" cy="0"/>
+        </a:xfrm>
+      </p:grpSpPr>
+      <p:sp>
+        <p:nvSpPr>
+          <p:cNvPr id="87" name="Google Shape;87;gac10fef634_0_30:notes"/>
+          <p:cNvSpPr>
+            <a:spLocks noGrp="1" noRot="1" noChangeAspect="1"/>
+          </p:cNvSpPr>
+          <p:nvPr>
+            <p:ph type="sldImg" idx="2"/>
+          </p:nvPr>
+        </p:nvSpPr>
+        <p:spPr>
+          <a:xfrm>
+            <a:off x="381000" y="685800"/>
+            <a:ext cx="6096000" cy="3429000"/>
+          </a:xfrm>
+          <a:custGeom>
+            <a:avLst/>
+            <a:gdLst/>
+            <a:ahLst/>
+            <a:cxnLst/>
+            <a:rect l="l" t="t" r="r" b="b"/>
+            <a:pathLst>
+              <a:path w="120000" h="120000" extrusionOk="0">
+                <a:moveTo>
+                  <a:pt x="0" y="0"/>
+                </a:moveTo>
+                <a:lnTo>
+                  <a:pt x="120000" y="0"/>
+                </a:lnTo>
+                <a:lnTo>
+                  <a:pt x="120000" y="120000"/>
+                </a:lnTo>
+                <a:lnTo>
+                  <a:pt x="0" y="120000"/>
+                </a:lnTo>
+                <a:close/>
+              </a:path>
+            </a:pathLst>
+          </a:custGeom>
+        </p:spPr>
+      </p:sp>
+      <p:sp>
+        <p:nvSpPr>
+          <p:cNvPr id="88" name="Google Shape;88;gac10fef634_0_30:notes"/>
+          <p:cNvSpPr txBox="1">
+            <a:spLocks noGrp="1"/>
+          </p:cNvSpPr>
+          <p:nvPr>
+            <p:ph type="body" idx="1"/>
+          </p:nvPr>
+        </p:nvSpPr>
+        <p:spPr>
+          <a:xfrm>
+            <a:off x="685800" y="4343400"/>
+            <a:ext cx="5486400" cy="4114800"/>
+          </a:xfrm>
+          <a:prstGeom prst="rect">
+            <a:avLst/>
+          </a:prstGeom>
+        </p:spPr>
+        <p:txBody>
+          <a:bodyPr spcFirstLastPara="1" wrap="square" lIns="91425" tIns="91425" rIns="91425" bIns="91425" anchor="t" anchorCtr="0">
+            <a:noAutofit/>
+          </a:bodyPr>
+          <a:lstStyle/>
+          <a:p>
+            <a:pPr marL="0" lvl="0" indent="0" algn="l" rtl="0">
+              <a:spcBef>
+                <a:spcPts val="0"/>
+              </a:spcBef>
+              <a:spcAft>
+                <a:spcPts val="0"/>
+              </a:spcAft>
+              <a:buNone/>
+            </a:pPr>
+            <a:r>
+              <a:rPr lang="en"/>
+              <a:t>Discusses how the information from planning, testing and trialling of components assisted in the development of a high-quality outcome</a:t>
+            </a:r>
             <a:endParaRPr/>
           </a:p>
         </p:txBody>
@@ -13615,6 +13835,404 @@
     </p:bg>
     <p:spTree>
       <p:nvGrpSpPr>
+        <p:cNvPr id="1" name="Shape 72"/>
+        <p:cNvGrpSpPr/>
+        <p:nvPr/>
+      </p:nvGrpSpPr>
+      <p:grpSpPr>
+        <a:xfrm>
+          <a:off x="0" y="0"/>
+          <a:ext cx="0" cy="0"/>
+          <a:chOff x="0" y="0"/>
+          <a:chExt cx="0" cy="0"/>
+        </a:xfrm>
+      </p:grpSpPr>
+      <p:sp>
+        <p:nvSpPr>
+          <p:cNvPr id="73" name="Google Shape;73;p16"/>
+          <p:cNvSpPr txBox="1">
+            <a:spLocks noGrp="1"/>
+          </p:cNvSpPr>
+          <p:nvPr>
+            <p:ph type="title"/>
+          </p:nvPr>
+        </p:nvSpPr>
+        <p:spPr>
+          <a:xfrm>
+            <a:off x="311700" y="445025"/>
+            <a:ext cx="8520600" cy="572700"/>
+          </a:xfrm>
+          <a:prstGeom prst="rect">
+            <a:avLst/>
+          </a:prstGeom>
+        </p:spPr>
+        <p:txBody>
+          <a:bodyPr spcFirstLastPara="1" wrap="square" lIns="91425" tIns="91425" rIns="91425" bIns="91425" anchor="t" anchorCtr="0">
+            <a:noAutofit/>
+          </a:bodyPr>
+          <a:lstStyle/>
+          <a:p>
+            <a:pPr marL="0" lvl="0" indent="0" algn="l" rtl="0">
+              <a:spcBef>
+                <a:spcPts val="0"/>
+              </a:spcBef>
+              <a:spcAft>
+                <a:spcPts val="0"/>
+              </a:spcAft>
+              <a:buNone/>
+            </a:pPr>
+            <a:r>
+              <a:rPr lang="en" dirty="0"/>
+              <a:t>Component 5 Pizza menu (Trello screenshot)</a:t>
+            </a:r>
+            <a:endParaRPr dirty="0"/>
+          </a:p>
+        </p:txBody>
+      </p:sp>
+      <p:pic>
+        <p:nvPicPr>
+          <p:cNvPr id="6" name="Picture 5">
+            <a:extLst>
+              <a:ext uri="{FF2B5EF4-FFF2-40B4-BE49-F238E27FC236}">
+                <a16:creationId xmlns:a16="http://schemas.microsoft.com/office/drawing/2014/main" id="{E26E2F54-9114-44F3-AF8D-C13FA3A81B08}"/>
+              </a:ext>
+            </a:extLst>
+          </p:cNvPr>
+          <p:cNvPicPr>
+            <a:picLocks noChangeAspect="1"/>
+          </p:cNvPicPr>
+          <p:nvPr/>
+        </p:nvPicPr>
+        <p:blipFill>
+          <a:blip r:embed="rId3"/>
+          <a:stretch>
+            <a:fillRect/>
+          </a:stretch>
+        </p:blipFill>
+        <p:spPr>
+          <a:xfrm>
+            <a:off x="198782" y="1017725"/>
+            <a:ext cx="8520600" cy="3462968"/>
+          </a:xfrm>
+          <a:prstGeom prst="rect">
+            <a:avLst/>
+          </a:prstGeom>
+        </p:spPr>
+      </p:pic>
+    </p:spTree>
+    <p:extLst>
+      <p:ext uri="{BB962C8B-B14F-4D97-AF65-F5344CB8AC3E}">
+        <p14:creationId xmlns:p14="http://schemas.microsoft.com/office/powerpoint/2010/main" val="3806062376"/>
+      </p:ext>
+    </p:extLst>
+  </p:cSld>
+  <p:clrMapOvr>
+    <a:masterClrMapping/>
+  </p:clrMapOvr>
+</p:sld>
+</file>
+
+<file path=ppt/slides/slide28.xml><?xml version="1.0" encoding="utf-8"?>
+<p:sld xmlns:a="http://schemas.openxmlformats.org/drawingml/2006/main" xmlns:r="http://schemas.openxmlformats.org/officeDocument/2006/relationships" xmlns:p="http://schemas.openxmlformats.org/presentationml/2006/main">
+  <p:cSld>
+    <p:spTree>
+      <p:nvGrpSpPr>
+        <p:cNvPr id="1" name="Shape 77"/>
+        <p:cNvGrpSpPr/>
+        <p:nvPr/>
+      </p:nvGrpSpPr>
+      <p:grpSpPr>
+        <a:xfrm>
+          <a:off x="0" y="0"/>
+          <a:ext cx="0" cy="0"/>
+          <a:chOff x="0" y="0"/>
+          <a:chExt cx="0" cy="0"/>
+        </a:xfrm>
+      </p:grpSpPr>
+      <p:sp>
+        <p:nvSpPr>
+          <p:cNvPr id="78" name="Google Shape;78;p17"/>
+          <p:cNvSpPr txBox="1">
+            <a:spLocks noGrp="1"/>
+          </p:cNvSpPr>
+          <p:nvPr>
+            <p:ph type="title"/>
+          </p:nvPr>
+        </p:nvSpPr>
+        <p:spPr>
+          <a:xfrm>
+            <a:off x="311700" y="445025"/>
+            <a:ext cx="8520600" cy="572700"/>
+          </a:xfrm>
+          <a:prstGeom prst="rect">
+            <a:avLst/>
+          </a:prstGeom>
+        </p:spPr>
+        <p:txBody>
+          <a:bodyPr spcFirstLastPara="1" wrap="square" lIns="91425" tIns="91425" rIns="91425" bIns="91425" anchor="t" anchorCtr="0">
+            <a:noAutofit/>
+          </a:bodyPr>
+          <a:lstStyle/>
+          <a:p>
+            <a:pPr marL="0" lvl="0" indent="0" algn="l" rtl="0">
+              <a:spcBef>
+                <a:spcPts val="0"/>
+              </a:spcBef>
+              <a:spcAft>
+                <a:spcPts val="0"/>
+              </a:spcAft>
+              <a:buNone/>
+            </a:pPr>
+            <a:r>
+              <a:rPr lang="en" sz="2400" dirty="0"/>
+              <a:t>Component 5 v1 - Test Plan (?and screenshot)</a:t>
+            </a:r>
+            <a:endParaRPr sz="2400" dirty="0"/>
+          </a:p>
+        </p:txBody>
+      </p:sp>
+      <p:graphicFrame>
+        <p:nvGraphicFramePr>
+          <p:cNvPr id="79" name="Google Shape;79;p17"/>
+          <p:cNvGraphicFramePr/>
+          <p:nvPr>
+            <p:extLst>
+              <p:ext uri="{D42A27DB-BD31-4B8C-83A1-F6EECF244321}">
+                <p14:modId xmlns:p14="http://schemas.microsoft.com/office/powerpoint/2010/main" val="1022514294"/>
+              </p:ext>
+            </p:extLst>
+          </p:nvPr>
+        </p:nvGraphicFramePr>
+        <p:xfrm>
+          <a:off x="311700" y="3945718"/>
+          <a:ext cx="8520600" cy="853380"/>
+        </p:xfrm>
+        <a:graphic>
+          <a:graphicData uri="http://schemas.openxmlformats.org/drawingml/2006/table">
+            <a:tbl>
+              <a:tblPr>
+                <a:noFill/>
+                <a:tableStyleId>{E1099E06-0E6B-448D-9D27-60429F06E6F4}</a:tableStyleId>
+              </a:tblPr>
+              <a:tblGrid>
+                <a:gridCol w="4260300">
+                  <a:extLst>
+                    <a:ext uri="{9D8B030D-6E8A-4147-A177-3AD203B41FA5}">
+                      <a16:colId xmlns:a16="http://schemas.microsoft.com/office/drawing/2014/main" val="20000"/>
+                    </a:ext>
+                  </a:extLst>
+                </a:gridCol>
+                <a:gridCol w="4260300">
+                  <a:extLst>
+                    <a:ext uri="{9D8B030D-6E8A-4147-A177-3AD203B41FA5}">
+                      <a16:colId xmlns:a16="http://schemas.microsoft.com/office/drawing/2014/main" val="20001"/>
+                    </a:ext>
+                  </a:extLst>
+                </a:gridCol>
+              </a:tblGrid>
+              <a:tr h="381000">
+                <a:tc>
+                  <a:txBody>
+                    <a:bodyPr/>
+                    <a:lstStyle/>
+                    <a:p>
+                      <a:pPr marL="0" lvl="0" indent="0" algn="l" rtl="0">
+                        <a:spcBef>
+                          <a:spcPts val="0"/>
+                        </a:spcBef>
+                        <a:spcAft>
+                          <a:spcPts val="0"/>
+                        </a:spcAft>
+                        <a:buNone/>
+                      </a:pPr>
+                      <a:r>
+                        <a:rPr lang="en" sz="1800" b="1"/>
+                        <a:t>Test Case</a:t>
+                      </a:r>
+                      <a:endParaRPr sz="1800" b="1"/>
+                    </a:p>
+                  </a:txBody>
+                  <a:tcPr marL="91425" marR="91425" marT="91425" marB="91425">
+                    <a:solidFill>
+                      <a:srgbClr val="CCCCCC"/>
+                    </a:solidFill>
+                  </a:tcPr>
+                </a:tc>
+                <a:tc>
+                  <a:txBody>
+                    <a:bodyPr/>
+                    <a:lstStyle/>
+                    <a:p>
+                      <a:pPr marL="0" lvl="0" indent="0" algn="l" rtl="0">
+                        <a:spcBef>
+                          <a:spcPts val="0"/>
+                        </a:spcBef>
+                        <a:spcAft>
+                          <a:spcPts val="0"/>
+                        </a:spcAft>
+                        <a:buNone/>
+                      </a:pPr>
+                      <a:r>
+                        <a:rPr lang="en" sz="1800" b="1"/>
+                        <a:t>Expected Values</a:t>
+                      </a:r>
+                      <a:endParaRPr sz="1800" b="1"/>
+                    </a:p>
+                  </a:txBody>
+                  <a:tcPr marL="91425" marR="91425" marT="91425" marB="91425">
+                    <a:solidFill>
+                      <a:srgbClr val="CCCCCC"/>
+                    </a:solidFill>
+                  </a:tcPr>
+                </a:tc>
+                <a:extLst>
+                  <a:ext uri="{0D108BD9-81ED-4DB2-BD59-A6C34878D82A}">
+                    <a16:rowId xmlns:a16="http://schemas.microsoft.com/office/drawing/2014/main" val="10000"/>
+                  </a:ext>
+                </a:extLst>
+              </a:tr>
+              <a:tr h="396200">
+                <a:tc>
+                  <a:txBody>
+                    <a:bodyPr/>
+                    <a:lstStyle/>
+                    <a:p>
+                      <a:pPr marL="0" lvl="0" indent="0" algn="l" rtl="0">
+                        <a:spcBef>
+                          <a:spcPts val="0"/>
+                        </a:spcBef>
+                        <a:spcAft>
+                          <a:spcPts val="0"/>
+                        </a:spcAft>
+                        <a:buNone/>
+                      </a:pPr>
+                      <a:r>
+                        <a:rPr lang="en-US" sz="1400" dirty="0"/>
+                        <a:t>Run file</a:t>
+                      </a:r>
+                      <a:endParaRPr sz="1400" dirty="0"/>
+                    </a:p>
+                  </a:txBody>
+                  <a:tcPr marL="91425" marR="91425" marT="91425" marB="91425"/>
+                </a:tc>
+                <a:tc>
+                  <a:txBody>
+                    <a:bodyPr/>
+                    <a:lstStyle/>
+                    <a:p>
+                      <a:pPr marL="0" lvl="0" indent="0" algn="l" rtl="0">
+                        <a:spcBef>
+                          <a:spcPts val="0"/>
+                        </a:spcBef>
+                        <a:spcAft>
+                          <a:spcPts val="0"/>
+                        </a:spcAft>
+                        <a:buNone/>
+                      </a:pPr>
+                      <a:r>
+                        <a:rPr lang="en-US" sz="1400" dirty="0"/>
+                        <a:t>Printed a list with index numbers, pizzas and prices </a:t>
+                      </a:r>
+                    </a:p>
+                  </a:txBody>
+                  <a:tcPr marL="91425" marR="91425" marT="91425" marB="91425"/>
+                </a:tc>
+                <a:extLst>
+                  <a:ext uri="{0D108BD9-81ED-4DB2-BD59-A6C34878D82A}">
+                    <a16:rowId xmlns:a16="http://schemas.microsoft.com/office/drawing/2014/main" val="10001"/>
+                  </a:ext>
+                </a:extLst>
+              </a:tr>
+            </a:tbl>
+          </a:graphicData>
+        </a:graphic>
+      </p:graphicFrame>
+      <p:pic>
+        <p:nvPicPr>
+          <p:cNvPr id="3" name="Picture 2">
+            <a:extLst>
+              <a:ext uri="{FF2B5EF4-FFF2-40B4-BE49-F238E27FC236}">
+                <a16:creationId xmlns:a16="http://schemas.microsoft.com/office/drawing/2014/main" id="{39A9A193-AC45-4CFA-AD1A-9F1DC093AA79}"/>
+              </a:ext>
+            </a:extLst>
+          </p:cNvPr>
+          <p:cNvPicPr>
+            <a:picLocks noChangeAspect="1"/>
+          </p:cNvPicPr>
+          <p:nvPr/>
+        </p:nvPicPr>
+        <p:blipFill>
+          <a:blip r:embed="rId3"/>
+          <a:stretch>
+            <a:fillRect/>
+          </a:stretch>
+        </p:blipFill>
+        <p:spPr>
+          <a:xfrm>
+            <a:off x="138874" y="2018906"/>
+            <a:ext cx="4769704" cy="1772371"/>
+          </a:xfrm>
+          <a:prstGeom prst="rect">
+            <a:avLst/>
+          </a:prstGeom>
+        </p:spPr>
+      </p:pic>
+      <p:pic>
+        <p:nvPicPr>
+          <p:cNvPr id="7" name="Picture 6">
+            <a:extLst>
+              <a:ext uri="{FF2B5EF4-FFF2-40B4-BE49-F238E27FC236}">
+                <a16:creationId xmlns:a16="http://schemas.microsoft.com/office/drawing/2014/main" id="{B9BA4677-A461-417F-924F-BF12A9FEE1CD}"/>
+              </a:ext>
+            </a:extLst>
+          </p:cNvPr>
+          <p:cNvPicPr>
+            <a:picLocks noChangeAspect="1"/>
+          </p:cNvPicPr>
+          <p:nvPr/>
+        </p:nvPicPr>
+        <p:blipFill>
+          <a:blip r:embed="rId4"/>
+          <a:stretch>
+            <a:fillRect/>
+          </a:stretch>
+        </p:blipFill>
+        <p:spPr>
+          <a:xfrm>
+            <a:off x="4889430" y="1173789"/>
+            <a:ext cx="4115696" cy="2114268"/>
+          </a:xfrm>
+          <a:prstGeom prst="rect">
+            <a:avLst/>
+          </a:prstGeom>
+        </p:spPr>
+      </p:pic>
+    </p:spTree>
+    <p:extLst>
+      <p:ext uri="{BB962C8B-B14F-4D97-AF65-F5344CB8AC3E}">
+        <p14:creationId xmlns:p14="http://schemas.microsoft.com/office/powerpoint/2010/main" val="1932934946"/>
+      </p:ext>
+    </p:extLst>
+  </p:cSld>
+  <p:clrMapOvr>
+    <a:masterClrMapping/>
+  </p:clrMapOvr>
+</p:sld>
+</file>
+
+<file path=ppt/slides/slide29.xml><?xml version="1.0" encoding="utf-8"?>
+<p:sld xmlns:a="http://schemas.openxmlformats.org/drawingml/2006/main" xmlns:r="http://schemas.openxmlformats.org/officeDocument/2006/relationships" xmlns:p="http://schemas.openxmlformats.org/presentationml/2006/main">
+  <p:cSld>
+    <p:bg>
+      <p:bgPr>
+        <a:solidFill>
+          <a:srgbClr val="D9EAD3"/>
+        </a:solidFill>
+        <a:effectLst/>
+      </p:bgPr>
+    </p:bg>
+    <p:spTree>
+      <p:nvGrpSpPr>
         <p:cNvPr id="1" name="Shape 83"/>
         <p:cNvGrpSpPr/>
         <p:nvPr/>
@@ -13708,85 +14326,6 @@
               <a:t>Your version control evidence should go here.  This could be in the form of annotated screenshots which show you you managed this process or you could make a brief screencast explaining how you implemented version control.</a:t>
             </a:r>
             <a:endParaRPr i="1"/>
-          </a:p>
-        </p:txBody>
-      </p:sp>
-    </p:spTree>
-  </p:cSld>
-  <p:clrMapOvr>
-    <a:masterClrMapping/>
-  </p:clrMapOvr>
-</p:sld>
-</file>
-
-<file path=ppt/slides/slide28.xml><?xml version="1.0" encoding="utf-8"?>
-<p:sld xmlns:a="http://schemas.openxmlformats.org/drawingml/2006/main" xmlns:r="http://schemas.openxmlformats.org/officeDocument/2006/relationships" xmlns:p="http://schemas.openxmlformats.org/presentationml/2006/main">
-  <p:cSld>
-    <p:bg>
-      <p:bgPr>
-        <a:solidFill>
-          <a:srgbClr val="FFE599"/>
-        </a:solidFill>
-        <a:effectLst/>
-      </p:bgPr>
-    </p:bg>
-    <p:spTree>
-      <p:nvGrpSpPr>
-        <p:cNvPr id="1" name="Shape 89"/>
-        <p:cNvGrpSpPr/>
-        <p:nvPr/>
-      </p:nvGrpSpPr>
-      <p:grpSpPr>
-        <a:xfrm>
-          <a:off x="0" y="0"/>
-          <a:ext cx="0" cy="0"/>
-          <a:chOff x="0" y="0"/>
-          <a:chExt cx="0" cy="0"/>
-        </a:xfrm>
-      </p:grpSpPr>
-      <p:sp>
-        <p:nvSpPr>
-          <p:cNvPr id="90" name="Google Shape;90;p19"/>
-          <p:cNvSpPr txBox="1">
-            <a:spLocks noGrp="1"/>
-          </p:cNvSpPr>
-          <p:nvPr>
-            <p:ph type="body" idx="1"/>
-          </p:nvPr>
-        </p:nvSpPr>
-        <p:spPr>
-          <a:xfrm>
-            <a:off x="311700" y="397700"/>
-            <a:ext cx="8520600" cy="4171200"/>
-          </a:xfrm>
-          <a:prstGeom prst="rect">
-            <a:avLst/>
-          </a:prstGeom>
-        </p:spPr>
-        <p:txBody>
-          <a:bodyPr spcFirstLastPara="1" wrap="square" lIns="91425" tIns="91425" rIns="91425" bIns="91425" anchor="t" anchorCtr="0">
-            <a:noAutofit/>
-          </a:bodyPr>
-          <a:lstStyle/>
-          <a:p>
-            <a:pPr marL="0" lvl="0" indent="0" algn="l" rtl="0">
-              <a:spcBef>
-                <a:spcPts val="0"/>
-              </a:spcBef>
-              <a:spcAft>
-                <a:spcPts val="1600"/>
-              </a:spcAft>
-              <a:buNone/>
-            </a:pPr>
-            <a:r>
-              <a:rPr lang="en" b="1" i="1">
-                <a:solidFill>
-                  <a:srgbClr val="595959"/>
-                </a:solidFill>
-              </a:rPr>
-              <a:t>Discusses how the information from planning, testing and trialling of components assisted in the development of a high-quality outcome</a:t>
-            </a:r>
-            <a:endParaRPr/>
           </a:p>
         </p:txBody>
       </p:sp>
@@ -13920,6 +14459,85 @@
           </a:prstGeom>
         </p:spPr>
       </p:pic>
+    </p:spTree>
+  </p:cSld>
+  <p:clrMapOvr>
+    <a:masterClrMapping/>
+  </p:clrMapOvr>
+</p:sld>
+</file>
+
+<file path=ppt/slides/slide30.xml><?xml version="1.0" encoding="utf-8"?>
+<p:sld xmlns:a="http://schemas.openxmlformats.org/drawingml/2006/main" xmlns:r="http://schemas.openxmlformats.org/officeDocument/2006/relationships" xmlns:p="http://schemas.openxmlformats.org/presentationml/2006/main">
+  <p:cSld>
+    <p:bg>
+      <p:bgPr>
+        <a:solidFill>
+          <a:srgbClr val="FFE599"/>
+        </a:solidFill>
+        <a:effectLst/>
+      </p:bgPr>
+    </p:bg>
+    <p:spTree>
+      <p:nvGrpSpPr>
+        <p:cNvPr id="1" name="Shape 89"/>
+        <p:cNvGrpSpPr/>
+        <p:nvPr/>
+      </p:nvGrpSpPr>
+      <p:grpSpPr>
+        <a:xfrm>
+          <a:off x="0" y="0"/>
+          <a:ext cx="0" cy="0"/>
+          <a:chOff x="0" y="0"/>
+          <a:chExt cx="0" cy="0"/>
+        </a:xfrm>
+      </p:grpSpPr>
+      <p:sp>
+        <p:nvSpPr>
+          <p:cNvPr id="90" name="Google Shape;90;p19"/>
+          <p:cNvSpPr txBox="1">
+            <a:spLocks noGrp="1"/>
+          </p:cNvSpPr>
+          <p:nvPr>
+            <p:ph type="body" idx="1"/>
+          </p:nvPr>
+        </p:nvSpPr>
+        <p:spPr>
+          <a:xfrm>
+            <a:off x="311700" y="397700"/>
+            <a:ext cx="8520600" cy="4171200"/>
+          </a:xfrm>
+          <a:prstGeom prst="rect">
+            <a:avLst/>
+          </a:prstGeom>
+        </p:spPr>
+        <p:txBody>
+          <a:bodyPr spcFirstLastPara="1" wrap="square" lIns="91425" tIns="91425" rIns="91425" bIns="91425" anchor="t" anchorCtr="0">
+            <a:noAutofit/>
+          </a:bodyPr>
+          <a:lstStyle/>
+          <a:p>
+            <a:pPr marL="0" lvl="0" indent="0" algn="l" rtl="0">
+              <a:spcBef>
+                <a:spcPts val="0"/>
+              </a:spcBef>
+              <a:spcAft>
+                <a:spcPts val="1600"/>
+              </a:spcAft>
+              <a:buNone/>
+            </a:pPr>
+            <a:r>
+              <a:rPr lang="en" b="1" i="1">
+                <a:solidFill>
+                  <a:srgbClr val="595959"/>
+                </a:solidFill>
+              </a:rPr>
+              <a:t>Discusses how the information from planning, testing and trialling of components assisted in the development of a high-quality outcome</a:t>
+            </a:r>
+            <a:endParaRPr/>
+          </a:p>
+        </p:txBody>
+      </p:sp>
     </p:spTree>
   </p:cSld>
   <p:clrMapOvr>

</xml_diff>